<commit_message>
master:  Some updates from the preso
</commit_message>
<xml_diff>
--- a/slides.pptx
+++ b/slides.pptx
@@ -2960,6 +2960,13 @@
   <p:clrMapOvr>
     <a:masterClrMapping/>
   </p:clrMapOvr>
+  <p:timing>
+    <p:tnLst>
+      <p:par>
+        <p:cTn xmlns:p14="http://schemas.microsoft.com/office/powerpoint/2010/main" id="1" dur="indefinite" restart="never" nodeType="tmRoot"/>
+      </p:par>
+    </p:tnLst>
+  </p:timing>
 </p:sld>
 </file>
 
@@ -3040,6 +3047,13 @@
   <p:clrMapOvr>
     <a:masterClrMapping/>
   </p:clrMapOvr>
+  <p:timing>
+    <p:tnLst>
+      <p:par>
+        <p:cTn xmlns:p14="http://schemas.microsoft.com/office/powerpoint/2010/main" id="1" dur="indefinite" restart="never" nodeType="tmRoot"/>
+      </p:par>
+    </p:tnLst>
+  </p:timing>
 </p:sld>
 </file>
 
@@ -3119,6 +3133,13 @@
   <p:clrMapOvr>
     <a:masterClrMapping/>
   </p:clrMapOvr>
+  <p:timing>
+    <p:tnLst>
+      <p:par>
+        <p:cTn xmlns:p14="http://schemas.microsoft.com/office/powerpoint/2010/main" id="1" dur="indefinite" restart="never" nodeType="tmRoot"/>
+      </p:par>
+    </p:tnLst>
+  </p:timing>
 </p:sld>
 </file>
 
@@ -3298,6 +3319,13 @@
   <p:clrMapOvr>
     <a:masterClrMapping/>
   </p:clrMapOvr>
+  <p:timing>
+    <p:tnLst>
+      <p:par>
+        <p:cTn xmlns:p14="http://schemas.microsoft.com/office/powerpoint/2010/main" id="1" dur="indefinite" restart="never" nodeType="tmRoot"/>
+      </p:par>
+    </p:tnLst>
+  </p:timing>
 </p:sld>
 </file>
 
@@ -3507,6 +3535,13 @@
   <p:clrMapOvr>
     <a:masterClrMapping/>
   </p:clrMapOvr>
+  <p:timing>
+    <p:tnLst>
+      <p:par>
+        <p:cTn xmlns:p14="http://schemas.microsoft.com/office/powerpoint/2010/main" id="1" dur="indefinite" restart="never" nodeType="tmRoot"/>
+      </p:par>
+    </p:tnLst>
+  </p:timing>
 </p:sld>
 </file>
 
@@ -3712,6 +3747,13 @@
   <p:clrMapOvr>
     <a:masterClrMapping/>
   </p:clrMapOvr>
+  <p:timing>
+    <p:tnLst>
+      <p:par>
+        <p:cTn xmlns:p14="http://schemas.microsoft.com/office/powerpoint/2010/main" id="1" dur="indefinite" restart="never" nodeType="tmRoot"/>
+      </p:par>
+    </p:tnLst>
+  </p:timing>
 </p:sld>
 </file>
 
@@ -4218,6 +4260,13 @@
   <p:clrMapOvr>
     <a:masterClrMapping/>
   </p:clrMapOvr>
+  <p:timing>
+    <p:tnLst>
+      <p:par>
+        <p:cTn xmlns:p14="http://schemas.microsoft.com/office/powerpoint/2010/main" id="1" dur="indefinite" restart="never" nodeType="tmRoot"/>
+      </p:par>
+    </p:tnLst>
+  </p:timing>
 </p:sld>
 </file>
 
@@ -4328,6 +4377,13 @@
   <p:clrMapOvr>
     <a:masterClrMapping/>
   </p:clrMapOvr>
+  <p:timing>
+    <p:tnLst>
+      <p:par>
+        <p:cTn xmlns:p14="http://schemas.microsoft.com/office/powerpoint/2010/main" id="1" dur="indefinite" restart="never" nodeType="tmRoot"/>
+      </p:par>
+    </p:tnLst>
+  </p:timing>
 </p:sld>
 </file>
 
@@ -4461,6 +4517,16 @@
               <a:t>Our Process</a:t>
             </a:r>
           </a:p>
+          <a:p>
+            <a:pPr marL="342900" indent="-342900">
+              <a:buFont typeface="Arial"/>
+              <a:buChar char="•"/>
+            </a:pPr>
+            <a:r>
+              <a:rPr lang="en-US" sz="3200" dirty="0" smtClean="0"/>
+              <a:t>Q&amp;A</a:t>
+            </a:r>
+          </a:p>
         </p:txBody>
       </p:sp>
     </p:spTree>
@@ -4473,6 +4539,13 @@
   <p:clrMapOvr>
     <a:masterClrMapping/>
   </p:clrMapOvr>
+  <p:timing>
+    <p:tnLst>
+      <p:par>
+        <p:cTn xmlns:p14="http://schemas.microsoft.com/office/powerpoint/2010/main" id="1" dur="indefinite" restart="never" nodeType="tmRoot"/>
+      </p:par>
+    </p:tnLst>
+  </p:timing>
 </p:sld>
 </file>
 
@@ -4549,6 +4622,13 @@
   <p:clrMapOvr>
     <a:masterClrMapping/>
   </p:clrMapOvr>
+  <p:timing>
+    <p:tnLst>
+      <p:par>
+        <p:cTn xmlns:p14="http://schemas.microsoft.com/office/powerpoint/2010/main" id="1" dur="indefinite" restart="never" nodeType="tmRoot"/>
+      </p:par>
+    </p:tnLst>
+  </p:timing>
 </p:sld>
 </file>
 
@@ -4849,6 +4929,13 @@
   <p:clrMapOvr>
     <a:masterClrMapping/>
   </p:clrMapOvr>
+  <p:timing>
+    <p:tnLst>
+      <p:par>
+        <p:cTn xmlns:p14="http://schemas.microsoft.com/office/powerpoint/2010/main" id="1" dur="indefinite" restart="never" nodeType="tmRoot"/>
+      </p:par>
+    </p:tnLst>
+  </p:timing>
 </p:sld>
 </file>
 
@@ -4990,6 +5077,13 @@
   <p:clrMapOvr>
     <a:masterClrMapping/>
   </p:clrMapOvr>
+  <p:timing>
+    <p:tnLst>
+      <p:par>
+        <p:cTn xmlns:p14="http://schemas.microsoft.com/office/powerpoint/2010/main" id="1" dur="indefinite" restart="never" nodeType="tmRoot"/>
+      </p:par>
+    </p:tnLst>
+  </p:timing>
 </p:sld>
 </file>
 
@@ -5068,6 +5162,13 @@
   <p:clrMapOvr>
     <a:masterClrMapping/>
   </p:clrMapOvr>
+  <p:timing>
+    <p:tnLst>
+      <p:par>
+        <p:cTn xmlns:p14="http://schemas.microsoft.com/office/powerpoint/2010/main" id="1" dur="indefinite" restart="never" nodeType="tmRoot"/>
+      </p:par>
+    </p:tnLst>
+  </p:timing>
 </p:sld>
 </file>
 
@@ -5209,6 +5310,13 @@
   <p:clrMapOvr>
     <a:masterClrMapping/>
   </p:clrMapOvr>
+  <p:timing>
+    <p:tnLst>
+      <p:par>
+        <p:cTn xmlns:p14="http://schemas.microsoft.com/office/powerpoint/2010/main" id="1" dur="indefinite" restart="never" nodeType="tmRoot"/>
+      </p:par>
+    </p:tnLst>
+  </p:timing>
 </p:sld>
 </file>
 
@@ -5291,6 +5399,13 @@
   <p:clrMapOvr>
     <a:masterClrMapping/>
   </p:clrMapOvr>
+  <p:timing>
+    <p:tnLst>
+      <p:par>
+        <p:cTn xmlns:p14="http://schemas.microsoft.com/office/powerpoint/2010/main" id="1" dur="indefinite" restart="never" nodeType="tmRoot"/>
+      </p:par>
+    </p:tnLst>
+  </p:timing>
 </p:sld>
 </file>
 
@@ -5387,6 +5502,13 @@
   <p:clrMapOvr>
     <a:masterClrMapping/>
   </p:clrMapOvr>
+  <p:timing>
+    <p:tnLst>
+      <p:par>
+        <p:cTn xmlns:p14="http://schemas.microsoft.com/office/powerpoint/2010/main" id="1" dur="indefinite" restart="never" nodeType="tmRoot"/>
+      </p:par>
+    </p:tnLst>
+  </p:timing>
 </p:sld>
 </file>
 
@@ -5535,6 +5657,13 @@
   <p:clrMapOvr>
     <a:masterClrMapping/>
   </p:clrMapOvr>
+  <p:timing>
+    <p:tnLst>
+      <p:par>
+        <p:cTn xmlns:p14="http://schemas.microsoft.com/office/powerpoint/2010/main" id="1" dur="indefinite" restart="never" nodeType="tmRoot"/>
+      </p:par>
+    </p:tnLst>
+  </p:timing>
 </p:sld>
 </file>
 
@@ -5592,6 +5721,13 @@
   <p:clrMapOvr>
     <a:masterClrMapping/>
   </p:clrMapOvr>
+  <p:timing>
+    <p:tnLst>
+      <p:par>
+        <p:cTn xmlns:p14="http://schemas.microsoft.com/office/powerpoint/2010/main" id="1" dur="indefinite" restart="never" nodeType="tmRoot"/>
+      </p:par>
+    </p:tnLst>
+  </p:timing>
 </p:sld>
 </file>
 
@@ -5673,6 +5809,13 @@
   <p:clrMapOvr>
     <a:masterClrMapping/>
   </p:clrMapOvr>
+  <p:timing>
+    <p:tnLst>
+      <p:par>
+        <p:cTn xmlns:p14="http://schemas.microsoft.com/office/powerpoint/2010/main" id="1" dur="indefinite" restart="never" nodeType="tmRoot"/>
+      </p:par>
+    </p:tnLst>
+  </p:timing>
 </p:sld>
 </file>
 
@@ -5834,6 +5977,13 @@
   <p:clrMapOvr>
     <a:masterClrMapping/>
   </p:clrMapOvr>
+  <p:timing>
+    <p:tnLst>
+      <p:par>
+        <p:cTn xmlns:p14="http://schemas.microsoft.com/office/powerpoint/2010/main" id="1" dur="indefinite" restart="never" nodeType="tmRoot"/>
+      </p:par>
+    </p:tnLst>
+  </p:timing>
 </p:sld>
 </file>
 
@@ -5926,6 +6076,13 @@
   <p:clrMapOvr>
     <a:masterClrMapping/>
   </p:clrMapOvr>
+  <p:timing>
+    <p:tnLst>
+      <p:par>
+        <p:cTn xmlns:p14="http://schemas.microsoft.com/office/powerpoint/2010/main" id="1" dur="indefinite" restart="never" nodeType="tmRoot"/>
+      </p:par>
+    </p:tnLst>
+  </p:timing>
 </p:sld>
 </file>
 
@@ -6075,6 +6232,13 @@
   <p:clrMapOvr>
     <a:masterClrMapping/>
   </p:clrMapOvr>
+  <p:timing>
+    <p:tnLst>
+      <p:par>
+        <p:cTn xmlns:p14="http://schemas.microsoft.com/office/powerpoint/2010/main" id="1" dur="indefinite" restart="never" nodeType="tmRoot"/>
+      </p:par>
+    </p:tnLst>
+  </p:timing>
 </p:sld>
 </file>
 
@@ -6128,6 +6292,13 @@
   <p:clrMapOvr>
     <a:masterClrMapping/>
   </p:clrMapOvr>
+  <p:timing>
+    <p:tnLst>
+      <p:par>
+        <p:cTn xmlns:p14="http://schemas.microsoft.com/office/powerpoint/2010/main" id="1" dur="indefinite" restart="never" nodeType="tmRoot"/>
+      </p:par>
+    </p:tnLst>
+  </p:timing>
 </p:sld>
 </file>
 
@@ -6235,6 +6406,13 @@
   <p:clrMapOvr>
     <a:masterClrMapping/>
   </p:clrMapOvr>
+  <p:timing>
+    <p:tnLst>
+      <p:par>
+        <p:cTn xmlns:p14="http://schemas.microsoft.com/office/powerpoint/2010/main" id="1" dur="indefinite" restart="never" nodeType="tmRoot"/>
+      </p:par>
+    </p:tnLst>
+  </p:timing>
 </p:sld>
 </file>
 
@@ -6327,6 +6505,13 @@
   <p:clrMapOvr>
     <a:masterClrMapping/>
   </p:clrMapOvr>
+  <p:timing>
+    <p:tnLst>
+      <p:par>
+        <p:cTn xmlns:p14="http://schemas.microsoft.com/office/powerpoint/2010/main" id="1" dur="indefinite" restart="never" nodeType="tmRoot"/>
+      </p:par>
+    </p:tnLst>
+  </p:timing>
 </p:sld>
 </file>
 
@@ -6442,6 +6627,13 @@
   <p:clrMapOvr>
     <a:masterClrMapping/>
   </p:clrMapOvr>
+  <p:timing>
+    <p:tnLst>
+      <p:par>
+        <p:cTn xmlns:p14="http://schemas.microsoft.com/office/powerpoint/2010/main" id="1" dur="indefinite" restart="never" nodeType="tmRoot"/>
+      </p:par>
+    </p:tnLst>
+  </p:timing>
 </p:sld>
 </file>
 
@@ -6479,7 +6671,7 @@
           <a:p>
             <a:r>
               <a:rPr lang="en-US" dirty="0" smtClean="0"/>
-              <a:t>Questions?</a:t>
+              <a:t>Q&amp;A</a:t>
             </a:r>
             <a:endParaRPr lang="en-US" dirty="0"/>
           </a:p>
@@ -6497,7 +6689,9 @@
         </p:nvSpPr>
         <p:spPr/>
         <p:txBody>
-          <a:bodyPr/>
+          <a:bodyPr>
+            <a:normAutofit lnSpcReduction="10000"/>
+          </a:bodyPr>
           <a:lstStyle/>
           <a:p>
             <a:endParaRPr lang="en-US" dirty="0" smtClean="0"/>
@@ -6518,6 +6712,24 @@
             <a:r>
               <a:rPr lang="en-US" dirty="0" smtClean="0"/>
               <a:t>@seanadkinson</a:t>
+            </a:r>
+          </a:p>
+          <a:p>
+            <a:r>
+              <a:rPr lang="en-US" dirty="0"/>
+              <a:t>https://</a:t>
+            </a:r>
+            <a:r>
+              <a:rPr lang="en-US" dirty="0" err="1"/>
+              <a:t>github.com</a:t>
+            </a:r>
+            <a:r>
+              <a:rPr lang="en-US" dirty="0"/>
+              <a:t>/seanadkinson/</a:t>
+            </a:r>
+            <a:r>
+              <a:rPr lang="en-US" dirty="0" err="1"/>
+              <a:t>pjug-webdriver</a:t>
             </a:r>
             <a:endParaRPr lang="en-US" dirty="0"/>
           </a:p>
@@ -6533,6 +6745,13 @@
   <p:clrMapOvr>
     <a:masterClrMapping/>
   </p:clrMapOvr>
+  <p:timing>
+    <p:tnLst>
+      <p:par>
+        <p:cTn xmlns:p14="http://schemas.microsoft.com/office/powerpoint/2010/main" id="1" dur="indefinite" restart="never" nodeType="tmRoot"/>
+      </p:par>
+    </p:tnLst>
+  </p:timing>
 </p:sld>
 </file>
 
@@ -6647,6 +6866,13 @@
   <p:clrMapOvr>
     <a:masterClrMapping/>
   </p:clrMapOvr>
+  <p:timing>
+    <p:tnLst>
+      <p:par>
+        <p:cTn xmlns:p14="http://schemas.microsoft.com/office/powerpoint/2010/main" id="1" dur="indefinite" restart="never" nodeType="tmRoot"/>
+      </p:par>
+    </p:tnLst>
+  </p:timing>
 </p:sld>
 </file>
 
@@ -6830,6 +7056,13 @@
   <p:clrMapOvr>
     <a:masterClrMapping/>
   </p:clrMapOvr>
+  <p:timing>
+    <p:tnLst>
+      <p:par>
+        <p:cTn xmlns:p14="http://schemas.microsoft.com/office/powerpoint/2010/main" id="1" dur="indefinite" restart="never" nodeType="tmRoot"/>
+      </p:par>
+    </p:tnLst>
+  </p:timing>
 </p:sld>
 </file>
 
@@ -6931,6 +7164,13 @@
   <p:clrMapOvr>
     <a:masterClrMapping/>
   </p:clrMapOvr>
+  <p:timing>
+    <p:tnLst>
+      <p:par>
+        <p:cTn xmlns:p14="http://schemas.microsoft.com/office/powerpoint/2010/main" id="1" dur="indefinite" restart="never" nodeType="tmRoot"/>
+      </p:par>
+    </p:tnLst>
+  </p:timing>
 </p:sld>
 </file>
 
@@ -7125,6 +7365,13 @@
   <p:clrMapOvr>
     <a:masterClrMapping/>
   </p:clrMapOvr>
+  <p:timing>
+    <p:tnLst>
+      <p:par>
+        <p:cTn xmlns:p14="http://schemas.microsoft.com/office/powerpoint/2010/main" id="1" dur="indefinite" restart="never" nodeType="tmRoot"/>
+      </p:par>
+    </p:tnLst>
+  </p:timing>
 </p:sld>
 </file>
 
@@ -7326,6 +7573,13 @@
   <p:clrMapOvr>
     <a:masterClrMapping/>
   </p:clrMapOvr>
+  <p:timing>
+    <p:tnLst>
+      <p:par>
+        <p:cTn xmlns:p14="http://schemas.microsoft.com/office/powerpoint/2010/main" id="1" dur="indefinite" restart="never" nodeType="tmRoot"/>
+      </p:par>
+    </p:tnLst>
+  </p:timing>
 </p:sld>
 </file>
 
@@ -7475,6 +7729,13 @@
   <p:clrMapOvr>
     <a:masterClrMapping/>
   </p:clrMapOvr>
+  <p:timing>
+    <p:tnLst>
+      <p:par>
+        <p:cTn xmlns:p14="http://schemas.microsoft.com/office/powerpoint/2010/main" id="1" dur="indefinite" restart="never" nodeType="tmRoot"/>
+      </p:par>
+    </p:tnLst>
+  </p:timing>
 </p:sld>
 </file>
 

</xml_diff>

<commit_message>
Added meetup example, and upgraded calagator example to use ThreadWebDriver
</commit_message>
<xml_diff>
--- a/slides.pptx
+++ b/slides.pptx
@@ -25,24 +25,27 @@
     <p:sldId id="291" r:id="rId19"/>
     <p:sldId id="292" r:id="rId20"/>
     <p:sldId id="279" r:id="rId21"/>
-    <p:sldId id="271" r:id="rId22"/>
-    <p:sldId id="272" r:id="rId23"/>
-    <p:sldId id="274" r:id="rId24"/>
-    <p:sldId id="289" r:id="rId25"/>
-    <p:sldId id="277" r:id="rId26"/>
-    <p:sldId id="290" r:id="rId27"/>
-    <p:sldId id="276" r:id="rId28"/>
-    <p:sldId id="278" r:id="rId29"/>
-    <p:sldId id="293" r:id="rId30"/>
-    <p:sldId id="294" r:id="rId31"/>
-    <p:sldId id="295" r:id="rId32"/>
-    <p:sldId id="296" r:id="rId33"/>
-    <p:sldId id="302" r:id="rId34"/>
-    <p:sldId id="297" r:id="rId35"/>
-    <p:sldId id="298" r:id="rId36"/>
-    <p:sldId id="299" r:id="rId37"/>
-    <p:sldId id="300" r:id="rId38"/>
-    <p:sldId id="303" r:id="rId39"/>
+    <p:sldId id="274" r:id="rId22"/>
+    <p:sldId id="304" r:id="rId23"/>
+    <p:sldId id="289" r:id="rId24"/>
+    <p:sldId id="277" r:id="rId25"/>
+    <p:sldId id="305" r:id="rId26"/>
+    <p:sldId id="306" r:id="rId27"/>
+    <p:sldId id="290" r:id="rId28"/>
+    <p:sldId id="276" r:id="rId29"/>
+    <p:sldId id="278" r:id="rId30"/>
+    <p:sldId id="293" r:id="rId31"/>
+    <p:sldId id="294" r:id="rId32"/>
+    <p:sldId id="295" r:id="rId33"/>
+    <p:sldId id="271" r:id="rId34"/>
+    <p:sldId id="272" r:id="rId35"/>
+    <p:sldId id="296" r:id="rId36"/>
+    <p:sldId id="302" r:id="rId37"/>
+    <p:sldId id="297" r:id="rId38"/>
+    <p:sldId id="298" r:id="rId39"/>
+    <p:sldId id="299" r:id="rId40"/>
+    <p:sldId id="300" r:id="rId41"/>
+    <p:sldId id="303" r:id="rId42"/>
   </p:sldIdLst>
   <p:sldSz cx="9144000" cy="6858000" type="screen4x3"/>
   <p:notesSz cx="6858000" cy="9144000"/>
@@ -2946,7 +2949,6 @@
               <a:rPr lang="en-US" sz="4000" dirty="0"/>
               <a:t> in Java</a:t>
             </a:r>
-            <a:endParaRPr lang="en-US" sz="4000" dirty="0"/>
           </a:p>
         </p:txBody>
       </p:sp>
@@ -3031,7 +3033,11 @@
             </a:pPr>
             <a:r>
               <a:rPr lang="en-US" dirty="0" smtClean="0"/>
-              <a:t>Google search for PJUG</a:t>
+              <a:t>Google search for </a:t>
+            </a:r>
+            <a:r>
+              <a:rPr lang="en-US" dirty="0" smtClean="0"/>
+              <a:t>PDX Selenium</a:t>
             </a:r>
             <a:endParaRPr lang="en-US" dirty="0"/>
           </a:p>
@@ -3177,7 +3183,11 @@
           <a:p>
             <a:r>
               <a:rPr lang="en-US" dirty="0" smtClean="0"/>
-              <a:t>Working Example</a:t>
+              <a:t>Better </a:t>
+            </a:r>
+            <a:r>
+              <a:rPr lang="en-US" dirty="0" smtClean="0"/>
+              <a:t>Example</a:t>
             </a:r>
             <a:endParaRPr lang="en-US" dirty="0"/>
           </a:p>
@@ -3204,16 +3214,13 @@
             </a:pPr>
             <a:r>
               <a:rPr lang="en-US" dirty="0" smtClean="0"/>
-              <a:t>Edit the tags of this </a:t>
+              <a:t>Check my RSVP status of next </a:t>
             </a:r>
             <a:r>
               <a:rPr lang="en-US" dirty="0" err="1" smtClean="0"/>
-              <a:t>calagator</a:t>
-            </a:r>
-            <a:r>
-              <a:rPr lang="en-US" dirty="0" smtClean="0"/>
-              <a:t> event</a:t>
-            </a:r>
+              <a:t>meetup</a:t>
+            </a:r>
+            <a:endParaRPr lang="en-US" dirty="0" smtClean="0"/>
           </a:p>
           <a:p>
             <a:pPr marL="342900" indent="-342900">
@@ -3223,26 +3230,6 @@
             <a:endParaRPr lang="en-US" dirty="0"/>
           </a:p>
           <a:p>
-            <a:r>
-              <a:rPr lang="en-US" dirty="0" smtClean="0"/>
-              <a:t>Why Work Through This?</a:t>
-            </a:r>
-          </a:p>
-          <a:p>
-            <a:pPr marL="342900" indent="-342900">
-              <a:buFont typeface="Arial"/>
-              <a:buChar char="•"/>
-            </a:pPr>
-            <a:r>
-              <a:rPr lang="en-US" dirty="0" smtClean="0"/>
-              <a:t>Process for finding elements is half the battle</a:t>
-            </a:r>
-          </a:p>
-          <a:p>
-            <a:pPr marL="342900" indent="-342900">
-              <a:buFont typeface="Arial"/>
-              <a:buChar char="•"/>
-            </a:pPr>
             <a:endParaRPr lang="en-US" dirty="0"/>
           </a:p>
         </p:txBody>
@@ -4211,8 +4198,13 @@
             </a:pPr>
             <a:r>
               <a:rPr lang="en-US" dirty="0" smtClean="0"/>
-              <a:t>Avoid selecting with common words like “Add” or “Edit”</a:t>
-            </a:r>
+              <a:t>Avoid selecting with common words like “Add” or “Edit</a:t>
+            </a:r>
+            <a:r>
+              <a:rPr lang="en-US" dirty="0" smtClean="0"/>
+              <a:t>”</a:t>
+            </a:r>
+            <a:endParaRPr lang="en-US" dirty="0" smtClean="0"/>
           </a:p>
           <a:p>
             <a:pPr marL="342900" indent="-342900">
@@ -4230,7 +4222,15 @@
           <a:p>
             <a:r>
               <a:rPr lang="en-US" dirty="0" smtClean="0"/>
-              <a:t>Jama uses a tool called Recess to enforce developers to NOT style ids or classes that being with “</a:t>
+              <a:t>Jama uses a tool called Recess to enforce developers to NOT style ids or classes that </a:t>
+            </a:r>
+            <a:r>
+              <a:rPr lang="en-US" dirty="0" smtClean="0"/>
+              <a:t>begin </a:t>
+            </a:r>
+            <a:r>
+              <a:rPr lang="en-US" dirty="0" smtClean="0"/>
+              <a:t>with “</a:t>
             </a:r>
             <a:r>
               <a:rPr lang="en-US" dirty="0" err="1" smtClean="0"/>
@@ -4665,9 +4665,14 @@
           <a:lstStyle/>
           <a:p>
             <a:r>
-              <a:rPr lang="en-US" dirty="0"/>
-              <a:t>Common Criticisms</a:t>
-            </a:r>
+              <a:rPr lang="en-US" dirty="0" err="1" smtClean="0"/>
+              <a:t>PageObject</a:t>
+            </a:r>
+            <a:r>
+              <a:rPr lang="en-US" dirty="0" smtClean="0"/>
+              <a:t> Pattern</a:t>
+            </a:r>
+            <a:endParaRPr lang="en-US" dirty="0"/>
           </a:p>
         </p:txBody>
       </p:sp>
@@ -4683,7 +4688,9 @@
         </p:nvSpPr>
         <p:spPr/>
         <p:txBody>
-          <a:bodyPr/>
+          <a:bodyPr>
+            <a:normAutofit/>
+          </a:bodyPr>
           <a:lstStyle/>
           <a:p>
             <a:pPr marL="342900" indent="-342900">
@@ -4691,26 +4698,17 @@
               <a:buChar char="•"/>
             </a:pPr>
             <a:r>
-              <a:rPr lang="en-US" dirty="0" smtClean="0"/>
-              <a:t>Fragile Tests</a:t>
-            </a:r>
-          </a:p>
-          <a:p>
-            <a:pPr marL="800100" lvl="1" indent="-342900">
-              <a:buFont typeface="Arial"/>
-              <a:buChar char="•"/>
-            </a:pPr>
-            <a:r>
-              <a:rPr lang="en-US" sz="2000" dirty="0" smtClean="0"/>
-              <a:t>Tests fail whenever anything changes</a:t>
-            </a:r>
-          </a:p>
-          <a:p>
-            <a:pPr marL="800100" lvl="1" indent="-342900">
-              <a:buFont typeface="Arial"/>
-              <a:buChar char="•"/>
-            </a:pPr>
-            <a:endParaRPr lang="en-US" sz="2000" dirty="0" smtClean="0"/>
+              <a:rPr lang="en-US" sz="3200" dirty="0"/>
+              <a:t>Pages </a:t>
+            </a:r>
+            <a:r>
+              <a:rPr lang="en-US" sz="3200" dirty="0" smtClean="0"/>
+              <a:t>may know how </a:t>
+            </a:r>
+            <a:r>
+              <a:rPr lang="en-US" sz="3200" dirty="0"/>
+              <a:t>to get to themselves</a:t>
+            </a:r>
           </a:p>
           <a:p>
             <a:pPr marL="342900" indent="-342900">
@@ -4718,26 +4716,9 @@
               <a:buChar char="•"/>
             </a:pPr>
             <a:r>
-              <a:rPr lang="en-US" dirty="0" smtClean="0"/>
-              <a:t>Too many false test failures</a:t>
-            </a:r>
-          </a:p>
-          <a:p>
-            <a:pPr marL="800100" lvl="1" indent="-342900">
-              <a:buFont typeface="Arial"/>
-              <a:buChar char="•"/>
-            </a:pPr>
-            <a:r>
-              <a:rPr lang="en-US" sz="2000" dirty="0" smtClean="0"/>
-              <a:t>Tests fail sometimes, but pass other times</a:t>
-            </a:r>
-          </a:p>
-          <a:p>
-            <a:pPr marL="800100" lvl="1" indent="-342900">
-              <a:buFont typeface="Arial"/>
-              <a:buChar char="•"/>
-            </a:pPr>
-            <a:endParaRPr lang="en-US" sz="2000" dirty="0" smtClean="0"/>
+              <a:rPr lang="en-US" sz="3200" dirty="0"/>
+              <a:t>Provides an API to interact with the page</a:t>
+            </a:r>
           </a:p>
           <a:p>
             <a:pPr marL="342900" indent="-342900">
@@ -4745,26 +4726,9 @@
               <a:buChar char="•"/>
             </a:pPr>
             <a:r>
-              <a:rPr lang="en-US" dirty="0" smtClean="0"/>
-              <a:t>Too hard to update tests with changes</a:t>
-            </a:r>
-          </a:p>
-          <a:p>
-            <a:pPr marL="800100" lvl="1" indent="-342900">
-              <a:buFont typeface="Arial"/>
-              <a:buChar char="•"/>
-            </a:pPr>
-            <a:r>
-              <a:rPr lang="en-US" sz="2000" dirty="0" smtClean="0"/>
-              <a:t>Change a CSS class, need tons of test updates</a:t>
-            </a:r>
-          </a:p>
-          <a:p>
-            <a:pPr marL="800100" lvl="1" indent="-342900">
-              <a:buFont typeface="Arial"/>
-              <a:buChar char="•"/>
-            </a:pPr>
-            <a:endParaRPr lang="en-US" sz="2000" dirty="0"/>
+              <a:rPr lang="en-US" sz="3200" dirty="0"/>
+              <a:t>Hides the underlying HTML details</a:t>
+            </a:r>
           </a:p>
           <a:p>
             <a:pPr marL="342900" indent="-342900">
@@ -4772,17 +4736,34 @@
               <a:buChar char="•"/>
             </a:pPr>
             <a:r>
-              <a:rPr lang="en-US" dirty="0" smtClean="0"/>
-              <a:t>AJAX apps require “sleeps” to make work</a:t>
-            </a:r>
-            <a:endParaRPr lang="en-US" dirty="0"/>
+              <a:rPr lang="en-US" sz="3200" dirty="0"/>
+              <a:t>Can make assertions about the </a:t>
+            </a:r>
+            <a:r>
+              <a:rPr lang="en-US" sz="3200" dirty="0" smtClean="0"/>
+              <a:t>state before returning from any given method</a:t>
+            </a:r>
+            <a:endParaRPr lang="en-US" sz="3200" dirty="0"/>
+          </a:p>
+          <a:p>
+            <a:pPr marL="342900" indent="-342900">
+              <a:buFont typeface="Arial"/>
+              <a:buChar char="•"/>
+            </a:pPr>
+            <a:r>
+              <a:rPr lang="en-US" sz="3200" dirty="0"/>
+              <a:t>Methods can return other Page Objects, modeling the user navigating through the application</a:t>
+            </a:r>
+          </a:p>
+          <a:p>
+            <a:endParaRPr lang="en-US" sz="3200" dirty="0"/>
           </a:p>
         </p:txBody>
       </p:sp>
     </p:spTree>
     <p:extLst>
       <p:ext uri="{BB962C8B-B14F-4D97-AF65-F5344CB8AC3E}">
-        <p14:creationId xmlns:p14="http://schemas.microsoft.com/office/powerpoint/2010/main" val="567283378"/>
+        <p14:creationId xmlns:p14="http://schemas.microsoft.com/office/powerpoint/2010/main" val="3823223692"/>
       </p:ext>
     </p:extLst>
   </p:cSld>
@@ -4828,114 +4809,46 @@
         </p:nvSpPr>
         <p:spPr/>
         <p:txBody>
-          <a:bodyPr>
-            <a:normAutofit/>
-          </a:bodyPr>
+          <a:bodyPr/>
           <a:lstStyle/>
           <a:p>
             <a:r>
-              <a:rPr lang="en-US" sz="4000" dirty="0" smtClean="0"/>
-              <a:t>Design To Protect Your Code</a:t>
-            </a:r>
-            <a:endParaRPr lang="en-US" sz="4000" dirty="0"/>
-          </a:p>
-        </p:txBody>
-      </p:sp>
-      <p:sp>
-        <p:nvSpPr>
-          <p:cNvPr id="3" name="Content Placeholder 2"/>
-          <p:cNvSpPr>
-            <a:spLocks noGrp="1"/>
-          </p:cNvSpPr>
+              <a:rPr lang="en-US" dirty="0" smtClean="0"/>
+              <a:t>Page Interface</a:t>
+            </a:r>
+            <a:endParaRPr lang="en-US" dirty="0"/>
+          </a:p>
+        </p:txBody>
+      </p:sp>
+      <p:pic>
+        <p:nvPicPr>
+          <p:cNvPr id="6" name="Content Placeholder 5"/>
+          <p:cNvPicPr>
+            <a:picLocks noGrp="1" noChangeAspect="1"/>
+          </p:cNvPicPr>
           <p:nvPr>
             <p:ph idx="1"/>
           </p:nvPr>
-        </p:nvSpPr>
+        </p:nvPicPr>
+        <p:blipFill>
+          <a:blip r:embed="rId2"/>
+          <a:srcRect l="-698" r="-698"/>
+          <a:stretch>
+            <a:fillRect/>
+          </a:stretch>
+        </p:blipFill>
         <p:spPr/>
-        <p:txBody>
-          <a:bodyPr>
-            <a:normAutofit/>
-          </a:bodyPr>
-          <a:lstStyle/>
-          <a:p>
-            <a:pPr marL="342900" indent="-342900">
-              <a:buFont typeface="Arial"/>
-              <a:buChar char="•"/>
-            </a:pPr>
-            <a:r>
-              <a:rPr lang="en-US" sz="3200" dirty="0" smtClean="0"/>
-              <a:t>Tests should interact with objects, not the page</a:t>
-            </a:r>
-          </a:p>
-          <a:p>
-            <a:pPr marL="800100" lvl="1" indent="-342900">
-              <a:buFont typeface="Arial"/>
-              <a:buChar char="•"/>
-            </a:pPr>
-            <a:r>
-              <a:rPr lang="en-US" sz="2800" dirty="0" smtClean="0"/>
-              <a:t>Avoid any selectors in your tests</a:t>
-            </a:r>
-          </a:p>
-          <a:p>
-            <a:pPr marL="800100" lvl="1" indent="-342900">
-              <a:buFont typeface="Arial"/>
-              <a:buChar char="•"/>
-            </a:pPr>
-            <a:r>
-              <a:rPr lang="en-US" sz="2800" dirty="0" smtClean="0"/>
-              <a:t>Keep logic hidden under your API</a:t>
-            </a:r>
-          </a:p>
-          <a:p>
-            <a:pPr marL="342900" indent="-342900">
-              <a:buFont typeface="Arial"/>
-              <a:buChar char="•"/>
-            </a:pPr>
-            <a:r>
-              <a:rPr lang="en-US" sz="3200" dirty="0" smtClean="0"/>
-              <a:t>Reuse code as much as possible</a:t>
-            </a:r>
-          </a:p>
-          <a:p>
-            <a:pPr marL="800100" lvl="1" indent="-342900">
-              <a:buFont typeface="Arial"/>
-              <a:buChar char="•"/>
-            </a:pPr>
-            <a:r>
-              <a:rPr lang="en-US" sz="2800" dirty="0" smtClean="0"/>
-              <a:t>Write your API so that it can be reused in other tests</a:t>
-            </a:r>
-          </a:p>
-          <a:p>
-            <a:pPr marL="342900" indent="-342900">
-              <a:buFont typeface="Arial"/>
-              <a:buChar char="•"/>
-            </a:pPr>
-            <a:r>
-              <a:rPr lang="en-US" sz="2800" dirty="0" smtClean="0"/>
-              <a:t>Assert the state of the page regularly</a:t>
-            </a:r>
-          </a:p>
-        </p:txBody>
-      </p:sp>
+      </p:pic>
     </p:spTree>
     <p:extLst>
       <p:ext uri="{BB962C8B-B14F-4D97-AF65-F5344CB8AC3E}">
-        <p14:creationId xmlns:p14="http://schemas.microsoft.com/office/powerpoint/2010/main" val="2197418565"/>
+        <p14:creationId xmlns:p14="http://schemas.microsoft.com/office/powerpoint/2010/main" val="405127487"/>
       </p:ext>
     </p:extLst>
   </p:cSld>
   <p:clrMapOvr>
     <a:masterClrMapping/>
   </p:clrMapOvr>
-  <p:timing>
-    <p:tnLst>
-      <p:par>
-        <p:cTn xmlns:p14="http://schemas.microsoft.com/office/powerpoint/2010/main" id="1" dur="indefinite" restart="never" nodeType="tmRoot"/>
-      </p:par>
-    </p:tnLst>
-  </p:timing>
 </p:sld>
 </file>
 
@@ -4972,105 +4885,42 @@
           <a:lstStyle/>
           <a:p>
             <a:r>
+              <a:rPr lang="en-US" dirty="0" smtClean="0"/>
+              <a:t>Real </a:t>
+            </a:r>
+            <a:r>
               <a:rPr lang="en-US" dirty="0" err="1" smtClean="0"/>
               <a:t>PageObject</a:t>
             </a:r>
             <a:r>
               <a:rPr lang="en-US" dirty="0" smtClean="0"/>
-              <a:t> Pattern</a:t>
+              <a:t> from Jama</a:t>
             </a:r>
             <a:endParaRPr lang="en-US" dirty="0"/>
           </a:p>
         </p:txBody>
       </p:sp>
-      <p:sp>
-        <p:nvSpPr>
-          <p:cNvPr id="3" name="Content Placeholder 2"/>
-          <p:cNvSpPr>
-            <a:spLocks noGrp="1"/>
-          </p:cNvSpPr>
+      <p:pic>
+        <p:nvPicPr>
+          <p:cNvPr id="4" name="Content Placeholder 3"/>
+          <p:cNvPicPr>
+            <a:picLocks noGrp="1" noChangeAspect="1"/>
+          </p:cNvPicPr>
           <p:nvPr>
             <p:ph idx="1"/>
           </p:nvPr>
-        </p:nvSpPr>
+        </p:nvPicPr>
+        <p:blipFill rotWithShape="1">
+          <a:blip r:embed="rId2"/>
+          <a:srcRect t="1" b="-47070"/>
+          <a:stretch/>
+        </p:blipFill>
         <p:spPr/>
-        <p:txBody>
-          <a:bodyPr>
-            <a:normAutofit/>
-          </a:bodyPr>
-          <a:lstStyle/>
-          <a:p>
-            <a:pPr marL="342900" indent="-342900">
-              <a:buFont typeface="Arial"/>
-              <a:buChar char="•"/>
-            </a:pPr>
-            <a:r>
-              <a:rPr lang="en-US" sz="3200" dirty="0"/>
-              <a:t>Pages </a:t>
-            </a:r>
-            <a:r>
-              <a:rPr lang="en-US" sz="3200" dirty="0" smtClean="0"/>
-              <a:t>may know how </a:t>
-            </a:r>
-            <a:r>
-              <a:rPr lang="en-US" sz="3200" dirty="0"/>
-              <a:t>to get to themselves</a:t>
-            </a:r>
-          </a:p>
-          <a:p>
-            <a:pPr marL="342900" indent="-342900">
-              <a:buFont typeface="Arial"/>
-              <a:buChar char="•"/>
-            </a:pPr>
-            <a:r>
-              <a:rPr lang="en-US" sz="3200" dirty="0"/>
-              <a:t>Provides an API to interact with the page</a:t>
-            </a:r>
-          </a:p>
-          <a:p>
-            <a:pPr marL="342900" indent="-342900">
-              <a:buFont typeface="Arial"/>
-              <a:buChar char="•"/>
-            </a:pPr>
-            <a:r>
-              <a:rPr lang="en-US" sz="3200" dirty="0"/>
-              <a:t>Hides the underlying HTML details</a:t>
-            </a:r>
-          </a:p>
-          <a:p>
-            <a:pPr marL="342900" indent="-342900">
-              <a:buFont typeface="Arial"/>
-              <a:buChar char="•"/>
-            </a:pPr>
-            <a:r>
-              <a:rPr lang="en-US" sz="3200" dirty="0"/>
-              <a:t>Can make assertions about the </a:t>
-            </a:r>
-            <a:r>
-              <a:rPr lang="en-US" sz="3200" dirty="0" smtClean="0"/>
-              <a:t>state before returning from any given method</a:t>
-            </a:r>
-            <a:endParaRPr lang="en-US" sz="3200" dirty="0"/>
-          </a:p>
-          <a:p>
-            <a:pPr marL="342900" indent="-342900">
-              <a:buFont typeface="Arial"/>
-              <a:buChar char="•"/>
-            </a:pPr>
-            <a:r>
-              <a:rPr lang="en-US" sz="3200" dirty="0"/>
-              <a:t>Methods can return other Page Objects, modeling the user navigating through the application</a:t>
-            </a:r>
-          </a:p>
-          <a:p>
-            <a:endParaRPr lang="en-US" sz="3200" dirty="0"/>
-          </a:p>
-        </p:txBody>
-      </p:sp>
+      </p:pic>
     </p:spTree>
     <p:extLst>
       <p:ext uri="{BB962C8B-B14F-4D97-AF65-F5344CB8AC3E}">
-        <p14:creationId xmlns:p14="http://schemas.microsoft.com/office/powerpoint/2010/main" val="3823223692"/>
+        <p14:creationId xmlns:p14="http://schemas.microsoft.com/office/powerpoint/2010/main" val="1761359205"/>
       </p:ext>
     </p:extLst>
   </p:cSld>
@@ -5120,42 +4970,105 @@
           <a:lstStyle/>
           <a:p>
             <a:r>
-              <a:rPr lang="en-US" dirty="0" smtClean="0"/>
-              <a:t>Real </a:t>
-            </a:r>
-            <a:r>
               <a:rPr lang="en-US" dirty="0" err="1" smtClean="0"/>
+              <a:t>PageElement</a:t>
+            </a:r>
+            <a:r>
+              <a:rPr lang="en-US" dirty="0" smtClean="0"/>
+              <a:t> Pattern</a:t>
+            </a:r>
+            <a:endParaRPr lang="en-US" dirty="0"/>
+          </a:p>
+        </p:txBody>
+      </p:sp>
+      <p:sp>
+        <p:nvSpPr>
+          <p:cNvPr id="3" name="Content Placeholder 2"/>
+          <p:cNvSpPr>
+            <a:spLocks noGrp="1"/>
+          </p:cNvSpPr>
+          <p:nvPr>
+            <p:ph idx="1"/>
+          </p:nvPr>
+        </p:nvSpPr>
+        <p:spPr/>
+        <p:txBody>
+          <a:bodyPr>
+            <a:normAutofit/>
+          </a:bodyPr>
+          <a:lstStyle/>
+          <a:p>
+            <a:pPr marL="342900" indent="-342900">
+              <a:buFont typeface="Arial"/>
+              <a:buChar char="•"/>
+            </a:pPr>
+            <a:r>
+              <a:rPr lang="en-US" sz="3200" dirty="0"/>
+              <a:t>For complex pages, divide logical areas into </a:t>
+            </a:r>
+            <a:r>
+              <a:rPr lang="en-US" sz="3200" dirty="0" err="1"/>
+              <a:t>PageElement</a:t>
+            </a:r>
+            <a:r>
+              <a:rPr lang="en-US" sz="3200" dirty="0"/>
+              <a:t> classes</a:t>
+            </a:r>
+          </a:p>
+          <a:p>
+            <a:pPr marL="342900" indent="-342900">
+              <a:buFont typeface="Arial"/>
+              <a:buChar char="•"/>
+            </a:pPr>
+            <a:r>
+              <a:rPr lang="en-US" sz="3200" dirty="0" err="1"/>
+              <a:t>PageElements</a:t>
+            </a:r>
+            <a:r>
+              <a:rPr lang="en-US" sz="3200" dirty="0"/>
+              <a:t> are like </a:t>
+            </a:r>
+            <a:r>
+              <a:rPr lang="en-US" sz="3200" dirty="0" err="1"/>
+              <a:t>PageObjects</a:t>
+            </a:r>
+            <a:r>
+              <a:rPr lang="en-US" sz="3200" dirty="0"/>
+              <a:t>, hiding implementation details, but the only contract is that they have a root element</a:t>
+            </a:r>
+          </a:p>
+          <a:p>
+            <a:pPr marL="342900" indent="-342900">
+              <a:buFont typeface="Arial"/>
+              <a:buChar char="•"/>
+            </a:pPr>
+            <a:r>
+              <a:rPr lang="en-US" sz="3200" dirty="0"/>
+              <a:t>“Navigate” to </a:t>
+            </a:r>
+            <a:r>
+              <a:rPr lang="en-US" sz="3200" dirty="0" err="1"/>
+              <a:t>PageElements</a:t>
+            </a:r>
+            <a:r>
+              <a:rPr lang="en-US" sz="3200" dirty="0"/>
+              <a:t> like you would a </a:t>
+            </a:r>
+            <a:r>
+              <a:rPr lang="en-US" sz="3200" dirty="0" err="1"/>
               <a:t>PageObject</a:t>
             </a:r>
-            <a:r>
-              <a:rPr lang="en-US" dirty="0" smtClean="0"/>
-              <a:t> from Jama</a:t>
-            </a:r>
-            <a:endParaRPr lang="en-US" dirty="0"/>
-          </a:p>
-        </p:txBody>
-      </p:sp>
-      <p:pic>
-        <p:nvPicPr>
-          <p:cNvPr id="4" name="Content Placeholder 3"/>
-          <p:cNvPicPr>
-            <a:picLocks noGrp="1" noChangeAspect="1"/>
-          </p:cNvPicPr>
-          <p:nvPr>
-            <p:ph idx="1"/>
-          </p:nvPr>
-        </p:nvPicPr>
-        <p:blipFill rotWithShape="1">
-          <a:blip r:embed="rId2"/>
-          <a:srcRect t="1" b="-47070"/>
-          <a:stretch/>
-        </p:blipFill>
-        <p:spPr/>
-      </p:pic>
+            <a:endParaRPr lang="en-US" sz="3200" dirty="0"/>
+          </a:p>
+          <a:p>
+            <a:endParaRPr lang="en-US" sz="3200" dirty="0"/>
+          </a:p>
+        </p:txBody>
+      </p:sp>
     </p:spTree>
     <p:extLst>
       <p:ext uri="{BB962C8B-B14F-4D97-AF65-F5344CB8AC3E}">
-        <p14:creationId xmlns:p14="http://schemas.microsoft.com/office/powerpoint/2010/main" val="1761359205"/>
+        <p14:creationId xmlns:p14="http://schemas.microsoft.com/office/powerpoint/2010/main" val="912248047"/>
       </p:ext>
     </p:extLst>
   </p:cSld>
@@ -5210,113 +5123,46 @@
             </a:r>
             <a:r>
               <a:rPr lang="en-US" dirty="0" smtClean="0"/>
-              <a:t> Pattern</a:t>
+              <a:t> Interface</a:t>
             </a:r>
             <a:endParaRPr lang="en-US" dirty="0"/>
           </a:p>
         </p:txBody>
       </p:sp>
-      <p:sp>
-        <p:nvSpPr>
-          <p:cNvPr id="3" name="Content Placeholder 2"/>
-          <p:cNvSpPr>
-            <a:spLocks noGrp="1"/>
-          </p:cNvSpPr>
+      <p:pic>
+        <p:nvPicPr>
+          <p:cNvPr id="8" name="Content Placeholder 7"/>
+          <p:cNvPicPr>
+            <a:picLocks noGrp="1" noChangeAspect="1"/>
+          </p:cNvPicPr>
           <p:nvPr>
             <p:ph idx="1"/>
           </p:nvPr>
-        </p:nvSpPr>
-        <p:spPr/>
-        <p:txBody>
-          <a:bodyPr>
-            <a:normAutofit/>
-          </a:bodyPr>
-          <a:lstStyle/>
-          <a:p>
-            <a:pPr marL="342900" indent="-342900">
-              <a:buFont typeface="Arial"/>
-              <a:buChar char="•"/>
-            </a:pPr>
-            <a:r>
-              <a:rPr lang="en-US" sz="3200" dirty="0"/>
-              <a:t>For complex pages, divide logical areas into </a:t>
-            </a:r>
-            <a:r>
-              <a:rPr lang="en-US" sz="3200" dirty="0" err="1"/>
-              <a:t>PageElement</a:t>
-            </a:r>
-            <a:r>
-              <a:rPr lang="en-US" sz="3200" dirty="0"/>
-              <a:t> classes</a:t>
-            </a:r>
-          </a:p>
-          <a:p>
-            <a:pPr marL="342900" indent="-342900">
-              <a:buFont typeface="Arial"/>
-              <a:buChar char="•"/>
-            </a:pPr>
-            <a:r>
-              <a:rPr lang="en-US" sz="3200" dirty="0" err="1"/>
-              <a:t>PageElements</a:t>
-            </a:r>
-            <a:r>
-              <a:rPr lang="en-US" sz="3200" dirty="0"/>
-              <a:t> are like </a:t>
-            </a:r>
-            <a:r>
-              <a:rPr lang="en-US" sz="3200" dirty="0" err="1"/>
-              <a:t>PageObjects</a:t>
-            </a:r>
-            <a:r>
-              <a:rPr lang="en-US" sz="3200" dirty="0"/>
-              <a:t>, hiding implementation details, but the only contract is that they have a root element</a:t>
-            </a:r>
-          </a:p>
-          <a:p>
-            <a:pPr marL="342900" indent="-342900">
-              <a:buFont typeface="Arial"/>
-              <a:buChar char="•"/>
-            </a:pPr>
-            <a:r>
-              <a:rPr lang="en-US" sz="3200" dirty="0"/>
-              <a:t>“Navigate” to </a:t>
-            </a:r>
-            <a:r>
-              <a:rPr lang="en-US" sz="3200" dirty="0" err="1"/>
-              <a:t>PageElements</a:t>
-            </a:r>
-            <a:r>
-              <a:rPr lang="en-US" sz="3200" dirty="0"/>
-              <a:t> like you would a </a:t>
-            </a:r>
-            <a:r>
-              <a:rPr lang="en-US" sz="3200" dirty="0" err="1"/>
-              <a:t>PageObject</a:t>
-            </a:r>
-            <a:endParaRPr lang="en-US" sz="3200" dirty="0"/>
-          </a:p>
-          <a:p>
-            <a:endParaRPr lang="en-US" sz="3200" dirty="0"/>
-          </a:p>
-        </p:txBody>
-      </p:sp>
+        </p:nvPicPr>
+        <p:blipFill>
+          <a:blip r:embed="rId2"/>
+          <a:srcRect t="-14862" b="-14862"/>
+          <a:stretch>
+            <a:fillRect/>
+          </a:stretch>
+        </p:blipFill>
+        <p:spPr>
+          <a:xfrm>
+            <a:off x="457200" y="871832"/>
+            <a:ext cx="8229600" cy="4708525"/>
+          </a:xfrm>
+        </p:spPr>
+      </p:pic>
     </p:spTree>
     <p:extLst>
       <p:ext uri="{BB962C8B-B14F-4D97-AF65-F5344CB8AC3E}">
-        <p14:creationId xmlns:p14="http://schemas.microsoft.com/office/powerpoint/2010/main" val="912248047"/>
+        <p14:creationId xmlns:p14="http://schemas.microsoft.com/office/powerpoint/2010/main" val="1718858287"/>
       </p:ext>
     </p:extLst>
   </p:cSld>
   <p:clrMapOvr>
     <a:masterClrMapping/>
   </p:clrMapOvr>
-  <p:timing>
-    <p:tnLst>
-      <p:par>
-        <p:cTn xmlns:p14="http://schemas.microsoft.com/office/powerpoint/2010/main" id="1" dur="indefinite" restart="never" nodeType="tmRoot"/>
-      </p:par>
-    </p:tnLst>
-  </p:timing>
 </p:sld>
 </file>
 
@@ -5362,7 +5208,7 @@
             </a:r>
             <a:r>
               <a:rPr lang="en-US" dirty="0" smtClean="0"/>
-              <a:t> from Jama</a:t>
+              <a:t> in Jama</a:t>
             </a:r>
             <a:endParaRPr lang="en-US" dirty="0"/>
           </a:p>
@@ -5370,7 +5216,7 @@
       </p:sp>
       <p:pic>
         <p:nvPicPr>
-          <p:cNvPr id="4" name="Content Placeholder 3"/>
+          <p:cNvPr id="6" name="Content Placeholder 5"/>
           <p:cNvPicPr>
             <a:picLocks noGrp="1" noChangeAspect="1"/>
           </p:cNvPicPr>
@@ -5378,34 +5224,30 @@
             <p:ph idx="1"/>
           </p:nvPr>
         </p:nvPicPr>
-        <p:blipFill rotWithShape="1">
+        <p:blipFill>
           <a:blip r:embed="rId2"/>
-          <a:srcRect b="-90840"/>
-          <a:stretch/>
+          <a:srcRect t="-13855" b="-13855"/>
+          <a:stretch>
+            <a:fillRect/>
+          </a:stretch>
         </p:blipFill>
         <p:spPr>
-          <a:prstGeom prst="rect">
-            <a:avLst/>
-          </a:prstGeom>
+          <a:xfrm>
+            <a:off x="457200" y="924314"/>
+            <a:ext cx="8229600" cy="4708525"/>
+          </a:xfrm>
         </p:spPr>
       </p:pic>
     </p:spTree>
     <p:extLst>
       <p:ext uri="{BB962C8B-B14F-4D97-AF65-F5344CB8AC3E}">
-        <p14:creationId xmlns:p14="http://schemas.microsoft.com/office/powerpoint/2010/main" val="1342240509"/>
+        <p14:creationId xmlns:p14="http://schemas.microsoft.com/office/powerpoint/2010/main" val="3628748324"/>
       </p:ext>
     </p:extLst>
   </p:cSld>
   <p:clrMapOvr>
     <a:masterClrMapping/>
   </p:clrMapOvr>
-  <p:timing>
-    <p:tnLst>
-      <p:par>
-        <p:cTn xmlns:p14="http://schemas.microsoft.com/office/powerpoint/2010/main" id="1" dur="indefinite" restart="never" nodeType="tmRoot"/>
-      </p:par>
-    </p:tnLst>
-  </p:timing>
 </p:sld>
 </file>
 
@@ -5442,60 +5284,46 @@
           <a:lstStyle/>
           <a:p>
             <a:r>
+              <a:rPr lang="en-US" dirty="0" smtClean="0"/>
+              <a:t>Get </a:t>
+            </a:r>
+            <a:r>
               <a:rPr lang="en-US" dirty="0" err="1" smtClean="0"/>
-              <a:t>Calagator</a:t>
-            </a:r>
-            <a:r>
-              <a:rPr lang="en-US" dirty="0" smtClean="0"/>
-              <a:t> Example - Better</a:t>
+              <a:t>PageElement</a:t>
+            </a:r>
+            <a:r>
+              <a:rPr lang="en-US" dirty="0" smtClean="0"/>
+              <a:t> from Page</a:t>
             </a:r>
             <a:endParaRPr lang="en-US" dirty="0"/>
           </a:p>
         </p:txBody>
       </p:sp>
-      <p:sp>
-        <p:nvSpPr>
-          <p:cNvPr id="3" name="Content Placeholder 2"/>
-          <p:cNvSpPr>
-            <a:spLocks noGrp="1"/>
-          </p:cNvSpPr>
+      <p:pic>
+        <p:nvPicPr>
+          <p:cNvPr id="4" name="Content Placeholder 3"/>
+          <p:cNvPicPr>
+            <a:picLocks noGrp="1" noChangeAspect="1"/>
+          </p:cNvPicPr>
           <p:nvPr>
             <p:ph idx="1"/>
           </p:nvPr>
-        </p:nvSpPr>
-        <p:spPr/>
-        <p:txBody>
-          <a:bodyPr/>
-          <a:lstStyle/>
-          <a:p>
-            <a:pPr marL="342900" indent="-342900">
-              <a:buFont typeface="Arial"/>
-              <a:buChar char="•"/>
-            </a:pPr>
-            <a:r>
-              <a:rPr lang="en-US" dirty="0" err="1" smtClean="0"/>
-              <a:t>Calagator</a:t>
-            </a:r>
-            <a:r>
-              <a:rPr lang="en-US" dirty="0" smtClean="0"/>
-              <a:t> example with </a:t>
-            </a:r>
-            <a:r>
-              <a:rPr lang="en-US" dirty="0" err="1" smtClean="0"/>
-              <a:t>PageObjects</a:t>
-            </a:r>
-            <a:r>
-              <a:rPr lang="en-US" dirty="0" smtClean="0"/>
-              <a:t>!</a:t>
-            </a:r>
-            <a:endParaRPr lang="en-US" dirty="0"/>
-          </a:p>
-        </p:txBody>
-      </p:sp>
+        </p:nvPicPr>
+        <p:blipFill rotWithShape="1">
+          <a:blip r:embed="rId2"/>
+          <a:srcRect b="-90840"/>
+          <a:stretch/>
+        </p:blipFill>
+        <p:spPr>
+          <a:prstGeom prst="rect">
+            <a:avLst/>
+          </a:prstGeom>
+        </p:spPr>
+      </p:pic>
     </p:spTree>
     <p:extLst>
       <p:ext uri="{BB962C8B-B14F-4D97-AF65-F5344CB8AC3E}">
-        <p14:creationId xmlns:p14="http://schemas.microsoft.com/office/powerpoint/2010/main" val="1214165765"/>
+        <p14:creationId xmlns:p14="http://schemas.microsoft.com/office/powerpoint/2010/main" val="1342240509"/>
       </p:ext>
     </p:extLst>
   </p:cSld>
@@ -5545,8 +5373,12 @@
           <a:lstStyle/>
           <a:p>
             <a:r>
-              <a:rPr lang="en-US" dirty="0" smtClean="0"/>
-              <a:t>Real Example Test</a:t>
+              <a:rPr lang="en-US" dirty="0" err="1" smtClean="0"/>
+              <a:t>Calagator</a:t>
+            </a:r>
+            <a:r>
+              <a:rPr lang="en-US" dirty="0" smtClean="0"/>
+              <a:t> Example - Better</a:t>
             </a:r>
             <a:endParaRPr lang="en-US" dirty="0"/>
           </a:p>
@@ -5572,16 +5404,20 @@
               <a:buChar char="•"/>
             </a:pPr>
             <a:r>
-              <a:rPr lang="en-US" dirty="0" smtClean="0"/>
-              <a:t>How we are using </a:t>
-            </a:r>
-            <a:r>
               <a:rPr lang="en-US" dirty="0" err="1" smtClean="0"/>
-              <a:t>WebDriver</a:t>
-            </a:r>
-            <a:r>
-              <a:rPr lang="en-US" dirty="0" smtClean="0"/>
-              <a:t> to test creation of a List</a:t>
+              <a:t>Calagator</a:t>
+            </a:r>
+            <a:r>
+              <a:rPr lang="en-US" dirty="0" smtClean="0"/>
+              <a:t> example with </a:t>
+            </a:r>
+            <a:r>
+              <a:rPr lang="en-US" dirty="0" err="1" smtClean="0"/>
+              <a:t>PageObjects</a:t>
+            </a:r>
+            <a:r>
+              <a:rPr lang="en-US" dirty="0" smtClean="0"/>
+              <a:t>!</a:t>
             </a:r>
             <a:endParaRPr lang="en-US" dirty="0"/>
           </a:p>
@@ -5590,7 +5426,7 @@
     </p:spTree>
     <p:extLst>
       <p:ext uri="{BB962C8B-B14F-4D97-AF65-F5344CB8AC3E}">
-        <p14:creationId xmlns:p14="http://schemas.microsoft.com/office/powerpoint/2010/main" val="3546473433"/>
+        <p14:creationId xmlns:p14="http://schemas.microsoft.com/office/powerpoint/2010/main" val="1214165765"/>
       </p:ext>
     </p:extLst>
   </p:cSld>
@@ -5641,7 +5477,42 @@
           <a:p>
             <a:r>
               <a:rPr lang="en-US" dirty="0" smtClean="0"/>
-              <a:t>Is It Really That Easy?</a:t>
+              <a:t>Real Example Test</a:t>
+            </a:r>
+            <a:endParaRPr lang="en-US" dirty="0"/>
+          </a:p>
+        </p:txBody>
+      </p:sp>
+      <p:sp>
+        <p:nvSpPr>
+          <p:cNvPr id="3" name="Content Placeholder 2"/>
+          <p:cNvSpPr>
+            <a:spLocks noGrp="1"/>
+          </p:cNvSpPr>
+          <p:nvPr>
+            <p:ph idx="1"/>
+          </p:nvPr>
+        </p:nvSpPr>
+        <p:spPr/>
+        <p:txBody>
+          <a:bodyPr/>
+          <a:lstStyle/>
+          <a:p>
+            <a:pPr marL="342900" indent="-342900">
+              <a:buFont typeface="Arial"/>
+              <a:buChar char="•"/>
+            </a:pPr>
+            <a:r>
+              <a:rPr lang="en-US" dirty="0" smtClean="0"/>
+              <a:t>How we are using </a:t>
+            </a:r>
+            <a:r>
+              <a:rPr lang="en-US" dirty="0" err="1" smtClean="0"/>
+              <a:t>WebDriver</a:t>
+            </a:r>
+            <a:r>
+              <a:rPr lang="en-US" dirty="0" smtClean="0"/>
+              <a:t> to test creation of a List</a:t>
             </a:r>
             <a:endParaRPr lang="en-US" dirty="0"/>
           </a:p>
@@ -5650,7 +5521,7 @@
     </p:spTree>
     <p:extLst>
       <p:ext uri="{BB962C8B-B14F-4D97-AF65-F5344CB8AC3E}">
-        <p14:creationId xmlns:p14="http://schemas.microsoft.com/office/powerpoint/2010/main" val="910431123"/>
+        <p14:creationId xmlns:p14="http://schemas.microsoft.com/office/powerpoint/2010/main" val="3546473433"/>
       </p:ext>
     </p:extLst>
   </p:cSld>
@@ -5765,44 +5636,16 @@
           <a:p>
             <a:r>
               <a:rPr lang="en-US" dirty="0" smtClean="0"/>
-              <a:t>No, Not Always!</a:t>
+              <a:t>Is It Really That Easy?</a:t>
             </a:r>
             <a:endParaRPr lang="en-US" dirty="0"/>
-          </a:p>
-        </p:txBody>
-      </p:sp>
-      <p:sp>
-        <p:nvSpPr>
-          <p:cNvPr id="3" name="Content Placeholder 2"/>
-          <p:cNvSpPr>
-            <a:spLocks noGrp="1"/>
-          </p:cNvSpPr>
-          <p:nvPr>
-            <p:ph idx="1"/>
-          </p:nvPr>
-        </p:nvSpPr>
-        <p:spPr/>
-        <p:txBody>
-          <a:bodyPr>
-            <a:normAutofit/>
-          </a:bodyPr>
-          <a:lstStyle/>
-          <a:p>
-            <a:pPr marL="342900" indent="-342900">
-              <a:buFont typeface="Arial"/>
-              <a:buChar char="•"/>
-            </a:pPr>
-            <a:r>
-              <a:rPr lang="en-US" dirty="0" smtClean="0"/>
-              <a:t>Debugging can be painful</a:t>
-            </a:r>
           </a:p>
         </p:txBody>
       </p:sp>
     </p:spTree>
     <p:extLst>
       <p:ext uri="{BB962C8B-B14F-4D97-AF65-F5344CB8AC3E}">
-        <p14:creationId xmlns:p14="http://schemas.microsoft.com/office/powerpoint/2010/main" val="1386286624"/>
+        <p14:creationId xmlns:p14="http://schemas.microsoft.com/office/powerpoint/2010/main" val="910431123"/>
       </p:ext>
     </p:extLst>
   </p:cSld>
@@ -5853,7 +5696,7 @@
           <a:p>
             <a:r>
               <a:rPr lang="en-US" dirty="0" smtClean="0"/>
-              <a:t>Some Things We Do</a:t>
+              <a:t>No, Not Always!</a:t>
             </a:r>
             <a:endParaRPr lang="en-US" dirty="0"/>
           </a:p>
@@ -5871,7 +5714,9 @@
         </p:nvSpPr>
         <p:spPr/>
         <p:txBody>
-          <a:bodyPr/>
+          <a:bodyPr>
+            <a:normAutofit/>
+          </a:bodyPr>
           <a:lstStyle/>
           <a:p>
             <a:pPr marL="342900" indent="-342900">
@@ -5879,98 +5724,16 @@
               <a:buChar char="•"/>
             </a:pPr>
             <a:r>
-              <a:rPr lang="en-US" dirty="0"/>
-              <a:t>Known dataset to test </a:t>
-            </a:r>
-            <a:r>
-              <a:rPr lang="en-US" dirty="0" smtClean="0"/>
-              <a:t>against</a:t>
-            </a:r>
-          </a:p>
-          <a:p>
-            <a:pPr marL="800100" lvl="1" indent="-342900">
-              <a:buFont typeface="Arial"/>
-              <a:buChar char="•"/>
-            </a:pPr>
-            <a:r>
-              <a:rPr lang="en-US" dirty="0" smtClean="0"/>
-              <a:t>Easier </a:t>
-            </a:r>
-            <a:r>
-              <a:rPr lang="en-US" dirty="0"/>
-              <a:t>to create complex </a:t>
-            </a:r>
-            <a:r>
-              <a:rPr lang="en-US" dirty="0" smtClean="0"/>
-              <a:t>scenarios</a:t>
-            </a:r>
-            <a:endParaRPr lang="en-US" dirty="0"/>
-          </a:p>
-          <a:p>
-            <a:pPr marL="342900" indent="-342900">
-              <a:buFont typeface="Arial"/>
-              <a:buChar char="•"/>
-            </a:pPr>
-            <a:r>
-              <a:rPr lang="en-US" dirty="0"/>
-              <a:t>Using Chef, a server is completely wiped and re-installed before tests begin</a:t>
-            </a:r>
-          </a:p>
-          <a:p>
-            <a:pPr marL="342900" indent="-342900">
-              <a:buFont typeface="Arial"/>
-              <a:buChar char="•"/>
-            </a:pPr>
-            <a:r>
-              <a:rPr lang="en-US" dirty="0" smtClean="0"/>
-              <a:t>Take a screenshot </a:t>
-            </a:r>
-            <a:r>
-              <a:rPr lang="en-US" dirty="0"/>
-              <a:t>after every </a:t>
-            </a:r>
-            <a:r>
-              <a:rPr lang="en-US" dirty="0" smtClean="0"/>
-              <a:t>test</a:t>
-            </a:r>
-          </a:p>
-          <a:p>
-            <a:pPr marL="342900" indent="-342900">
-              <a:buFont typeface="Arial"/>
-              <a:buChar char="•"/>
-            </a:pPr>
-            <a:r>
-              <a:rPr lang="en-US" dirty="0" smtClean="0"/>
-              <a:t>CI runs </a:t>
-            </a:r>
-            <a:r>
-              <a:rPr lang="en-US" dirty="0" err="1" smtClean="0"/>
-              <a:t>WebDriver</a:t>
-            </a:r>
-            <a:r>
-              <a:rPr lang="en-US" dirty="0" smtClean="0"/>
-              <a:t> on a VNC display</a:t>
-            </a:r>
-          </a:p>
-          <a:p>
-            <a:pPr marL="800100" lvl="1" indent="-342900">
-              <a:buFont typeface="Arial"/>
-              <a:buChar char="•"/>
-            </a:pPr>
-            <a:r>
-              <a:rPr lang="en-US" dirty="0" smtClean="0"/>
-              <a:t>Maybe we can see one right now</a:t>
-            </a:r>
-          </a:p>
-          <a:p>
-            <a:endParaRPr lang="en-US" dirty="0"/>
+              <a:rPr lang="en-US" dirty="0" smtClean="0"/>
+              <a:t>Debugging can be painful</a:t>
+            </a:r>
           </a:p>
         </p:txBody>
       </p:sp>
     </p:spTree>
     <p:extLst>
       <p:ext uri="{BB962C8B-B14F-4D97-AF65-F5344CB8AC3E}">
-        <p14:creationId xmlns:p14="http://schemas.microsoft.com/office/powerpoint/2010/main" val="2732409279"/>
+        <p14:creationId xmlns:p14="http://schemas.microsoft.com/office/powerpoint/2010/main" val="1386286624"/>
       </p:ext>
     </p:extLst>
   </p:cSld>
@@ -6021,7 +5784,7 @@
           <a:p>
             <a:r>
               <a:rPr lang="en-US" dirty="0" smtClean="0"/>
-              <a:t>Other Ideas</a:t>
+              <a:t>Some Things We Do</a:t>
             </a:r>
             <a:endParaRPr lang="en-US" dirty="0"/>
           </a:p>
@@ -6048,8 +5811,31 @@
             </a:pPr>
             <a:r>
               <a:rPr lang="en-US" dirty="0"/>
-              <a:t>Record VNC</a:t>
-            </a:r>
+              <a:t>Known dataset to test </a:t>
+            </a:r>
+            <a:r>
+              <a:rPr lang="en-US" dirty="0" smtClean="0"/>
+              <a:t>against</a:t>
+            </a:r>
+          </a:p>
+          <a:p>
+            <a:pPr marL="800100" lvl="1" indent="-342900">
+              <a:buFont typeface="Arial"/>
+              <a:buChar char="•"/>
+            </a:pPr>
+            <a:r>
+              <a:rPr lang="en-US" dirty="0" smtClean="0"/>
+              <a:t>Easier </a:t>
+            </a:r>
+            <a:r>
+              <a:rPr lang="en-US" dirty="0"/>
+              <a:t>to create complex </a:t>
+            </a:r>
+            <a:r>
+              <a:rPr lang="en-US" dirty="0" smtClean="0"/>
+              <a:t>scenarios</a:t>
+            </a:r>
+            <a:endParaRPr lang="en-US" dirty="0"/>
           </a:p>
           <a:p>
             <a:pPr marL="342900" indent="-342900">
@@ -6058,7 +5844,53 @@
             </a:pPr>
             <a:r>
               <a:rPr lang="en-US" dirty="0"/>
-              <a:t>Display currently running action on the screen</a:t>
+              <a:t>Using Chef, a server is completely wiped and re-installed before tests begin</a:t>
+            </a:r>
+          </a:p>
+          <a:p>
+            <a:pPr marL="342900" indent="-342900">
+              <a:buFont typeface="Arial"/>
+              <a:buChar char="•"/>
+            </a:pPr>
+            <a:r>
+              <a:rPr lang="en-US" dirty="0" smtClean="0"/>
+              <a:t>Take a screenshot </a:t>
+            </a:r>
+            <a:r>
+              <a:rPr lang="en-US" dirty="0"/>
+              <a:t>after every </a:t>
+            </a:r>
+            <a:r>
+              <a:rPr lang="en-US" dirty="0" smtClean="0"/>
+              <a:t>test</a:t>
+            </a:r>
+          </a:p>
+          <a:p>
+            <a:pPr marL="342900" indent="-342900">
+              <a:buFont typeface="Arial"/>
+              <a:buChar char="•"/>
+            </a:pPr>
+            <a:r>
+              <a:rPr lang="en-US" dirty="0" smtClean="0"/>
+              <a:t>CI runs </a:t>
+            </a:r>
+            <a:r>
+              <a:rPr lang="en-US" dirty="0" err="1" smtClean="0"/>
+              <a:t>WebDriver</a:t>
+            </a:r>
+            <a:r>
+              <a:rPr lang="en-US" dirty="0" smtClean="0"/>
+              <a:t> on a VNC display</a:t>
+            </a:r>
+          </a:p>
+          <a:p>
+            <a:pPr marL="800100" lvl="1" indent="-342900">
+              <a:buFont typeface="Arial"/>
+              <a:buChar char="•"/>
+            </a:pPr>
+            <a:r>
+              <a:rPr lang="en-US" dirty="0" smtClean="0"/>
+              <a:t>Maybe we can see one right now</a:t>
             </a:r>
           </a:p>
           <a:p>
@@ -6069,7 +5901,7 @@
     </p:spTree>
     <p:extLst>
       <p:ext uri="{BB962C8B-B14F-4D97-AF65-F5344CB8AC3E}">
-        <p14:creationId xmlns:p14="http://schemas.microsoft.com/office/powerpoint/2010/main" val="28341907"/>
+        <p14:creationId xmlns:p14="http://schemas.microsoft.com/office/powerpoint/2010/main" val="2732409279"/>
       </p:ext>
     </p:extLst>
   </p:cSld>
@@ -6119,10 +5951,9 @@
           <a:lstStyle/>
           <a:p>
             <a:r>
-              <a:rPr lang="en-US" dirty="0" smtClean="0"/>
-              <a:t>Main Things To Remember</a:t>
-            </a:r>
-            <a:endParaRPr lang="en-US" dirty="0"/>
+              <a:rPr lang="en-US" dirty="0"/>
+              <a:t>Common Criticisms</a:t>
+            </a:r>
           </a:p>
         </p:txBody>
       </p:sp>
@@ -6147,7 +5978,7 @@
             </a:pPr>
             <a:r>
               <a:rPr lang="en-US" dirty="0" smtClean="0"/>
-              <a:t>No selectors in the test</a:t>
+              <a:t>Fragile Tests</a:t>
             </a:r>
           </a:p>
           <a:p>
@@ -6156,22 +5987,16 @@
               <a:buChar char="•"/>
             </a:pPr>
             <a:r>
-              <a:rPr lang="en-US" dirty="0" smtClean="0"/>
-              <a:t>Everything should be done in </a:t>
-            </a:r>
-            <a:r>
-              <a:rPr lang="en-US" dirty="0" err="1" smtClean="0"/>
-              <a:t>PageObjects</a:t>
-            </a:r>
-            <a:r>
-              <a:rPr lang="en-US" dirty="0" smtClean="0"/>
-              <a:t> or </a:t>
-            </a:r>
-            <a:r>
-              <a:rPr lang="en-US" dirty="0" err="1" smtClean="0"/>
-              <a:t>PageElements</a:t>
-            </a:r>
-            <a:endParaRPr lang="en-US" dirty="0" smtClean="0"/>
+              <a:rPr lang="en-US" sz="2000" dirty="0" smtClean="0"/>
+              <a:t>Tests fail whenever anything changes</a:t>
+            </a:r>
+          </a:p>
+          <a:p>
+            <a:pPr marL="800100" lvl="1" indent="-342900">
+              <a:buFont typeface="Arial"/>
+              <a:buChar char="•"/>
+            </a:pPr>
+            <a:endParaRPr lang="en-US" sz="2000" dirty="0" smtClean="0"/>
           </a:p>
           <a:p>
             <a:pPr marL="342900" indent="-342900">
@@ -6180,7 +6005,7 @@
             </a:pPr>
             <a:r>
               <a:rPr lang="en-US" dirty="0" smtClean="0"/>
-              <a:t>Wait, don’t Sleep</a:t>
+              <a:t>Too many false test failures</a:t>
             </a:r>
           </a:p>
           <a:p>
@@ -6189,17 +6014,16 @@
               <a:buChar char="•"/>
             </a:pPr>
             <a:r>
-              <a:rPr lang="en-US" dirty="0" smtClean="0"/>
-              <a:t>Even if an element is already there, sometimes I’ll use </a:t>
-            </a:r>
-            <a:r>
-              <a:rPr lang="en-US" dirty="0" err="1" smtClean="0"/>
-              <a:t>JxWaitUntil.elementIsVisible</a:t>
-            </a:r>
-            <a:r>
-              <a:rPr lang="en-US" dirty="0" smtClean="0"/>
-              <a:t> just to future-proof</a:t>
-            </a:r>
+              <a:rPr lang="en-US" sz="2000" dirty="0" smtClean="0"/>
+              <a:t>Tests fail sometimes, but pass other times</a:t>
+            </a:r>
+          </a:p>
+          <a:p>
+            <a:pPr marL="800100" lvl="1" indent="-342900">
+              <a:buFont typeface="Arial"/>
+              <a:buChar char="•"/>
+            </a:pPr>
+            <a:endParaRPr lang="en-US" sz="2000" dirty="0" smtClean="0"/>
           </a:p>
           <a:p>
             <a:pPr marL="342900" indent="-342900">
@@ -6208,15 +6032,34 @@
             </a:pPr>
             <a:r>
               <a:rPr lang="en-US" dirty="0" smtClean="0"/>
-              <a:t>Avoid </a:t>
-            </a:r>
-            <a:r>
-              <a:rPr lang="en-US" dirty="0" err="1" smtClean="0"/>
-              <a:t>CKEditor</a:t>
-            </a:r>
-            <a:r>
-              <a:rPr lang="en-US" dirty="0" smtClean="0"/>
-              <a:t>!</a:t>
+              <a:t>Too hard to update tests with changes</a:t>
+            </a:r>
+          </a:p>
+          <a:p>
+            <a:pPr marL="800100" lvl="1" indent="-342900">
+              <a:buFont typeface="Arial"/>
+              <a:buChar char="•"/>
+            </a:pPr>
+            <a:r>
+              <a:rPr lang="en-US" sz="2000" dirty="0" smtClean="0"/>
+              <a:t>Change a CSS class, need tons of test updates</a:t>
+            </a:r>
+          </a:p>
+          <a:p>
+            <a:pPr marL="800100" lvl="1" indent="-342900">
+              <a:buFont typeface="Arial"/>
+              <a:buChar char="•"/>
+            </a:pPr>
+            <a:endParaRPr lang="en-US" sz="2000" dirty="0"/>
+          </a:p>
+          <a:p>
+            <a:pPr marL="342900" indent="-342900">
+              <a:buFont typeface="Arial"/>
+              <a:buChar char="•"/>
+            </a:pPr>
+            <a:r>
+              <a:rPr lang="en-US" dirty="0" smtClean="0"/>
+              <a:t>AJAX apps require “sleeps” to make work</a:t>
             </a:r>
             <a:endParaRPr lang="en-US" dirty="0"/>
           </a:p>
@@ -6225,7 +6068,7 @@
     </p:spTree>
     <p:extLst>
       <p:ext uri="{BB962C8B-B14F-4D97-AF65-F5344CB8AC3E}">
-        <p14:creationId xmlns:p14="http://schemas.microsoft.com/office/powerpoint/2010/main" val="3904727312"/>
+        <p14:creationId xmlns:p14="http://schemas.microsoft.com/office/powerpoint/2010/main" val="567283378"/>
       </p:ext>
     </p:extLst>
   </p:cSld>
@@ -6271,21 +6114,101 @@
         </p:nvSpPr>
         <p:spPr/>
         <p:txBody>
-          <a:bodyPr/>
+          <a:bodyPr>
+            <a:normAutofit/>
+          </a:bodyPr>
           <a:lstStyle/>
           <a:p>
             <a:r>
-              <a:rPr lang="en-US" dirty="0" smtClean="0"/>
-              <a:t>Our Process</a:t>
-            </a:r>
-            <a:endParaRPr lang="en-US" dirty="0"/>
+              <a:rPr lang="en-US" sz="4000" dirty="0" smtClean="0"/>
+              <a:t>Design To Protect Your Code</a:t>
+            </a:r>
+            <a:endParaRPr lang="en-US" sz="4000" dirty="0"/>
+          </a:p>
+        </p:txBody>
+      </p:sp>
+      <p:sp>
+        <p:nvSpPr>
+          <p:cNvPr id="3" name="Content Placeholder 2"/>
+          <p:cNvSpPr>
+            <a:spLocks noGrp="1"/>
+          </p:cNvSpPr>
+          <p:nvPr>
+            <p:ph idx="1"/>
+          </p:nvPr>
+        </p:nvSpPr>
+        <p:spPr/>
+        <p:txBody>
+          <a:bodyPr>
+            <a:normAutofit/>
+          </a:bodyPr>
+          <a:lstStyle/>
+          <a:p>
+            <a:pPr marL="342900" indent="-342900">
+              <a:buFont typeface="Arial"/>
+              <a:buChar char="•"/>
+            </a:pPr>
+            <a:r>
+              <a:rPr lang="en-US" sz="3200" dirty="0" smtClean="0"/>
+              <a:t>Tests should interact with objects, not the page</a:t>
+            </a:r>
+          </a:p>
+          <a:p>
+            <a:pPr marL="800100" lvl="1" indent="-342900">
+              <a:buFont typeface="Arial"/>
+              <a:buChar char="•"/>
+            </a:pPr>
+            <a:r>
+              <a:rPr lang="en-US" sz="2800" dirty="0" smtClean="0"/>
+              <a:t>Avoid any selectors in your tests</a:t>
+            </a:r>
+          </a:p>
+          <a:p>
+            <a:pPr marL="800100" lvl="1" indent="-342900">
+              <a:buFont typeface="Arial"/>
+              <a:buChar char="•"/>
+            </a:pPr>
+            <a:r>
+              <a:rPr lang="en-US" sz="2800" dirty="0" smtClean="0"/>
+              <a:t>Keep logic hidden under your API</a:t>
+            </a:r>
+          </a:p>
+          <a:p>
+            <a:pPr marL="342900" indent="-342900">
+              <a:buFont typeface="Arial"/>
+              <a:buChar char="•"/>
+            </a:pPr>
+            <a:r>
+              <a:rPr lang="en-US" sz="3200" dirty="0" smtClean="0"/>
+              <a:t>Reuse code as much as possible</a:t>
+            </a:r>
+          </a:p>
+          <a:p>
+            <a:pPr marL="800100" lvl="1" indent="-342900">
+              <a:buFont typeface="Arial"/>
+              <a:buChar char="•"/>
+            </a:pPr>
+            <a:r>
+              <a:rPr lang="en-US" sz="2800" dirty="0" smtClean="0"/>
+              <a:t>Write your API so that it can be reused in other tests</a:t>
+            </a:r>
+          </a:p>
+          <a:p>
+            <a:pPr marL="342900" indent="-342900">
+              <a:buFont typeface="Arial"/>
+              <a:buChar char="•"/>
+            </a:pPr>
+            <a:r>
+              <a:rPr lang="en-US" sz="2800" dirty="0" smtClean="0"/>
+              <a:t>Assert the state of the page regularly</a:t>
+            </a:r>
           </a:p>
         </p:txBody>
       </p:sp>
     </p:spTree>
     <p:extLst>
       <p:ext uri="{BB962C8B-B14F-4D97-AF65-F5344CB8AC3E}">
-        <p14:creationId xmlns:p14="http://schemas.microsoft.com/office/powerpoint/2010/main" val="2969513198"/>
+        <p14:creationId xmlns:p14="http://schemas.microsoft.com/office/powerpoint/2010/main" val="2197418565"/>
       </p:ext>
     </p:extLst>
   </p:cSld>
@@ -6336,7 +6259,7 @@
           <a:p>
             <a:r>
               <a:rPr lang="en-US" dirty="0" smtClean="0"/>
-              <a:t>Who Writes Tests</a:t>
+              <a:t>Other Ideas</a:t>
             </a:r>
             <a:endParaRPr lang="en-US" dirty="0"/>
           </a:p>
@@ -6362,44 +6285,29 @@
               <a:buChar char="•"/>
             </a:pPr>
             <a:r>
-              <a:rPr lang="en-US" dirty="0" smtClean="0"/>
-              <a:t>Right now, developers are responsible for writing </a:t>
-            </a:r>
-            <a:r>
-              <a:rPr lang="en-US" dirty="0" err="1" smtClean="0"/>
-              <a:t>WebDriver</a:t>
-            </a:r>
-            <a:r>
-              <a:rPr lang="en-US" dirty="0" smtClean="0"/>
-              <a:t> tests</a:t>
-            </a:r>
-          </a:p>
-          <a:p>
-            <a:pPr marL="800100" lvl="1" indent="-342900">
-              <a:buFont typeface="Arial"/>
-              <a:buChar char="•"/>
-            </a:pPr>
-            <a:r>
-              <a:rPr lang="en-US" dirty="0" smtClean="0"/>
-              <a:t>Sometimes CSS classes need to be added to the codebase</a:t>
-            </a:r>
-          </a:p>
-          <a:p>
-            <a:pPr marL="800100" lvl="1" indent="-342900">
-              <a:buFont typeface="Arial"/>
-              <a:buChar char="•"/>
-            </a:pPr>
-            <a:r>
-              <a:rPr lang="en-US" dirty="0" smtClean="0"/>
-              <a:t>These are basically the Integration Tests for the front-end</a:t>
-            </a:r>
+              <a:rPr lang="en-US" dirty="0"/>
+              <a:t>Record VNC</a:t>
+            </a:r>
+          </a:p>
+          <a:p>
+            <a:pPr marL="342900" indent="-342900">
+              <a:buFont typeface="Arial"/>
+              <a:buChar char="•"/>
+            </a:pPr>
+            <a:r>
+              <a:rPr lang="en-US" dirty="0"/>
+              <a:t>Display currently running action on the screen</a:t>
+            </a:r>
+          </a:p>
+          <a:p>
+            <a:endParaRPr lang="en-US" dirty="0"/>
           </a:p>
         </p:txBody>
       </p:sp>
     </p:spTree>
     <p:extLst>
       <p:ext uri="{BB962C8B-B14F-4D97-AF65-F5344CB8AC3E}">
-        <p14:creationId xmlns:p14="http://schemas.microsoft.com/office/powerpoint/2010/main" val="2829375460"/>
+        <p14:creationId xmlns:p14="http://schemas.microsoft.com/office/powerpoint/2010/main" val="28341907"/>
       </p:ext>
     </p:extLst>
   </p:cSld>
@@ -6450,7 +6358,7 @@
           <a:p>
             <a:r>
               <a:rPr lang="en-US" dirty="0" smtClean="0"/>
-              <a:t>When Do We Write Tests</a:t>
+              <a:t>Main Things To Remember</a:t>
             </a:r>
             <a:endParaRPr lang="en-US" dirty="0"/>
           </a:p>
@@ -6477,8 +6385,31 @@
             </a:pPr>
             <a:r>
               <a:rPr lang="en-US" dirty="0" smtClean="0"/>
-              <a:t>We try to have a test for each Acceptance Criteria for any new features/stories</a:t>
-            </a:r>
+              <a:t>No selectors in the test</a:t>
+            </a:r>
+          </a:p>
+          <a:p>
+            <a:pPr marL="800100" lvl="1" indent="-342900">
+              <a:buFont typeface="Arial"/>
+              <a:buChar char="•"/>
+            </a:pPr>
+            <a:r>
+              <a:rPr lang="en-US" dirty="0" smtClean="0"/>
+              <a:t>Everything should be done in </a:t>
+            </a:r>
+            <a:r>
+              <a:rPr lang="en-US" dirty="0" err="1" smtClean="0"/>
+              <a:t>PageObjects</a:t>
+            </a:r>
+            <a:r>
+              <a:rPr lang="en-US" dirty="0" smtClean="0"/>
+              <a:t> or </a:t>
+            </a:r>
+            <a:r>
+              <a:rPr lang="en-US" dirty="0" err="1" smtClean="0"/>
+              <a:t>PageElements</a:t>
+            </a:r>
+            <a:endParaRPr lang="en-US" dirty="0" smtClean="0"/>
           </a:p>
           <a:p>
             <a:pPr marL="342900" indent="-342900">
@@ -6487,10 +6418,44 @@
             </a:pPr>
             <a:r>
               <a:rPr lang="en-US" dirty="0" smtClean="0"/>
-              <a:t>Any regression bug is exposed with a test first</a:t>
-            </a:r>
-          </a:p>
-          <a:p>
+              <a:t>Wait, don’t Sleep</a:t>
+            </a:r>
+          </a:p>
+          <a:p>
+            <a:pPr marL="800100" lvl="1" indent="-342900">
+              <a:buFont typeface="Arial"/>
+              <a:buChar char="•"/>
+            </a:pPr>
+            <a:r>
+              <a:rPr lang="en-US" dirty="0" smtClean="0"/>
+              <a:t>Even if an element is already there, sometimes I’ll use </a:t>
+            </a:r>
+            <a:r>
+              <a:rPr lang="en-US" dirty="0" err="1" smtClean="0"/>
+              <a:t>JxWaitUntil.elementIsVisible</a:t>
+            </a:r>
+            <a:r>
+              <a:rPr lang="en-US" dirty="0" smtClean="0"/>
+              <a:t> just to future-proof</a:t>
+            </a:r>
+          </a:p>
+          <a:p>
+            <a:pPr marL="342900" indent="-342900">
+              <a:buFont typeface="Arial"/>
+              <a:buChar char="•"/>
+            </a:pPr>
+            <a:r>
+              <a:rPr lang="en-US" dirty="0" smtClean="0"/>
+              <a:t>Avoid </a:t>
+            </a:r>
+            <a:r>
+              <a:rPr lang="en-US" dirty="0" err="1" smtClean="0"/>
+              <a:t>CKEditor</a:t>
+            </a:r>
+            <a:r>
+              <a:rPr lang="en-US" dirty="0" smtClean="0"/>
+              <a:t>!</a:t>
+            </a:r>
             <a:endParaRPr lang="en-US" dirty="0"/>
           </a:p>
         </p:txBody>
@@ -6498,7 +6463,7 @@
     </p:spTree>
     <p:extLst>
       <p:ext uri="{BB962C8B-B14F-4D97-AF65-F5344CB8AC3E}">
-        <p14:creationId xmlns:p14="http://schemas.microsoft.com/office/powerpoint/2010/main" val="687734013"/>
+        <p14:creationId xmlns:p14="http://schemas.microsoft.com/office/powerpoint/2010/main" val="3904727312"/>
       </p:ext>
     </p:extLst>
   </p:cSld>
@@ -6549,78 +6514,16 @@
           <a:p>
             <a:r>
               <a:rPr lang="en-US" dirty="0" smtClean="0"/>
-              <a:t>When Are Tests Run</a:t>
+              <a:t>Our Process</a:t>
             </a:r>
             <a:endParaRPr lang="en-US" dirty="0"/>
-          </a:p>
-        </p:txBody>
-      </p:sp>
-      <p:sp>
-        <p:nvSpPr>
-          <p:cNvPr id="3" name="Content Placeholder 2"/>
-          <p:cNvSpPr>
-            <a:spLocks noGrp="1"/>
-          </p:cNvSpPr>
-          <p:nvPr>
-            <p:ph idx="1"/>
-          </p:nvPr>
-        </p:nvSpPr>
-        <p:spPr/>
-        <p:txBody>
-          <a:bodyPr/>
-          <a:lstStyle/>
-          <a:p>
-            <a:pPr marL="342900" indent="-342900">
-              <a:buFont typeface="Arial"/>
-              <a:buChar char="•"/>
-            </a:pPr>
-            <a:r>
-              <a:rPr lang="en-US" dirty="0" smtClean="0"/>
-              <a:t>Right now, the entire test suite is run on every check-in</a:t>
-            </a:r>
-          </a:p>
-          <a:p>
-            <a:pPr marL="342900" indent="-342900">
-              <a:buFont typeface="Arial"/>
-              <a:buChar char="•"/>
-            </a:pPr>
-            <a:r>
-              <a:rPr lang="en-US" dirty="0" smtClean="0"/>
-              <a:t>We develop on </a:t>
-            </a:r>
-            <a:r>
-              <a:rPr lang="en-US" dirty="0" err="1" smtClean="0"/>
-              <a:t>Git</a:t>
-            </a:r>
-            <a:r>
-              <a:rPr lang="en-US" dirty="0" smtClean="0"/>
-              <a:t> branches, and only after build is green do we merge to master</a:t>
-            </a:r>
-          </a:p>
-          <a:p>
-            <a:pPr marL="342900" indent="-342900">
-              <a:buFont typeface="Arial"/>
-              <a:buChar char="•"/>
-            </a:pPr>
-            <a:r>
-              <a:rPr lang="en-US" dirty="0" smtClean="0"/>
-              <a:t>Tests can take awhile, but </a:t>
-            </a:r>
-            <a:r>
-              <a:rPr lang="en-US" dirty="0" err="1" smtClean="0"/>
-              <a:t>Git</a:t>
-            </a:r>
-            <a:r>
-              <a:rPr lang="en-US" dirty="0" smtClean="0"/>
-              <a:t> makes it easy to just Push and work on something else until the tests finish</a:t>
-            </a:r>
           </a:p>
         </p:txBody>
       </p:sp>
     </p:spTree>
     <p:extLst>
       <p:ext uri="{BB962C8B-B14F-4D97-AF65-F5344CB8AC3E}">
-        <p14:creationId xmlns:p14="http://schemas.microsoft.com/office/powerpoint/2010/main" val="1135910173"/>
+        <p14:creationId xmlns:p14="http://schemas.microsoft.com/office/powerpoint/2010/main" val="2969513198"/>
       </p:ext>
     </p:extLst>
   </p:cSld>
@@ -6671,7 +6574,7 @@
           <a:p>
             <a:r>
               <a:rPr lang="en-US" dirty="0" smtClean="0"/>
-              <a:t>Q&amp;A</a:t>
+              <a:t>Who Writes Tests</a:t>
             </a:r>
             <a:endParaRPr lang="en-US" dirty="0"/>
           </a:p>
@@ -6689,56 +6592,151 @@
         </p:nvSpPr>
         <p:spPr/>
         <p:txBody>
-          <a:bodyPr>
-            <a:normAutofit lnSpcReduction="10000"/>
-          </a:bodyPr>
+          <a:bodyPr/>
           <a:lstStyle/>
           <a:p>
-            <a:endParaRPr lang="en-US" dirty="0" smtClean="0"/>
-          </a:p>
-          <a:p>
-            <a:r>
-              <a:rPr lang="en-US" dirty="0" smtClean="0"/>
-              <a:t>Sean Adkinson</a:t>
-            </a:r>
-          </a:p>
-          <a:p>
-            <a:r>
-              <a:rPr lang="en-US" dirty="0" smtClean="0"/>
-              <a:t>sadkinson@jamasoftware.com</a:t>
-            </a:r>
-          </a:p>
-          <a:p>
-            <a:r>
-              <a:rPr lang="en-US" dirty="0" smtClean="0"/>
-              <a:t>@seanadkinson</a:t>
-            </a:r>
-          </a:p>
-          <a:p>
-            <a:r>
-              <a:rPr lang="en-US" dirty="0"/>
-              <a:t>https://</a:t>
-            </a:r>
-            <a:r>
-              <a:rPr lang="en-US" dirty="0" err="1"/>
-              <a:t>github.com</a:t>
-            </a:r>
-            <a:r>
-              <a:rPr lang="en-US" dirty="0"/>
-              <a:t>/seanadkinson/</a:t>
-            </a:r>
-            <a:r>
-              <a:rPr lang="en-US" dirty="0" err="1"/>
-              <a:t>pjug-webdriver</a:t>
-            </a:r>
-            <a:endParaRPr lang="en-US" dirty="0"/>
+            <a:pPr marL="342900" indent="-342900">
+              <a:buFont typeface="Arial"/>
+              <a:buChar char="•"/>
+            </a:pPr>
+            <a:r>
+              <a:rPr lang="en-US" dirty="0" smtClean="0"/>
+              <a:t>Right now, developers are responsible for writing </a:t>
+            </a:r>
+            <a:r>
+              <a:rPr lang="en-US" dirty="0" err="1" smtClean="0"/>
+              <a:t>WebDriver</a:t>
+            </a:r>
+            <a:r>
+              <a:rPr lang="en-US" dirty="0" smtClean="0"/>
+              <a:t> tests</a:t>
+            </a:r>
+          </a:p>
+          <a:p>
+            <a:pPr marL="800100" lvl="1" indent="-342900">
+              <a:buFont typeface="Arial"/>
+              <a:buChar char="•"/>
+            </a:pPr>
+            <a:r>
+              <a:rPr lang="en-US" dirty="0" smtClean="0"/>
+              <a:t>Sometimes CSS classes need to be added to the codebase</a:t>
+            </a:r>
+          </a:p>
+          <a:p>
+            <a:pPr marL="800100" lvl="1" indent="-342900">
+              <a:buFont typeface="Arial"/>
+              <a:buChar char="•"/>
+            </a:pPr>
+            <a:r>
+              <a:rPr lang="en-US" dirty="0" smtClean="0"/>
+              <a:t>These are basically the Integration Tests for the front-end</a:t>
+            </a:r>
           </a:p>
         </p:txBody>
       </p:sp>
     </p:spTree>
     <p:extLst>
       <p:ext uri="{BB962C8B-B14F-4D97-AF65-F5344CB8AC3E}">
-        <p14:creationId xmlns:p14="http://schemas.microsoft.com/office/powerpoint/2010/main" val="2980318417"/>
+        <p14:creationId xmlns:p14="http://schemas.microsoft.com/office/powerpoint/2010/main" val="2829375460"/>
+      </p:ext>
+    </p:extLst>
+  </p:cSld>
+  <p:clrMapOvr>
+    <a:masterClrMapping/>
+  </p:clrMapOvr>
+  <p:timing>
+    <p:tnLst>
+      <p:par>
+        <p:cTn xmlns:p14="http://schemas.microsoft.com/office/powerpoint/2010/main" id="1" dur="indefinite" restart="never" nodeType="tmRoot"/>
+      </p:par>
+    </p:tnLst>
+  </p:timing>
+</p:sld>
+</file>
+
+<file path=ppt/slides/slide39.xml><?xml version="1.0" encoding="utf-8"?>
+<p:sld xmlns:a="http://schemas.openxmlformats.org/drawingml/2006/main" xmlns:r="http://schemas.openxmlformats.org/officeDocument/2006/relationships" xmlns:p="http://schemas.openxmlformats.org/presentationml/2006/main">
+  <p:cSld>
+    <p:spTree>
+      <p:nvGrpSpPr>
+        <p:cNvPr id="1" name=""/>
+        <p:cNvGrpSpPr/>
+        <p:nvPr/>
+      </p:nvGrpSpPr>
+      <p:grpSpPr>
+        <a:xfrm>
+          <a:off x="0" y="0"/>
+          <a:ext cx="0" cy="0"/>
+          <a:chOff x="0" y="0"/>
+          <a:chExt cx="0" cy="0"/>
+        </a:xfrm>
+      </p:grpSpPr>
+      <p:sp>
+        <p:nvSpPr>
+          <p:cNvPr id="2" name="Title 1"/>
+          <p:cNvSpPr>
+            <a:spLocks noGrp="1"/>
+          </p:cNvSpPr>
+          <p:nvPr>
+            <p:ph type="title"/>
+          </p:nvPr>
+        </p:nvSpPr>
+        <p:spPr/>
+        <p:txBody>
+          <a:bodyPr/>
+          <a:lstStyle/>
+          <a:p>
+            <a:r>
+              <a:rPr lang="en-US" dirty="0" smtClean="0"/>
+              <a:t>When Do We Write Tests</a:t>
+            </a:r>
+            <a:endParaRPr lang="en-US" dirty="0"/>
+          </a:p>
+        </p:txBody>
+      </p:sp>
+      <p:sp>
+        <p:nvSpPr>
+          <p:cNvPr id="3" name="Content Placeholder 2"/>
+          <p:cNvSpPr>
+            <a:spLocks noGrp="1"/>
+          </p:cNvSpPr>
+          <p:nvPr>
+            <p:ph idx="1"/>
+          </p:nvPr>
+        </p:nvSpPr>
+        <p:spPr/>
+        <p:txBody>
+          <a:bodyPr/>
+          <a:lstStyle/>
+          <a:p>
+            <a:pPr marL="342900" indent="-342900">
+              <a:buFont typeface="Arial"/>
+              <a:buChar char="•"/>
+            </a:pPr>
+            <a:r>
+              <a:rPr lang="en-US" dirty="0" smtClean="0"/>
+              <a:t>We try to have a test for each Acceptance Criteria for any new features/stories</a:t>
+            </a:r>
+          </a:p>
+          <a:p>
+            <a:pPr marL="342900" indent="-342900">
+              <a:buFont typeface="Arial"/>
+              <a:buChar char="•"/>
+            </a:pPr>
+            <a:r>
+              <a:rPr lang="en-US" dirty="0" smtClean="0"/>
+              <a:t>Any regression bug is exposed with a test first</a:t>
+            </a:r>
+          </a:p>
+          <a:p>
+            <a:endParaRPr lang="en-US" dirty="0"/>
+          </a:p>
+        </p:txBody>
+      </p:sp>
+    </p:spTree>
+    <p:extLst>
+      <p:ext uri="{BB962C8B-B14F-4D97-AF65-F5344CB8AC3E}">
+        <p14:creationId xmlns:p14="http://schemas.microsoft.com/office/powerpoint/2010/main" val="687734013"/>
       </p:ext>
     </p:extLst>
   </p:cSld>
@@ -6860,6 +6858,246 @@
     <p:extLst>
       <p:ext uri="{BB962C8B-B14F-4D97-AF65-F5344CB8AC3E}">
         <p14:creationId xmlns:p14="http://schemas.microsoft.com/office/powerpoint/2010/main" val="1612685318"/>
+      </p:ext>
+    </p:extLst>
+  </p:cSld>
+  <p:clrMapOvr>
+    <a:masterClrMapping/>
+  </p:clrMapOvr>
+  <p:timing>
+    <p:tnLst>
+      <p:par>
+        <p:cTn xmlns:p14="http://schemas.microsoft.com/office/powerpoint/2010/main" id="1" dur="indefinite" restart="never" nodeType="tmRoot"/>
+      </p:par>
+    </p:tnLst>
+  </p:timing>
+</p:sld>
+</file>
+
+<file path=ppt/slides/slide40.xml><?xml version="1.0" encoding="utf-8"?>
+<p:sld xmlns:a="http://schemas.openxmlformats.org/drawingml/2006/main" xmlns:r="http://schemas.openxmlformats.org/officeDocument/2006/relationships" xmlns:p="http://schemas.openxmlformats.org/presentationml/2006/main">
+  <p:cSld>
+    <p:spTree>
+      <p:nvGrpSpPr>
+        <p:cNvPr id="1" name=""/>
+        <p:cNvGrpSpPr/>
+        <p:nvPr/>
+      </p:nvGrpSpPr>
+      <p:grpSpPr>
+        <a:xfrm>
+          <a:off x="0" y="0"/>
+          <a:ext cx="0" cy="0"/>
+          <a:chOff x="0" y="0"/>
+          <a:chExt cx="0" cy="0"/>
+        </a:xfrm>
+      </p:grpSpPr>
+      <p:sp>
+        <p:nvSpPr>
+          <p:cNvPr id="2" name="Title 1"/>
+          <p:cNvSpPr>
+            <a:spLocks noGrp="1"/>
+          </p:cNvSpPr>
+          <p:nvPr>
+            <p:ph type="title"/>
+          </p:nvPr>
+        </p:nvSpPr>
+        <p:spPr/>
+        <p:txBody>
+          <a:bodyPr/>
+          <a:lstStyle/>
+          <a:p>
+            <a:r>
+              <a:rPr lang="en-US" dirty="0" smtClean="0"/>
+              <a:t>When Are Tests Run</a:t>
+            </a:r>
+            <a:endParaRPr lang="en-US" dirty="0"/>
+          </a:p>
+        </p:txBody>
+      </p:sp>
+      <p:sp>
+        <p:nvSpPr>
+          <p:cNvPr id="3" name="Content Placeholder 2"/>
+          <p:cNvSpPr>
+            <a:spLocks noGrp="1"/>
+          </p:cNvSpPr>
+          <p:nvPr>
+            <p:ph idx="1"/>
+          </p:nvPr>
+        </p:nvSpPr>
+        <p:spPr/>
+        <p:txBody>
+          <a:bodyPr/>
+          <a:lstStyle/>
+          <a:p>
+            <a:pPr marL="342900" indent="-342900">
+              <a:buFont typeface="Arial"/>
+              <a:buChar char="•"/>
+            </a:pPr>
+            <a:r>
+              <a:rPr lang="en-US" dirty="0" smtClean="0"/>
+              <a:t>Right now, the entire test suite is run on every check-in</a:t>
+            </a:r>
+          </a:p>
+          <a:p>
+            <a:pPr marL="342900" indent="-342900">
+              <a:buFont typeface="Arial"/>
+              <a:buChar char="•"/>
+            </a:pPr>
+            <a:r>
+              <a:rPr lang="en-US" dirty="0" smtClean="0"/>
+              <a:t>We develop on </a:t>
+            </a:r>
+            <a:r>
+              <a:rPr lang="en-US" dirty="0" err="1" smtClean="0"/>
+              <a:t>Git</a:t>
+            </a:r>
+            <a:r>
+              <a:rPr lang="en-US" dirty="0" smtClean="0"/>
+              <a:t> branches, and only after build is green do we merge to master</a:t>
+            </a:r>
+          </a:p>
+          <a:p>
+            <a:pPr marL="342900" indent="-342900">
+              <a:buFont typeface="Arial"/>
+              <a:buChar char="•"/>
+            </a:pPr>
+            <a:r>
+              <a:rPr lang="en-US" dirty="0" smtClean="0"/>
+              <a:t>Tests can take awhile, but </a:t>
+            </a:r>
+            <a:r>
+              <a:rPr lang="en-US" dirty="0" err="1" smtClean="0"/>
+              <a:t>Git</a:t>
+            </a:r>
+            <a:r>
+              <a:rPr lang="en-US" dirty="0" smtClean="0"/>
+              <a:t> makes it easy to just Push and work on something else until the tests finish</a:t>
+            </a:r>
+          </a:p>
+        </p:txBody>
+      </p:sp>
+    </p:spTree>
+    <p:extLst>
+      <p:ext uri="{BB962C8B-B14F-4D97-AF65-F5344CB8AC3E}">
+        <p14:creationId xmlns:p14="http://schemas.microsoft.com/office/powerpoint/2010/main" val="1135910173"/>
+      </p:ext>
+    </p:extLst>
+  </p:cSld>
+  <p:clrMapOvr>
+    <a:masterClrMapping/>
+  </p:clrMapOvr>
+  <p:timing>
+    <p:tnLst>
+      <p:par>
+        <p:cTn xmlns:p14="http://schemas.microsoft.com/office/powerpoint/2010/main" id="1" dur="indefinite" restart="never" nodeType="tmRoot"/>
+      </p:par>
+    </p:tnLst>
+  </p:timing>
+</p:sld>
+</file>
+
+<file path=ppt/slides/slide41.xml><?xml version="1.0" encoding="utf-8"?>
+<p:sld xmlns:a="http://schemas.openxmlformats.org/drawingml/2006/main" xmlns:r="http://schemas.openxmlformats.org/officeDocument/2006/relationships" xmlns:p="http://schemas.openxmlformats.org/presentationml/2006/main">
+  <p:cSld>
+    <p:spTree>
+      <p:nvGrpSpPr>
+        <p:cNvPr id="1" name=""/>
+        <p:cNvGrpSpPr/>
+        <p:nvPr/>
+      </p:nvGrpSpPr>
+      <p:grpSpPr>
+        <a:xfrm>
+          <a:off x="0" y="0"/>
+          <a:ext cx="0" cy="0"/>
+          <a:chOff x="0" y="0"/>
+          <a:chExt cx="0" cy="0"/>
+        </a:xfrm>
+      </p:grpSpPr>
+      <p:sp>
+        <p:nvSpPr>
+          <p:cNvPr id="2" name="Title 1"/>
+          <p:cNvSpPr>
+            <a:spLocks noGrp="1"/>
+          </p:cNvSpPr>
+          <p:nvPr>
+            <p:ph type="title"/>
+          </p:nvPr>
+        </p:nvSpPr>
+        <p:spPr/>
+        <p:txBody>
+          <a:bodyPr/>
+          <a:lstStyle/>
+          <a:p>
+            <a:r>
+              <a:rPr lang="en-US" dirty="0" smtClean="0"/>
+              <a:t>Q&amp;A</a:t>
+            </a:r>
+            <a:endParaRPr lang="en-US" dirty="0"/>
+          </a:p>
+        </p:txBody>
+      </p:sp>
+      <p:sp>
+        <p:nvSpPr>
+          <p:cNvPr id="3" name="Content Placeholder 2"/>
+          <p:cNvSpPr>
+            <a:spLocks noGrp="1"/>
+          </p:cNvSpPr>
+          <p:nvPr>
+            <p:ph idx="1"/>
+          </p:nvPr>
+        </p:nvSpPr>
+        <p:spPr/>
+        <p:txBody>
+          <a:bodyPr>
+            <a:normAutofit lnSpcReduction="10000"/>
+          </a:bodyPr>
+          <a:lstStyle/>
+          <a:p>
+            <a:endParaRPr lang="en-US" dirty="0" smtClean="0"/>
+          </a:p>
+          <a:p>
+            <a:r>
+              <a:rPr lang="en-US" dirty="0" smtClean="0"/>
+              <a:t>Sean Adkinson</a:t>
+            </a:r>
+          </a:p>
+          <a:p>
+            <a:r>
+              <a:rPr lang="en-US" dirty="0" smtClean="0"/>
+              <a:t>sadkinson@jamasoftware.com</a:t>
+            </a:r>
+          </a:p>
+          <a:p>
+            <a:r>
+              <a:rPr lang="en-US" dirty="0" smtClean="0"/>
+              <a:t>@seanadkinson</a:t>
+            </a:r>
+          </a:p>
+          <a:p>
+            <a:r>
+              <a:rPr lang="en-US" dirty="0"/>
+              <a:t>https://</a:t>
+            </a:r>
+            <a:r>
+              <a:rPr lang="en-US" dirty="0" err="1"/>
+              <a:t>github.com</a:t>
+            </a:r>
+            <a:r>
+              <a:rPr lang="en-US" dirty="0"/>
+              <a:t>/seanadkinson/</a:t>
+            </a:r>
+            <a:r>
+              <a:rPr lang="en-US" dirty="0" err="1"/>
+              <a:t>pjug-webdriver</a:t>
+            </a:r>
+            <a:endParaRPr lang="en-US" dirty="0"/>
+          </a:p>
+        </p:txBody>
+      </p:sp>
+    </p:spTree>
+    <p:extLst>
+      <p:ext uri="{BB962C8B-B14F-4D97-AF65-F5344CB8AC3E}">
+        <p14:creationId xmlns:p14="http://schemas.microsoft.com/office/powerpoint/2010/main" val="2980318417"/>
       </p:ext>
     </p:extLst>
   </p:cSld>

</xml_diff>

<commit_message>
Bettered the page elements a bit
</commit_message>
<xml_diff>
--- a/slides.pptx
+++ b/slides.pptx
@@ -32,13 +32,13 @@
     <p:sldId id="305" r:id="rId26"/>
     <p:sldId id="306" r:id="rId27"/>
     <p:sldId id="290" r:id="rId28"/>
-    <p:sldId id="276" r:id="rId29"/>
-    <p:sldId id="278" r:id="rId30"/>
-    <p:sldId id="293" r:id="rId31"/>
-    <p:sldId id="294" r:id="rId32"/>
-    <p:sldId id="295" r:id="rId33"/>
-    <p:sldId id="271" r:id="rId34"/>
-    <p:sldId id="272" r:id="rId35"/>
+    <p:sldId id="307" r:id="rId29"/>
+    <p:sldId id="308" r:id="rId30"/>
+    <p:sldId id="276" r:id="rId31"/>
+    <p:sldId id="278" r:id="rId32"/>
+    <p:sldId id="293" r:id="rId33"/>
+    <p:sldId id="294" r:id="rId34"/>
+    <p:sldId id="295" r:id="rId35"/>
     <p:sldId id="296" r:id="rId36"/>
     <p:sldId id="302" r:id="rId37"/>
     <p:sldId id="297" r:id="rId38"/>
@@ -3033,11 +3033,7 @@
             </a:pPr>
             <a:r>
               <a:rPr lang="en-US" dirty="0" smtClean="0"/>
-              <a:t>Google search for </a:t>
-            </a:r>
-            <a:r>
-              <a:rPr lang="en-US" dirty="0" smtClean="0"/>
-              <a:t>PDX Selenium</a:t>
+              <a:t>Google search for PDX Selenium</a:t>
             </a:r>
             <a:endParaRPr lang="en-US" dirty="0"/>
           </a:p>
@@ -3183,11 +3179,7 @@
           <a:p>
             <a:r>
               <a:rPr lang="en-US" dirty="0" smtClean="0"/>
-              <a:t>Better </a:t>
-            </a:r>
-            <a:r>
-              <a:rPr lang="en-US" dirty="0" smtClean="0"/>
-              <a:t>Example</a:t>
+              <a:t>Better Example</a:t>
             </a:r>
             <a:endParaRPr lang="en-US" dirty="0"/>
           </a:p>
@@ -4198,39 +4190,26 @@
             </a:pPr>
             <a:r>
               <a:rPr lang="en-US" dirty="0" smtClean="0"/>
-              <a:t>Avoid selecting with common words like “Add” or “Edit</a:t>
-            </a:r>
-            <a:r>
-              <a:rPr lang="en-US" dirty="0" smtClean="0"/>
-              <a:t>”</a:t>
-            </a:r>
+              <a:t>Avoid selecting with common words like “Add” or “Edit”</a:t>
+            </a:r>
+          </a:p>
+          <a:p>
+            <a:pPr marL="342900" indent="-342900">
+              <a:buFont typeface="Arial"/>
+              <a:buChar char="•"/>
+            </a:pPr>
             <a:endParaRPr lang="en-US" dirty="0" smtClean="0"/>
           </a:p>
           <a:p>
-            <a:pPr marL="342900" indent="-342900">
-              <a:buFont typeface="Arial"/>
-              <a:buChar char="•"/>
-            </a:pPr>
             <a:endParaRPr lang="en-US" dirty="0" smtClean="0"/>
           </a:p>
           <a:p>
-            <a:endParaRPr lang="en-US" dirty="0" smtClean="0"/>
-          </a:p>
-          <a:p>
             <a:endParaRPr lang="en-US" dirty="0"/>
           </a:p>
           <a:p>
             <a:r>
               <a:rPr lang="en-US" dirty="0" smtClean="0"/>
-              <a:t>Jama uses a tool called Recess to enforce developers to NOT style ids or classes that </a:t>
-            </a:r>
-            <a:r>
-              <a:rPr lang="en-US" dirty="0" smtClean="0"/>
-              <a:t>begin </a:t>
-            </a:r>
-            <a:r>
-              <a:rPr lang="en-US" dirty="0" smtClean="0"/>
-              <a:t>with “</a:t>
+              <a:t>Jama uses a tool called Recess to enforce developers to NOT style ids or classes that begin with “</a:t>
             </a:r>
             <a:r>
               <a:rPr lang="en-US" dirty="0" err="1" smtClean="0"/>
@@ -5139,12 +5118,10 @@
             <p:ph idx="1"/>
           </p:nvPr>
         </p:nvPicPr>
-        <p:blipFill>
+        <p:blipFill rotWithShape="1">
           <a:blip r:embed="rId2"/>
-          <a:srcRect t="-14862" b="-14862"/>
-          <a:stretch>
-            <a:fillRect/>
-          </a:stretch>
+          <a:srcRect l="-1" t="-22197" r="-54223" b="-71542"/>
+          <a:stretch/>
         </p:blipFill>
         <p:spPr>
           <a:xfrm>
@@ -5373,14 +5350,9 @@
           <a:lstStyle/>
           <a:p>
             <a:r>
-              <a:rPr lang="en-US" dirty="0" err="1" smtClean="0"/>
-              <a:t>Calagator</a:t>
-            </a:r>
-            <a:r>
-              <a:rPr lang="en-US" dirty="0" smtClean="0"/>
-              <a:t> Example - Better</a:t>
-            </a:r>
-            <a:endParaRPr lang="en-US" dirty="0"/>
+              <a:rPr lang="en-US" dirty="0"/>
+              <a:t>Common Criticisms</a:t>
+            </a:r>
           </a:p>
         </p:txBody>
       </p:sp>
@@ -5404,20 +5376,89 @@
               <a:buChar char="•"/>
             </a:pPr>
             <a:r>
-              <a:rPr lang="en-US" dirty="0" err="1" smtClean="0"/>
-              <a:t>Calagator</a:t>
-            </a:r>
-            <a:r>
-              <a:rPr lang="en-US" dirty="0" smtClean="0"/>
-              <a:t> example with </a:t>
-            </a:r>
-            <a:r>
-              <a:rPr lang="en-US" dirty="0" err="1" smtClean="0"/>
-              <a:t>PageObjects</a:t>
-            </a:r>
-            <a:r>
-              <a:rPr lang="en-US" dirty="0" smtClean="0"/>
-              <a:t>!</a:t>
+              <a:rPr lang="en-US" dirty="0" smtClean="0"/>
+              <a:t>Fragile Tests</a:t>
+            </a:r>
+          </a:p>
+          <a:p>
+            <a:pPr marL="800100" lvl="1" indent="-342900">
+              <a:buFont typeface="Arial"/>
+              <a:buChar char="•"/>
+            </a:pPr>
+            <a:r>
+              <a:rPr lang="en-US" sz="2000" dirty="0" smtClean="0"/>
+              <a:t>Tests fail whenever anything changes</a:t>
+            </a:r>
+          </a:p>
+          <a:p>
+            <a:pPr marL="800100" lvl="1" indent="-342900">
+              <a:buFont typeface="Arial"/>
+              <a:buChar char="•"/>
+            </a:pPr>
+            <a:endParaRPr lang="en-US" sz="2000" dirty="0" smtClean="0"/>
+          </a:p>
+          <a:p>
+            <a:pPr marL="342900" indent="-342900">
+              <a:buFont typeface="Arial"/>
+              <a:buChar char="•"/>
+            </a:pPr>
+            <a:r>
+              <a:rPr lang="en-US" dirty="0" smtClean="0"/>
+              <a:t>Too many false test failures</a:t>
+            </a:r>
+          </a:p>
+          <a:p>
+            <a:pPr marL="800100" lvl="1" indent="-342900">
+              <a:buFont typeface="Arial"/>
+              <a:buChar char="•"/>
+            </a:pPr>
+            <a:r>
+              <a:rPr lang="en-US" sz="2000" dirty="0" smtClean="0"/>
+              <a:t>Tests fail sometimes, but pass other times</a:t>
+            </a:r>
+          </a:p>
+          <a:p>
+            <a:pPr marL="800100" lvl="1" indent="-342900">
+              <a:buFont typeface="Arial"/>
+              <a:buChar char="•"/>
+            </a:pPr>
+            <a:endParaRPr lang="en-US" sz="2000" dirty="0" smtClean="0"/>
+          </a:p>
+          <a:p>
+            <a:pPr marL="342900" indent="-342900">
+              <a:buFont typeface="Arial"/>
+              <a:buChar char="•"/>
+            </a:pPr>
+            <a:r>
+              <a:rPr lang="en-US" dirty="0" smtClean="0"/>
+              <a:t>Too hard to update tests with changes</a:t>
+            </a:r>
+          </a:p>
+          <a:p>
+            <a:pPr marL="800100" lvl="1" indent="-342900">
+              <a:buFont typeface="Arial"/>
+              <a:buChar char="•"/>
+            </a:pPr>
+            <a:r>
+              <a:rPr lang="en-US" sz="2000" dirty="0" smtClean="0"/>
+              <a:t>Change a CSS class, need tons of test updates</a:t>
+            </a:r>
+          </a:p>
+          <a:p>
+            <a:pPr marL="800100" lvl="1" indent="-342900">
+              <a:buFont typeface="Arial"/>
+              <a:buChar char="•"/>
+            </a:pPr>
+            <a:endParaRPr lang="en-US" sz="2000" dirty="0"/>
+          </a:p>
+          <a:p>
+            <a:pPr marL="342900" indent="-342900">
+              <a:buFont typeface="Arial"/>
+              <a:buChar char="•"/>
+            </a:pPr>
+            <a:r>
+              <a:rPr lang="en-US" dirty="0" smtClean="0"/>
+              <a:t>AJAX apps require “sleeps” to make work</a:t>
             </a:r>
             <a:endParaRPr lang="en-US" dirty="0"/>
           </a:p>
@@ -5426,7 +5467,7 @@
     </p:spTree>
     <p:extLst>
       <p:ext uri="{BB962C8B-B14F-4D97-AF65-F5344CB8AC3E}">
-        <p14:creationId xmlns:p14="http://schemas.microsoft.com/office/powerpoint/2010/main" val="1214165765"/>
+        <p14:creationId xmlns:p14="http://schemas.microsoft.com/office/powerpoint/2010/main" val="2939125152"/>
       </p:ext>
     </p:extLst>
   </p:cSld>
@@ -5472,14 +5513,16 @@
         </p:nvSpPr>
         <p:spPr/>
         <p:txBody>
-          <a:bodyPr/>
+          <a:bodyPr>
+            <a:normAutofit/>
+          </a:bodyPr>
           <a:lstStyle/>
           <a:p>
             <a:r>
-              <a:rPr lang="en-US" dirty="0" smtClean="0"/>
-              <a:t>Real Example Test</a:t>
-            </a:r>
-            <a:endParaRPr lang="en-US" dirty="0"/>
+              <a:rPr lang="en-US" sz="4000" dirty="0" smtClean="0"/>
+              <a:t>Design To Protect Your Code</a:t>
+            </a:r>
+            <a:endParaRPr lang="en-US" sz="4000" dirty="0"/>
           </a:p>
         </p:txBody>
       </p:sp>
@@ -5495,7 +5538,9 @@
         </p:nvSpPr>
         <p:spPr/>
         <p:txBody>
-          <a:bodyPr/>
+          <a:bodyPr>
+            <a:normAutofit/>
+          </a:bodyPr>
           <a:lstStyle/>
           <a:p>
             <a:pPr marL="342900" indent="-342900">
@@ -5503,25 +5548,66 @@
               <a:buChar char="•"/>
             </a:pPr>
             <a:r>
-              <a:rPr lang="en-US" dirty="0" smtClean="0"/>
-              <a:t>How we are using </a:t>
-            </a:r>
-            <a:r>
-              <a:rPr lang="en-US" dirty="0" err="1" smtClean="0"/>
-              <a:t>WebDriver</a:t>
-            </a:r>
-            <a:r>
-              <a:rPr lang="en-US" dirty="0" smtClean="0"/>
-              <a:t> to test creation of a List</a:t>
-            </a:r>
-            <a:endParaRPr lang="en-US" dirty="0"/>
+              <a:rPr lang="en-US" sz="3200" dirty="0" smtClean="0"/>
+              <a:t>Tests should interact with objects, not the page</a:t>
+            </a:r>
+          </a:p>
+          <a:p>
+            <a:pPr marL="800100" lvl="1" indent="-342900">
+              <a:buFont typeface="Arial"/>
+              <a:buChar char="•"/>
+            </a:pPr>
+            <a:r>
+              <a:rPr lang="en-US" sz="2800" dirty="0" smtClean="0"/>
+              <a:t>Avoid any selectors in your tests</a:t>
+            </a:r>
+          </a:p>
+          <a:p>
+            <a:pPr marL="800100" lvl="1" indent="-342900">
+              <a:buFont typeface="Arial"/>
+              <a:buChar char="•"/>
+            </a:pPr>
+            <a:r>
+              <a:rPr lang="en-US" sz="2800" dirty="0" smtClean="0"/>
+              <a:t>Keep logic hidden under your API</a:t>
+            </a:r>
+          </a:p>
+          <a:p>
+            <a:pPr marL="342900" indent="-342900">
+              <a:buFont typeface="Arial"/>
+              <a:buChar char="•"/>
+            </a:pPr>
+            <a:r>
+              <a:rPr lang="en-US" sz="3200" dirty="0" smtClean="0"/>
+              <a:t>Reuse code as much as possible</a:t>
+            </a:r>
+          </a:p>
+          <a:p>
+            <a:pPr marL="800100" lvl="1" indent="-342900">
+              <a:buFont typeface="Arial"/>
+              <a:buChar char="•"/>
+            </a:pPr>
+            <a:r>
+              <a:rPr lang="en-US" sz="2800" dirty="0" smtClean="0"/>
+              <a:t>Write your API so that it can be reused in other tests</a:t>
+            </a:r>
+          </a:p>
+          <a:p>
+            <a:pPr marL="342900" indent="-342900">
+              <a:buFont typeface="Arial"/>
+              <a:buChar char="•"/>
+            </a:pPr>
+            <a:r>
+              <a:rPr lang="en-US" sz="2800" dirty="0" smtClean="0"/>
+              <a:t>Assert the state of the page regularly</a:t>
+            </a:r>
           </a:p>
         </p:txBody>
       </p:sp>
     </p:spTree>
     <p:extLst>
       <p:ext uri="{BB962C8B-B14F-4D97-AF65-F5344CB8AC3E}">
-        <p14:creationId xmlns:p14="http://schemas.microsoft.com/office/powerpoint/2010/main" val="3546473433"/>
+        <p14:creationId xmlns:p14="http://schemas.microsoft.com/office/powerpoint/2010/main" val="200634714"/>
       </p:ext>
     </p:extLst>
   </p:cSld>
@@ -5635,8 +5721,59 @@
           <a:lstStyle/>
           <a:p>
             <a:r>
-              <a:rPr lang="en-US" dirty="0" smtClean="0"/>
-              <a:t>Is It Really That Easy?</a:t>
+              <a:rPr lang="en-US" dirty="0" err="1" smtClean="0"/>
+              <a:t>Meetup</a:t>
+            </a:r>
+            <a:r>
+              <a:rPr lang="en-US" dirty="0" smtClean="0"/>
+              <a:t> </a:t>
+            </a:r>
+            <a:r>
+              <a:rPr lang="en-US" dirty="0" smtClean="0"/>
+              <a:t>Example - Better</a:t>
+            </a:r>
+            <a:endParaRPr lang="en-US" dirty="0"/>
+          </a:p>
+        </p:txBody>
+      </p:sp>
+      <p:sp>
+        <p:nvSpPr>
+          <p:cNvPr id="3" name="Content Placeholder 2"/>
+          <p:cNvSpPr>
+            <a:spLocks noGrp="1"/>
+          </p:cNvSpPr>
+          <p:nvPr>
+            <p:ph idx="1"/>
+          </p:nvPr>
+        </p:nvSpPr>
+        <p:spPr/>
+        <p:txBody>
+          <a:bodyPr/>
+          <a:lstStyle/>
+          <a:p>
+            <a:pPr marL="342900" indent="-342900">
+              <a:buFont typeface="Arial"/>
+              <a:buChar char="•"/>
+            </a:pPr>
+            <a:r>
+              <a:rPr lang="en-US" dirty="0" err="1" smtClean="0"/>
+              <a:t>Meetup</a:t>
+            </a:r>
+            <a:r>
+              <a:rPr lang="en-US" dirty="0" smtClean="0"/>
+              <a:t> example </a:t>
+            </a:r>
+            <a:r>
+              <a:rPr lang="en-US" dirty="0" smtClean="0"/>
+              <a:t>with </a:t>
+            </a:r>
+            <a:r>
+              <a:rPr lang="en-US" dirty="0" err="1" smtClean="0"/>
+              <a:t>PageObjects</a:t>
+            </a:r>
+            <a:r>
+              <a:rPr lang="en-US" dirty="0" smtClean="0"/>
+              <a:t>!</a:t>
             </a:r>
             <a:endParaRPr lang="en-US" dirty="0"/>
           </a:p>
@@ -5645,7 +5782,7 @@
     </p:spTree>
     <p:extLst>
       <p:ext uri="{BB962C8B-B14F-4D97-AF65-F5344CB8AC3E}">
-        <p14:creationId xmlns:p14="http://schemas.microsoft.com/office/powerpoint/2010/main" val="910431123"/>
+        <p14:creationId xmlns:p14="http://schemas.microsoft.com/office/powerpoint/2010/main" val="1214165765"/>
       </p:ext>
     </p:extLst>
   </p:cSld>
@@ -5696,7 +5833,7 @@
           <a:p>
             <a:r>
               <a:rPr lang="en-US" dirty="0" smtClean="0"/>
-              <a:t>No, Not Always!</a:t>
+              <a:t>Real Example Test</a:t>
             </a:r>
             <a:endParaRPr lang="en-US" dirty="0"/>
           </a:p>
@@ -5714,9 +5851,7 @@
         </p:nvSpPr>
         <p:spPr/>
         <p:txBody>
-          <a:bodyPr>
-            <a:normAutofit/>
-          </a:bodyPr>
+          <a:bodyPr/>
           <a:lstStyle/>
           <a:p>
             <a:pPr marL="342900" indent="-342900">
@@ -5725,15 +5860,24 @@
             </a:pPr>
             <a:r>
               <a:rPr lang="en-US" dirty="0" smtClean="0"/>
-              <a:t>Debugging can be painful</a:t>
-            </a:r>
+              <a:t>How we are using </a:t>
+            </a:r>
+            <a:r>
+              <a:rPr lang="en-US" dirty="0" err="1" smtClean="0"/>
+              <a:t>WebDriver</a:t>
+            </a:r>
+            <a:r>
+              <a:rPr lang="en-US" dirty="0" smtClean="0"/>
+              <a:t> to test creation of a List</a:t>
+            </a:r>
+            <a:endParaRPr lang="en-US" dirty="0"/>
           </a:p>
         </p:txBody>
       </p:sp>
     </p:spTree>
     <p:extLst>
       <p:ext uri="{BB962C8B-B14F-4D97-AF65-F5344CB8AC3E}">
-        <p14:creationId xmlns:p14="http://schemas.microsoft.com/office/powerpoint/2010/main" val="1386286624"/>
+        <p14:creationId xmlns:p14="http://schemas.microsoft.com/office/powerpoint/2010/main" val="3546473433"/>
       </p:ext>
     </p:extLst>
   </p:cSld>
@@ -5784,116 +5928,8 @@
           <a:p>
             <a:r>
               <a:rPr lang="en-US" dirty="0" smtClean="0"/>
-              <a:t>Some Things We Do</a:t>
-            </a:r>
-            <a:endParaRPr lang="en-US" dirty="0"/>
-          </a:p>
-        </p:txBody>
-      </p:sp>
-      <p:sp>
-        <p:nvSpPr>
-          <p:cNvPr id="3" name="Content Placeholder 2"/>
-          <p:cNvSpPr>
-            <a:spLocks noGrp="1"/>
-          </p:cNvSpPr>
-          <p:nvPr>
-            <p:ph idx="1"/>
-          </p:nvPr>
-        </p:nvSpPr>
-        <p:spPr/>
-        <p:txBody>
-          <a:bodyPr/>
-          <a:lstStyle/>
-          <a:p>
-            <a:pPr marL="342900" indent="-342900">
-              <a:buFont typeface="Arial"/>
-              <a:buChar char="•"/>
-            </a:pPr>
-            <a:r>
-              <a:rPr lang="en-US" dirty="0"/>
-              <a:t>Known dataset to test </a:t>
-            </a:r>
-            <a:r>
-              <a:rPr lang="en-US" dirty="0" smtClean="0"/>
-              <a:t>against</a:t>
-            </a:r>
-          </a:p>
-          <a:p>
-            <a:pPr marL="800100" lvl="1" indent="-342900">
-              <a:buFont typeface="Arial"/>
-              <a:buChar char="•"/>
-            </a:pPr>
-            <a:r>
-              <a:rPr lang="en-US" dirty="0" smtClean="0"/>
-              <a:t>Easier </a:t>
-            </a:r>
-            <a:r>
-              <a:rPr lang="en-US" dirty="0"/>
-              <a:t>to create complex </a:t>
-            </a:r>
-            <a:r>
-              <a:rPr lang="en-US" dirty="0" smtClean="0"/>
-              <a:t>scenarios</a:t>
-            </a:r>
-            <a:endParaRPr lang="en-US" dirty="0"/>
-          </a:p>
-          <a:p>
-            <a:pPr marL="342900" indent="-342900">
-              <a:buFont typeface="Arial"/>
-              <a:buChar char="•"/>
-            </a:pPr>
-            <a:r>
-              <a:rPr lang="en-US" dirty="0"/>
-              <a:t>Using Chef, a server is completely wiped and re-installed before tests begin</a:t>
-            </a:r>
-          </a:p>
-          <a:p>
-            <a:pPr marL="342900" indent="-342900">
-              <a:buFont typeface="Arial"/>
-              <a:buChar char="•"/>
-            </a:pPr>
-            <a:r>
-              <a:rPr lang="en-US" dirty="0" smtClean="0"/>
-              <a:t>Take a screenshot </a:t>
-            </a:r>
-            <a:r>
-              <a:rPr lang="en-US" dirty="0"/>
-              <a:t>after every </a:t>
-            </a:r>
-            <a:r>
-              <a:rPr lang="en-US" dirty="0" smtClean="0"/>
-              <a:t>test</a:t>
-            </a:r>
-          </a:p>
-          <a:p>
-            <a:pPr marL="342900" indent="-342900">
-              <a:buFont typeface="Arial"/>
-              <a:buChar char="•"/>
-            </a:pPr>
-            <a:r>
-              <a:rPr lang="en-US" dirty="0" smtClean="0"/>
-              <a:t>CI runs </a:t>
-            </a:r>
-            <a:r>
-              <a:rPr lang="en-US" dirty="0" err="1" smtClean="0"/>
-              <a:t>WebDriver</a:t>
-            </a:r>
-            <a:r>
-              <a:rPr lang="en-US" dirty="0" smtClean="0"/>
-              <a:t> on a VNC display</a:t>
-            </a:r>
-          </a:p>
-          <a:p>
-            <a:pPr marL="800100" lvl="1" indent="-342900">
-              <a:buFont typeface="Arial"/>
-              <a:buChar char="•"/>
-            </a:pPr>
-            <a:r>
-              <a:rPr lang="en-US" dirty="0" smtClean="0"/>
-              <a:t>Maybe we can see one right now</a:t>
-            </a:r>
-          </a:p>
-          <a:p>
+              <a:t>Is It Really That Easy?</a:t>
+            </a:r>
             <a:endParaRPr lang="en-US" dirty="0"/>
           </a:p>
         </p:txBody>
@@ -5901,7 +5937,7 @@
     </p:spTree>
     <p:extLst>
       <p:ext uri="{BB962C8B-B14F-4D97-AF65-F5344CB8AC3E}">
-        <p14:creationId xmlns:p14="http://schemas.microsoft.com/office/powerpoint/2010/main" val="2732409279"/>
+        <p14:creationId xmlns:p14="http://schemas.microsoft.com/office/powerpoint/2010/main" val="910431123"/>
       </p:ext>
     </p:extLst>
   </p:cSld>
@@ -5951,9 +5987,10 @@
           <a:lstStyle/>
           <a:p>
             <a:r>
-              <a:rPr lang="en-US" dirty="0"/>
-              <a:t>Common Criticisms</a:t>
-            </a:r>
+              <a:rPr lang="en-US" dirty="0" smtClean="0"/>
+              <a:t>No, Not Always!</a:t>
+            </a:r>
+            <a:endParaRPr lang="en-US" dirty="0"/>
           </a:p>
         </p:txBody>
       </p:sp>
@@ -5969,7 +6006,9 @@
         </p:nvSpPr>
         <p:spPr/>
         <p:txBody>
-          <a:bodyPr/>
+          <a:bodyPr>
+            <a:normAutofit/>
+          </a:bodyPr>
           <a:lstStyle/>
           <a:p>
             <a:pPr marL="342900" indent="-342900">
@@ -5978,97 +6017,15 @@
             </a:pPr>
             <a:r>
               <a:rPr lang="en-US" dirty="0" smtClean="0"/>
-              <a:t>Fragile Tests</a:t>
-            </a:r>
-          </a:p>
-          <a:p>
-            <a:pPr marL="800100" lvl="1" indent="-342900">
-              <a:buFont typeface="Arial"/>
-              <a:buChar char="•"/>
-            </a:pPr>
-            <a:r>
-              <a:rPr lang="en-US" sz="2000" dirty="0" smtClean="0"/>
-              <a:t>Tests fail whenever anything changes</a:t>
-            </a:r>
-          </a:p>
-          <a:p>
-            <a:pPr marL="800100" lvl="1" indent="-342900">
-              <a:buFont typeface="Arial"/>
-              <a:buChar char="•"/>
-            </a:pPr>
-            <a:endParaRPr lang="en-US" sz="2000" dirty="0" smtClean="0"/>
-          </a:p>
-          <a:p>
-            <a:pPr marL="342900" indent="-342900">
-              <a:buFont typeface="Arial"/>
-              <a:buChar char="•"/>
-            </a:pPr>
-            <a:r>
-              <a:rPr lang="en-US" dirty="0" smtClean="0"/>
-              <a:t>Too many false test failures</a:t>
-            </a:r>
-          </a:p>
-          <a:p>
-            <a:pPr marL="800100" lvl="1" indent="-342900">
-              <a:buFont typeface="Arial"/>
-              <a:buChar char="•"/>
-            </a:pPr>
-            <a:r>
-              <a:rPr lang="en-US" sz="2000" dirty="0" smtClean="0"/>
-              <a:t>Tests fail sometimes, but pass other times</a:t>
-            </a:r>
-          </a:p>
-          <a:p>
-            <a:pPr marL="800100" lvl="1" indent="-342900">
-              <a:buFont typeface="Arial"/>
-              <a:buChar char="•"/>
-            </a:pPr>
-            <a:endParaRPr lang="en-US" sz="2000" dirty="0" smtClean="0"/>
-          </a:p>
-          <a:p>
-            <a:pPr marL="342900" indent="-342900">
-              <a:buFont typeface="Arial"/>
-              <a:buChar char="•"/>
-            </a:pPr>
-            <a:r>
-              <a:rPr lang="en-US" dirty="0" smtClean="0"/>
-              <a:t>Too hard to update tests with changes</a:t>
-            </a:r>
-          </a:p>
-          <a:p>
-            <a:pPr marL="800100" lvl="1" indent="-342900">
-              <a:buFont typeface="Arial"/>
-              <a:buChar char="•"/>
-            </a:pPr>
-            <a:r>
-              <a:rPr lang="en-US" sz="2000" dirty="0" smtClean="0"/>
-              <a:t>Change a CSS class, need tons of test updates</a:t>
-            </a:r>
-          </a:p>
-          <a:p>
-            <a:pPr marL="800100" lvl="1" indent="-342900">
-              <a:buFont typeface="Arial"/>
-              <a:buChar char="•"/>
-            </a:pPr>
-            <a:endParaRPr lang="en-US" sz="2000" dirty="0"/>
-          </a:p>
-          <a:p>
-            <a:pPr marL="342900" indent="-342900">
-              <a:buFont typeface="Arial"/>
-              <a:buChar char="•"/>
-            </a:pPr>
-            <a:r>
-              <a:rPr lang="en-US" dirty="0" smtClean="0"/>
-              <a:t>AJAX apps require “sleeps” to make work</a:t>
-            </a:r>
-            <a:endParaRPr lang="en-US" dirty="0"/>
+              <a:t>Debugging can be painful</a:t>
+            </a:r>
           </a:p>
         </p:txBody>
       </p:sp>
     </p:spTree>
     <p:extLst>
       <p:ext uri="{BB962C8B-B14F-4D97-AF65-F5344CB8AC3E}">
-        <p14:creationId xmlns:p14="http://schemas.microsoft.com/office/powerpoint/2010/main" val="567283378"/>
+        <p14:creationId xmlns:p14="http://schemas.microsoft.com/office/powerpoint/2010/main" val="1386286624"/>
       </p:ext>
     </p:extLst>
   </p:cSld>
@@ -6114,16 +6071,14 @@
         </p:nvSpPr>
         <p:spPr/>
         <p:txBody>
-          <a:bodyPr>
-            <a:normAutofit/>
-          </a:bodyPr>
+          <a:bodyPr/>
           <a:lstStyle/>
           <a:p>
             <a:r>
-              <a:rPr lang="en-US" sz="4000" dirty="0" smtClean="0"/>
-              <a:t>Design To Protect Your Code</a:t>
-            </a:r>
-            <a:endParaRPr lang="en-US" sz="4000" dirty="0"/>
+              <a:rPr lang="en-US" dirty="0" smtClean="0"/>
+              <a:t>Some Things We Do</a:t>
+            </a:r>
+            <a:endParaRPr lang="en-US" dirty="0"/>
           </a:p>
         </p:txBody>
       </p:sp>
@@ -6139,9 +6094,7 @@
         </p:nvSpPr>
         <p:spPr/>
         <p:txBody>
-          <a:bodyPr>
-            <a:normAutofit/>
-          </a:bodyPr>
+          <a:bodyPr/>
           <a:lstStyle/>
           <a:p>
             <a:pPr marL="342900" indent="-342900">
@@ -6149,8 +6102,12 @@
               <a:buChar char="•"/>
             </a:pPr>
             <a:r>
-              <a:rPr lang="en-US" sz="3200" dirty="0" smtClean="0"/>
-              <a:t>Tests should interact with objects, not the page</a:t>
+              <a:rPr lang="en-US" dirty="0"/>
+              <a:t>Known dataset to test </a:t>
+            </a:r>
+            <a:r>
+              <a:rPr lang="en-US" dirty="0" smtClean="0"/>
+              <a:t>against</a:t>
             </a:r>
           </a:p>
           <a:p>
@@ -6159,8 +6116,63 @@
               <a:buChar char="•"/>
             </a:pPr>
             <a:r>
-              <a:rPr lang="en-US" sz="2800" dirty="0" smtClean="0"/>
-              <a:t>Avoid any selectors in your tests</a:t>
+              <a:rPr lang="en-US" dirty="0" smtClean="0"/>
+              <a:t>Easier </a:t>
+            </a:r>
+            <a:r>
+              <a:rPr lang="en-US" dirty="0"/>
+              <a:t>to create complex </a:t>
+            </a:r>
+            <a:r>
+              <a:rPr lang="en-US" dirty="0" smtClean="0"/>
+              <a:t>scenarios</a:t>
+            </a:r>
+            <a:endParaRPr lang="en-US" dirty="0"/>
+          </a:p>
+          <a:p>
+            <a:pPr marL="342900" indent="-342900">
+              <a:buFont typeface="Arial"/>
+              <a:buChar char="•"/>
+            </a:pPr>
+            <a:r>
+              <a:rPr lang="en-US" dirty="0"/>
+              <a:t>Using Chef, a server is completely wiped and re-installed before tests begin</a:t>
+            </a:r>
+          </a:p>
+          <a:p>
+            <a:pPr marL="342900" indent="-342900">
+              <a:buFont typeface="Arial"/>
+              <a:buChar char="•"/>
+            </a:pPr>
+            <a:r>
+              <a:rPr lang="en-US" dirty="0" smtClean="0"/>
+              <a:t>Take a screenshot </a:t>
+            </a:r>
+            <a:r>
+              <a:rPr lang="en-US" dirty="0"/>
+              <a:t>after every </a:t>
+            </a:r>
+            <a:r>
+              <a:rPr lang="en-US" dirty="0" smtClean="0"/>
+              <a:t>test</a:t>
+            </a:r>
+          </a:p>
+          <a:p>
+            <a:pPr marL="342900" indent="-342900">
+              <a:buFont typeface="Arial"/>
+              <a:buChar char="•"/>
+            </a:pPr>
+            <a:r>
+              <a:rPr lang="en-US" dirty="0" smtClean="0"/>
+              <a:t>CI runs </a:t>
+            </a:r>
+            <a:r>
+              <a:rPr lang="en-US" dirty="0" err="1" smtClean="0"/>
+              <a:t>WebDriver</a:t>
+            </a:r>
+            <a:r>
+              <a:rPr lang="en-US" dirty="0" smtClean="0"/>
+              <a:t> on a VNC display</a:t>
             </a:r>
           </a:p>
           <a:p>
@@ -6169,46 +6181,19 @@
               <a:buChar char="•"/>
             </a:pPr>
             <a:r>
-              <a:rPr lang="en-US" sz="2800" dirty="0" smtClean="0"/>
-              <a:t>Keep logic hidden under your API</a:t>
-            </a:r>
-          </a:p>
-          <a:p>
-            <a:pPr marL="342900" indent="-342900">
-              <a:buFont typeface="Arial"/>
-              <a:buChar char="•"/>
-            </a:pPr>
-            <a:r>
-              <a:rPr lang="en-US" sz="3200" dirty="0" smtClean="0"/>
-              <a:t>Reuse code as much as possible</a:t>
-            </a:r>
-          </a:p>
-          <a:p>
-            <a:pPr marL="800100" lvl="1" indent="-342900">
-              <a:buFont typeface="Arial"/>
-              <a:buChar char="•"/>
-            </a:pPr>
-            <a:r>
-              <a:rPr lang="en-US" sz="2800" dirty="0" smtClean="0"/>
-              <a:t>Write your API so that it can be reused in other tests</a:t>
-            </a:r>
-          </a:p>
-          <a:p>
-            <a:pPr marL="342900" indent="-342900">
-              <a:buFont typeface="Arial"/>
-              <a:buChar char="•"/>
-            </a:pPr>
-            <a:r>
-              <a:rPr lang="en-US" sz="2800" dirty="0" smtClean="0"/>
-              <a:t>Assert the state of the page regularly</a:t>
-            </a:r>
+              <a:rPr lang="en-US" dirty="0" smtClean="0"/>
+              <a:t>Maybe we can see one right now</a:t>
+            </a:r>
+          </a:p>
+          <a:p>
+            <a:endParaRPr lang="en-US" dirty="0"/>
           </a:p>
         </p:txBody>
       </p:sp>
     </p:spTree>
     <p:extLst>
       <p:ext uri="{BB962C8B-B14F-4D97-AF65-F5344CB8AC3E}">
-        <p14:creationId xmlns:p14="http://schemas.microsoft.com/office/powerpoint/2010/main" val="2197418565"/>
+        <p14:creationId xmlns:p14="http://schemas.microsoft.com/office/powerpoint/2010/main" val="2732409279"/>
       </p:ext>
     </p:extLst>
   </p:cSld>

</xml_diff>

<commit_message>
Brought in the firefox profile factory
</commit_message>
<xml_diff>
--- a/slides.pptx
+++ b/slides.pptx
@@ -25,21 +25,21 @@
     <p:sldId id="291" r:id="rId19"/>
     <p:sldId id="292" r:id="rId20"/>
     <p:sldId id="279" r:id="rId21"/>
-    <p:sldId id="274" r:id="rId22"/>
-    <p:sldId id="304" r:id="rId23"/>
-    <p:sldId id="289" r:id="rId24"/>
-    <p:sldId id="277" r:id="rId25"/>
-    <p:sldId id="305" r:id="rId26"/>
-    <p:sldId id="306" r:id="rId27"/>
-    <p:sldId id="290" r:id="rId28"/>
-    <p:sldId id="307" r:id="rId29"/>
-    <p:sldId id="308" r:id="rId30"/>
+    <p:sldId id="307" r:id="rId22"/>
+    <p:sldId id="308" r:id="rId23"/>
+    <p:sldId id="274" r:id="rId24"/>
+    <p:sldId id="304" r:id="rId25"/>
+    <p:sldId id="289" r:id="rId26"/>
+    <p:sldId id="277" r:id="rId27"/>
+    <p:sldId id="305" r:id="rId28"/>
+    <p:sldId id="306" r:id="rId29"/>
+    <p:sldId id="290" r:id="rId30"/>
     <p:sldId id="276" r:id="rId31"/>
     <p:sldId id="278" r:id="rId32"/>
     <p:sldId id="293" r:id="rId33"/>
     <p:sldId id="294" r:id="rId34"/>
     <p:sldId id="295" r:id="rId35"/>
-    <p:sldId id="296" r:id="rId36"/>
+    <p:sldId id="309" r:id="rId36"/>
     <p:sldId id="302" r:id="rId37"/>
     <p:sldId id="297" r:id="rId38"/>
     <p:sldId id="298" r:id="rId39"/>
@@ -2939,7 +2939,15 @@
           <a:p>
             <a:r>
               <a:rPr lang="en-US" sz="4000" dirty="0"/>
-              <a:t>Testing AJAX Web Application with Selenium </a:t>
+              <a:t>Testing AJAX Web </a:t>
+            </a:r>
+            <a:r>
+              <a:rPr lang="en-US" sz="4000" dirty="0" smtClean="0"/>
+              <a:t>Applications </a:t>
+            </a:r>
+            <a:r>
+              <a:rPr lang="en-US" sz="4000" dirty="0"/>
+              <a:t>with Selenium </a:t>
             </a:r>
             <a:r>
               <a:rPr lang="en-US" sz="4000" dirty="0" err="1"/>
@@ -3119,9 +3127,21 @@
           <a:p>
             <a:r>
               <a:rPr lang="en-US" sz="2800" dirty="0" smtClean="0"/>
-              <a:t>I’ll try to mention all the “best practice” tidbits I’ve learned, but I might miss one, so if you have a question, just yell “Hey Sean!”.</a:t>
-            </a:r>
+              <a:t>I’ll try to mention all the “best practice” tidbits I’ve </a:t>
+            </a:r>
+            <a:r>
+              <a:rPr lang="en-US" sz="2800" dirty="0" smtClean="0"/>
+              <a:t>learned.</a:t>
+            </a:r>
+          </a:p>
+          <a:p>
             <a:endParaRPr lang="en-US" sz="2800" dirty="0"/>
+          </a:p>
+          <a:p>
+            <a:r>
+              <a:rPr lang="en-US" sz="2800" dirty="0" smtClean="0"/>
+              <a:t>If I miss something you’d like to hear more about, just ask or yell “Hey Sean!”</a:t>
+            </a:r>
           </a:p>
         </p:txBody>
       </p:sp>
@@ -3797,39 +3817,157 @@
             </a:r>
             <a:r>
               <a:rPr lang="en-US" dirty="0" smtClean="0"/>
-              <a:t>and perform some common checks</a:t>
-            </a:r>
-          </a:p>
-          <a:p>
-            <a:pPr marL="342900" indent="-342900">
-              <a:buFont typeface="Arial"/>
-              <a:buChar char="•"/>
-            </a:pPr>
-            <a:r>
-              <a:rPr lang="en-US" dirty="0" smtClean="0"/>
-              <a:t>Any unexpected modals on the screen?</a:t>
-            </a:r>
-          </a:p>
-          <a:p>
-            <a:pPr marL="342900" indent="-342900">
-              <a:buFont typeface="Arial"/>
-              <a:buChar char="•"/>
-            </a:pPr>
-            <a:r>
-              <a:rPr lang="en-US" dirty="0" smtClean="0"/>
-              <a:t>Any outstanding requests?</a:t>
-            </a:r>
-          </a:p>
-          <a:p>
-            <a:pPr marL="342900" indent="-342900">
-              <a:buFont typeface="Arial"/>
-              <a:buChar char="•"/>
-            </a:pPr>
-            <a:r>
-              <a:rPr lang="en-US" dirty="0" smtClean="0"/>
-              <a:t>Anything else that would mean the user should wait?</a:t>
-            </a:r>
-            <a:endParaRPr lang="en-US" dirty="0"/>
+              <a:t>and perform some common </a:t>
+            </a:r>
+            <a:r>
+              <a:rPr lang="en-US" dirty="0" smtClean="0"/>
+              <a:t>checks</a:t>
+            </a:r>
+          </a:p>
+          <a:p>
+            <a:endParaRPr lang="en-US" dirty="0" smtClean="0"/>
+          </a:p>
+          <a:p>
+            <a:pPr marL="342900" indent="-342900">
+              <a:buFont typeface="Arial"/>
+              <a:buChar char="•"/>
+            </a:pPr>
+            <a:r>
+              <a:rPr lang="en-US" dirty="0" smtClean="0"/>
+              <a:t>Any unexpected modals on the screen</a:t>
+            </a:r>
+            <a:r>
+              <a:rPr lang="en-US" dirty="0" smtClean="0"/>
+              <a:t>?</a:t>
+            </a:r>
+          </a:p>
+          <a:p>
+            <a:pPr marL="800100" lvl="1" indent="-342900">
+              <a:buFont typeface="Arial"/>
+              <a:buChar char="•"/>
+            </a:pPr>
+            <a:r>
+              <a:rPr lang="en-US" dirty="0" err="1" smtClean="0">
+                <a:latin typeface="Consolas"/>
+                <a:cs typeface="Consolas"/>
+              </a:rPr>
+              <a:t>Ext.Msg.isVisible</a:t>
+            </a:r>
+            <a:r>
+              <a:rPr lang="en-US" dirty="0" smtClean="0">
+                <a:latin typeface="Consolas"/>
+                <a:cs typeface="Consolas"/>
+              </a:rPr>
+              <a:t>() </a:t>
+            </a:r>
+            <a:r>
+              <a:rPr lang="en-US" dirty="0">
+                <a:latin typeface="Consolas"/>
+                <a:cs typeface="Consolas"/>
+              </a:rPr>
+              <a:t>or </a:t>
+            </a:r>
+            <a:r>
+              <a:rPr lang="en-US" dirty="0" smtClean="0">
+                <a:latin typeface="Consolas"/>
+                <a:cs typeface="Consolas"/>
+              </a:rPr>
+              <a:t>.</a:t>
+            </a:r>
+            <a:r>
+              <a:rPr lang="en-US" dirty="0" err="1" smtClean="0">
+                <a:latin typeface="Consolas"/>
+                <a:cs typeface="Consolas"/>
+              </a:rPr>
+              <a:t>ext</a:t>
+            </a:r>
+            <a:r>
+              <a:rPr lang="en-US" dirty="0">
+                <a:latin typeface="Consolas"/>
+                <a:cs typeface="Consolas"/>
+              </a:rPr>
+              <a:t>-el-mask-</a:t>
+            </a:r>
+            <a:r>
+              <a:rPr lang="en-US" dirty="0" err="1">
+                <a:latin typeface="Consolas"/>
+                <a:cs typeface="Consolas"/>
+              </a:rPr>
+              <a:t>msg</a:t>
+            </a:r>
+            <a:endParaRPr lang="en-US" dirty="0" smtClean="0">
+              <a:latin typeface="Consolas"/>
+              <a:cs typeface="Consolas"/>
+            </a:endParaRPr>
+          </a:p>
+          <a:p>
+            <a:pPr marL="342900" indent="-342900">
+              <a:buFont typeface="Arial"/>
+              <a:buChar char="•"/>
+            </a:pPr>
+            <a:r>
+              <a:rPr lang="en-US" dirty="0" smtClean="0"/>
+              <a:t>Any outstanding requests</a:t>
+            </a:r>
+            <a:r>
+              <a:rPr lang="en-US" dirty="0" smtClean="0"/>
+              <a:t>?</a:t>
+            </a:r>
+          </a:p>
+          <a:p>
+            <a:pPr marL="800100" lvl="1" indent="-342900">
+              <a:buFont typeface="Arial"/>
+              <a:buChar char="•"/>
+            </a:pPr>
+            <a:r>
+              <a:rPr lang="en-US" dirty="0" err="1" smtClean="0">
+                <a:latin typeface="Consolas"/>
+                <a:cs typeface="Consolas"/>
+              </a:rPr>
+              <a:t>jQuery.active</a:t>
+            </a:r>
+            <a:r>
+              <a:rPr lang="en-US" dirty="0" smtClean="0">
+                <a:latin typeface="Consolas"/>
+                <a:cs typeface="Consolas"/>
+              </a:rPr>
+              <a:t> === 0?</a:t>
+            </a:r>
+            <a:endParaRPr lang="en-US" dirty="0" smtClean="0">
+              <a:latin typeface="Consolas"/>
+              <a:cs typeface="Consolas"/>
+            </a:endParaRPr>
+          </a:p>
+          <a:p>
+            <a:pPr marL="342900" indent="-342900">
+              <a:buFont typeface="Arial"/>
+              <a:buChar char="•"/>
+            </a:pPr>
+            <a:r>
+              <a:rPr lang="en-US" dirty="0" smtClean="0"/>
+              <a:t>Anything else that would mean the user should wait</a:t>
+            </a:r>
+            <a:r>
+              <a:rPr lang="en-US" dirty="0" smtClean="0"/>
+              <a:t>?</a:t>
+            </a:r>
+          </a:p>
+          <a:p>
+            <a:pPr marL="800100" lvl="1" indent="-342900">
+              <a:buFont typeface="Arial"/>
+              <a:buChar char="•"/>
+            </a:pPr>
+            <a:r>
+              <a:rPr lang="en-US" dirty="0" err="1" smtClean="0">
+                <a:latin typeface="Consolas"/>
+                <a:cs typeface="Consolas"/>
+              </a:rPr>
+              <a:t>CKEditor.isReady</a:t>
+            </a:r>
+            <a:endParaRPr lang="en-US" dirty="0">
+              <a:latin typeface="Consolas"/>
+              <a:cs typeface="Consolas"/>
+            </a:endParaRPr>
           </a:p>
           <a:p>
             <a:endParaRPr lang="en-US" dirty="0"/>
@@ -4644,14 +4782,9 @@
           <a:lstStyle/>
           <a:p>
             <a:r>
-              <a:rPr lang="en-US" dirty="0" err="1" smtClean="0"/>
-              <a:t>PageObject</a:t>
-            </a:r>
-            <a:r>
-              <a:rPr lang="en-US" dirty="0" smtClean="0"/>
-              <a:t> Pattern</a:t>
-            </a:r>
-            <a:endParaRPr lang="en-US" dirty="0"/>
+              <a:rPr lang="en-US" dirty="0"/>
+              <a:t>Common Criticisms</a:t>
+            </a:r>
           </a:p>
         </p:txBody>
       </p:sp>
@@ -4667,9 +4800,7 @@
         </p:nvSpPr>
         <p:spPr/>
         <p:txBody>
-          <a:bodyPr>
-            <a:normAutofit/>
-          </a:bodyPr>
+          <a:bodyPr/>
           <a:lstStyle/>
           <a:p>
             <a:pPr marL="342900" indent="-342900">
@@ -4677,72 +4808,98 @@
               <a:buChar char="•"/>
             </a:pPr>
             <a:r>
-              <a:rPr lang="en-US" sz="3200" dirty="0"/>
-              <a:t>Pages </a:t>
-            </a:r>
-            <a:r>
-              <a:rPr lang="en-US" sz="3200" dirty="0" smtClean="0"/>
-              <a:t>may know how </a:t>
-            </a:r>
-            <a:r>
-              <a:rPr lang="en-US" sz="3200" dirty="0"/>
-              <a:t>to get to themselves</a:t>
-            </a:r>
-          </a:p>
-          <a:p>
-            <a:pPr marL="342900" indent="-342900">
-              <a:buFont typeface="Arial"/>
-              <a:buChar char="•"/>
-            </a:pPr>
-            <a:r>
-              <a:rPr lang="en-US" sz="3200" dirty="0"/>
-              <a:t>Provides an API to interact with the page</a:t>
-            </a:r>
-          </a:p>
-          <a:p>
-            <a:pPr marL="342900" indent="-342900">
-              <a:buFont typeface="Arial"/>
-              <a:buChar char="•"/>
-            </a:pPr>
-            <a:r>
-              <a:rPr lang="en-US" sz="3200" dirty="0"/>
-              <a:t>Hides the underlying HTML details</a:t>
-            </a:r>
-          </a:p>
-          <a:p>
-            <a:pPr marL="342900" indent="-342900">
-              <a:buFont typeface="Arial"/>
-              <a:buChar char="•"/>
-            </a:pPr>
-            <a:r>
-              <a:rPr lang="en-US" sz="3200" dirty="0"/>
-              <a:t>Can make assertions about the </a:t>
-            </a:r>
-            <a:r>
-              <a:rPr lang="en-US" sz="3200" dirty="0" smtClean="0"/>
-              <a:t>state before returning from any given method</a:t>
-            </a:r>
-            <a:endParaRPr lang="en-US" sz="3200" dirty="0"/>
-          </a:p>
-          <a:p>
-            <a:pPr marL="342900" indent="-342900">
-              <a:buFont typeface="Arial"/>
-              <a:buChar char="•"/>
-            </a:pPr>
-            <a:r>
-              <a:rPr lang="en-US" sz="3200" dirty="0"/>
-              <a:t>Methods can return other Page Objects, modeling the user navigating through the application</a:t>
-            </a:r>
-          </a:p>
-          <a:p>
-            <a:endParaRPr lang="en-US" sz="3200" dirty="0"/>
+              <a:rPr lang="en-US" dirty="0" smtClean="0"/>
+              <a:t>Fragile Tests</a:t>
+            </a:r>
+          </a:p>
+          <a:p>
+            <a:pPr marL="800100" lvl="1" indent="-342900">
+              <a:buFont typeface="Arial"/>
+              <a:buChar char="•"/>
+            </a:pPr>
+            <a:r>
+              <a:rPr lang="en-US" sz="2000" dirty="0" smtClean="0"/>
+              <a:t>Tests fail whenever anything changes</a:t>
+            </a:r>
+          </a:p>
+          <a:p>
+            <a:pPr marL="800100" lvl="1" indent="-342900">
+              <a:buFont typeface="Arial"/>
+              <a:buChar char="•"/>
+            </a:pPr>
+            <a:endParaRPr lang="en-US" sz="2000" dirty="0" smtClean="0"/>
+          </a:p>
+          <a:p>
+            <a:pPr marL="342900" indent="-342900">
+              <a:buFont typeface="Arial"/>
+              <a:buChar char="•"/>
+            </a:pPr>
+            <a:r>
+              <a:rPr lang="en-US" dirty="0" smtClean="0"/>
+              <a:t>Too many false test failures</a:t>
+            </a:r>
+          </a:p>
+          <a:p>
+            <a:pPr marL="800100" lvl="1" indent="-342900">
+              <a:buFont typeface="Arial"/>
+              <a:buChar char="•"/>
+            </a:pPr>
+            <a:r>
+              <a:rPr lang="en-US" sz="2000" dirty="0" smtClean="0"/>
+              <a:t>Tests fail sometimes, but pass other times</a:t>
+            </a:r>
+          </a:p>
+          <a:p>
+            <a:pPr marL="800100" lvl="1" indent="-342900">
+              <a:buFont typeface="Arial"/>
+              <a:buChar char="•"/>
+            </a:pPr>
+            <a:endParaRPr lang="en-US" sz="2000" dirty="0" smtClean="0"/>
+          </a:p>
+          <a:p>
+            <a:pPr marL="342900" indent="-342900">
+              <a:buFont typeface="Arial"/>
+              <a:buChar char="•"/>
+            </a:pPr>
+            <a:r>
+              <a:rPr lang="en-US" dirty="0" smtClean="0"/>
+              <a:t>Too hard to update tests with changes</a:t>
+            </a:r>
+          </a:p>
+          <a:p>
+            <a:pPr marL="800100" lvl="1" indent="-342900">
+              <a:buFont typeface="Arial"/>
+              <a:buChar char="•"/>
+            </a:pPr>
+            <a:r>
+              <a:rPr lang="en-US" sz="2000" dirty="0" smtClean="0"/>
+              <a:t>Change a CSS class, need tons of test updates</a:t>
+            </a:r>
+          </a:p>
+          <a:p>
+            <a:pPr marL="800100" lvl="1" indent="-342900">
+              <a:buFont typeface="Arial"/>
+              <a:buChar char="•"/>
+            </a:pPr>
+            <a:endParaRPr lang="en-US" sz="2000" dirty="0"/>
+          </a:p>
+          <a:p>
+            <a:pPr marL="342900" indent="-342900">
+              <a:buFont typeface="Arial"/>
+              <a:buChar char="•"/>
+            </a:pPr>
+            <a:r>
+              <a:rPr lang="en-US" dirty="0" smtClean="0"/>
+              <a:t>AJAX apps require “sleeps” to make work</a:t>
+            </a:r>
+            <a:endParaRPr lang="en-US" dirty="0"/>
           </a:p>
         </p:txBody>
       </p:sp>
     </p:spTree>
     <p:extLst>
       <p:ext uri="{BB962C8B-B14F-4D97-AF65-F5344CB8AC3E}">
-        <p14:creationId xmlns:p14="http://schemas.microsoft.com/office/powerpoint/2010/main" val="3823223692"/>
+        <p14:creationId xmlns:p14="http://schemas.microsoft.com/office/powerpoint/2010/main" val="1441517609"/>
       </p:ext>
     </p:extLst>
   </p:cSld>
@@ -4788,46 +4945,114 @@
         </p:nvSpPr>
         <p:spPr/>
         <p:txBody>
-          <a:bodyPr/>
+          <a:bodyPr>
+            <a:normAutofit/>
+          </a:bodyPr>
           <a:lstStyle/>
           <a:p>
             <a:r>
-              <a:rPr lang="en-US" dirty="0" smtClean="0"/>
-              <a:t>Page Interface</a:t>
-            </a:r>
-            <a:endParaRPr lang="en-US" dirty="0"/>
-          </a:p>
-        </p:txBody>
-      </p:sp>
-      <p:pic>
-        <p:nvPicPr>
-          <p:cNvPr id="6" name="Content Placeholder 5"/>
-          <p:cNvPicPr>
-            <a:picLocks noGrp="1" noChangeAspect="1"/>
-          </p:cNvPicPr>
+              <a:rPr lang="en-US" sz="4000" dirty="0" smtClean="0"/>
+              <a:t>Design To Protect Your Code</a:t>
+            </a:r>
+            <a:endParaRPr lang="en-US" sz="4000" dirty="0"/>
+          </a:p>
+        </p:txBody>
+      </p:sp>
+      <p:sp>
+        <p:nvSpPr>
+          <p:cNvPr id="3" name="Content Placeholder 2"/>
+          <p:cNvSpPr>
+            <a:spLocks noGrp="1"/>
+          </p:cNvSpPr>
           <p:nvPr>
             <p:ph idx="1"/>
           </p:nvPr>
-        </p:nvPicPr>
-        <p:blipFill>
-          <a:blip r:embed="rId2"/>
-          <a:srcRect l="-698" r="-698"/>
-          <a:stretch>
-            <a:fillRect/>
-          </a:stretch>
-        </p:blipFill>
+        </p:nvSpPr>
         <p:spPr/>
-      </p:pic>
+        <p:txBody>
+          <a:bodyPr>
+            <a:normAutofit/>
+          </a:bodyPr>
+          <a:lstStyle/>
+          <a:p>
+            <a:pPr marL="342900" indent="-342900">
+              <a:buFont typeface="Arial"/>
+              <a:buChar char="•"/>
+            </a:pPr>
+            <a:r>
+              <a:rPr lang="en-US" sz="3200" dirty="0" smtClean="0"/>
+              <a:t>Tests should interact with objects, not the page</a:t>
+            </a:r>
+          </a:p>
+          <a:p>
+            <a:pPr marL="800100" lvl="1" indent="-342900">
+              <a:buFont typeface="Arial"/>
+              <a:buChar char="•"/>
+            </a:pPr>
+            <a:r>
+              <a:rPr lang="en-US" sz="2800" dirty="0" smtClean="0"/>
+              <a:t>Avoid any selectors in your tests</a:t>
+            </a:r>
+          </a:p>
+          <a:p>
+            <a:pPr marL="800100" lvl="1" indent="-342900">
+              <a:buFont typeface="Arial"/>
+              <a:buChar char="•"/>
+            </a:pPr>
+            <a:r>
+              <a:rPr lang="en-US" sz="2800" dirty="0" smtClean="0"/>
+              <a:t>Keep logic hidden under your API</a:t>
+            </a:r>
+          </a:p>
+          <a:p>
+            <a:pPr marL="342900" indent="-342900">
+              <a:buFont typeface="Arial"/>
+              <a:buChar char="•"/>
+            </a:pPr>
+            <a:r>
+              <a:rPr lang="en-US" sz="3200" dirty="0" smtClean="0"/>
+              <a:t>Reuse code as much as possible</a:t>
+            </a:r>
+          </a:p>
+          <a:p>
+            <a:pPr marL="800100" lvl="1" indent="-342900">
+              <a:buFont typeface="Arial"/>
+              <a:buChar char="•"/>
+            </a:pPr>
+            <a:r>
+              <a:rPr lang="en-US" sz="2800" dirty="0" smtClean="0"/>
+              <a:t>Write your API so that it can be reused in other tests</a:t>
+            </a:r>
+          </a:p>
+          <a:p>
+            <a:pPr marL="342900" indent="-342900">
+              <a:buFont typeface="Arial"/>
+              <a:buChar char="•"/>
+            </a:pPr>
+            <a:r>
+              <a:rPr lang="en-US" sz="2800" dirty="0" smtClean="0"/>
+              <a:t>Assert the state of the page regularly</a:t>
+            </a:r>
+          </a:p>
+        </p:txBody>
+      </p:sp>
     </p:spTree>
     <p:extLst>
       <p:ext uri="{BB962C8B-B14F-4D97-AF65-F5344CB8AC3E}">
-        <p14:creationId xmlns:p14="http://schemas.microsoft.com/office/powerpoint/2010/main" val="405127487"/>
+        <p14:creationId xmlns:p14="http://schemas.microsoft.com/office/powerpoint/2010/main" val="168512395"/>
       </p:ext>
     </p:extLst>
   </p:cSld>
   <p:clrMapOvr>
     <a:masterClrMapping/>
   </p:clrMapOvr>
+  <p:timing>
+    <p:tnLst>
+      <p:par>
+        <p:cTn xmlns:p14="http://schemas.microsoft.com/office/powerpoint/2010/main" id="1" dur="indefinite" restart="never" nodeType="tmRoot"/>
+      </p:par>
+    </p:tnLst>
+  </p:timing>
 </p:sld>
 </file>
 
@@ -4864,42 +5089,105 @@
           <a:lstStyle/>
           <a:p>
             <a:r>
-              <a:rPr lang="en-US" dirty="0" smtClean="0"/>
-              <a:t>Real </a:t>
-            </a:r>
-            <a:r>
               <a:rPr lang="en-US" dirty="0" err="1" smtClean="0"/>
               <a:t>PageObject</a:t>
             </a:r>
             <a:r>
               <a:rPr lang="en-US" dirty="0" smtClean="0"/>
-              <a:t> from Jama</a:t>
+              <a:t> Pattern</a:t>
             </a:r>
             <a:endParaRPr lang="en-US" dirty="0"/>
           </a:p>
         </p:txBody>
       </p:sp>
-      <p:pic>
-        <p:nvPicPr>
-          <p:cNvPr id="4" name="Content Placeholder 3"/>
-          <p:cNvPicPr>
-            <a:picLocks noGrp="1" noChangeAspect="1"/>
-          </p:cNvPicPr>
+      <p:sp>
+        <p:nvSpPr>
+          <p:cNvPr id="3" name="Content Placeholder 2"/>
+          <p:cNvSpPr>
+            <a:spLocks noGrp="1"/>
+          </p:cNvSpPr>
           <p:nvPr>
             <p:ph idx="1"/>
           </p:nvPr>
-        </p:nvPicPr>
-        <p:blipFill rotWithShape="1">
-          <a:blip r:embed="rId2"/>
-          <a:srcRect t="1" b="-47070"/>
-          <a:stretch/>
-        </p:blipFill>
+        </p:nvSpPr>
         <p:spPr/>
-      </p:pic>
+        <p:txBody>
+          <a:bodyPr>
+            <a:normAutofit/>
+          </a:bodyPr>
+          <a:lstStyle/>
+          <a:p>
+            <a:pPr marL="342900" indent="-342900">
+              <a:buFont typeface="Arial"/>
+              <a:buChar char="•"/>
+            </a:pPr>
+            <a:r>
+              <a:rPr lang="en-US" sz="3200" dirty="0"/>
+              <a:t>Pages </a:t>
+            </a:r>
+            <a:r>
+              <a:rPr lang="en-US" sz="3200" dirty="0" smtClean="0"/>
+              <a:t>may know how </a:t>
+            </a:r>
+            <a:r>
+              <a:rPr lang="en-US" sz="3200" dirty="0"/>
+              <a:t>to get to themselves</a:t>
+            </a:r>
+          </a:p>
+          <a:p>
+            <a:pPr marL="342900" indent="-342900">
+              <a:buFont typeface="Arial"/>
+              <a:buChar char="•"/>
+            </a:pPr>
+            <a:r>
+              <a:rPr lang="en-US" sz="3200" dirty="0"/>
+              <a:t>Provides an API to interact with the page</a:t>
+            </a:r>
+          </a:p>
+          <a:p>
+            <a:pPr marL="342900" indent="-342900">
+              <a:buFont typeface="Arial"/>
+              <a:buChar char="•"/>
+            </a:pPr>
+            <a:r>
+              <a:rPr lang="en-US" sz="3200" dirty="0"/>
+              <a:t>Hides the underlying HTML details</a:t>
+            </a:r>
+          </a:p>
+          <a:p>
+            <a:pPr marL="342900" indent="-342900">
+              <a:buFont typeface="Arial"/>
+              <a:buChar char="•"/>
+            </a:pPr>
+            <a:r>
+              <a:rPr lang="en-US" sz="3200" dirty="0"/>
+              <a:t>Can make assertions about the </a:t>
+            </a:r>
+            <a:r>
+              <a:rPr lang="en-US" sz="3200" dirty="0" smtClean="0"/>
+              <a:t>state before returning from any given method</a:t>
+            </a:r>
+            <a:endParaRPr lang="en-US" sz="3200" dirty="0"/>
+          </a:p>
+          <a:p>
+            <a:pPr marL="342900" indent="-342900">
+              <a:buFont typeface="Arial"/>
+              <a:buChar char="•"/>
+            </a:pPr>
+            <a:r>
+              <a:rPr lang="en-US" sz="3200" dirty="0"/>
+              <a:t>Methods can return other Page Objects, modeling the user navigating through the application</a:t>
+            </a:r>
+          </a:p>
+          <a:p>
+            <a:endParaRPr lang="en-US" sz="3200" dirty="0"/>
+          </a:p>
+        </p:txBody>
+      </p:sp>
     </p:spTree>
     <p:extLst>
       <p:ext uri="{BB962C8B-B14F-4D97-AF65-F5344CB8AC3E}">
-        <p14:creationId xmlns:p14="http://schemas.microsoft.com/office/powerpoint/2010/main" val="1761359205"/>
+        <p14:creationId xmlns:p14="http://schemas.microsoft.com/office/powerpoint/2010/main" val="3823223692"/>
       </p:ext>
     </p:extLst>
   </p:cSld>
@@ -4949,6 +5237,163 @@
           <a:lstStyle/>
           <a:p>
             <a:r>
+              <a:rPr lang="en-US" dirty="0" smtClean="0"/>
+              <a:t>Page Interface</a:t>
+            </a:r>
+            <a:endParaRPr lang="en-US" dirty="0"/>
+          </a:p>
+        </p:txBody>
+      </p:sp>
+      <p:pic>
+        <p:nvPicPr>
+          <p:cNvPr id="6" name="Content Placeholder 5"/>
+          <p:cNvPicPr>
+            <a:picLocks noGrp="1" noChangeAspect="1"/>
+          </p:cNvPicPr>
+          <p:nvPr>
+            <p:ph idx="1"/>
+          </p:nvPr>
+        </p:nvPicPr>
+        <p:blipFill>
+          <a:blip r:embed="rId2"/>
+          <a:srcRect l="-698" r="-698"/>
+          <a:stretch>
+            <a:fillRect/>
+          </a:stretch>
+        </p:blipFill>
+        <p:spPr/>
+      </p:pic>
+    </p:spTree>
+    <p:extLst>
+      <p:ext uri="{BB962C8B-B14F-4D97-AF65-F5344CB8AC3E}">
+        <p14:creationId xmlns:p14="http://schemas.microsoft.com/office/powerpoint/2010/main" val="405127487"/>
+      </p:ext>
+    </p:extLst>
+  </p:cSld>
+  <p:clrMapOvr>
+    <a:masterClrMapping/>
+  </p:clrMapOvr>
+</p:sld>
+</file>
+
+<file path=ppt/slides/slide25.xml><?xml version="1.0" encoding="utf-8"?>
+<p:sld xmlns:a="http://schemas.openxmlformats.org/drawingml/2006/main" xmlns:r="http://schemas.openxmlformats.org/officeDocument/2006/relationships" xmlns:p="http://schemas.openxmlformats.org/presentationml/2006/main">
+  <p:cSld>
+    <p:spTree>
+      <p:nvGrpSpPr>
+        <p:cNvPr id="1" name=""/>
+        <p:cNvGrpSpPr/>
+        <p:nvPr/>
+      </p:nvGrpSpPr>
+      <p:grpSpPr>
+        <a:xfrm>
+          <a:off x="0" y="0"/>
+          <a:ext cx="0" cy="0"/>
+          <a:chOff x="0" y="0"/>
+          <a:chExt cx="0" cy="0"/>
+        </a:xfrm>
+      </p:grpSpPr>
+      <p:sp>
+        <p:nvSpPr>
+          <p:cNvPr id="2" name="Title 1"/>
+          <p:cNvSpPr>
+            <a:spLocks noGrp="1"/>
+          </p:cNvSpPr>
+          <p:nvPr>
+            <p:ph type="title"/>
+          </p:nvPr>
+        </p:nvSpPr>
+        <p:spPr/>
+        <p:txBody>
+          <a:bodyPr/>
+          <a:lstStyle/>
+          <a:p>
+            <a:r>
+              <a:rPr lang="en-US" dirty="0" smtClean="0"/>
+              <a:t>Real </a:t>
+            </a:r>
+            <a:r>
+              <a:rPr lang="en-US" dirty="0" err="1" smtClean="0"/>
+              <a:t>PageObject</a:t>
+            </a:r>
+            <a:r>
+              <a:rPr lang="en-US" dirty="0" smtClean="0"/>
+              <a:t> from Jama</a:t>
+            </a:r>
+            <a:endParaRPr lang="en-US" dirty="0"/>
+          </a:p>
+        </p:txBody>
+      </p:sp>
+      <p:pic>
+        <p:nvPicPr>
+          <p:cNvPr id="4" name="Content Placeholder 3"/>
+          <p:cNvPicPr>
+            <a:picLocks noGrp="1" noChangeAspect="1"/>
+          </p:cNvPicPr>
+          <p:nvPr>
+            <p:ph idx="1"/>
+          </p:nvPr>
+        </p:nvPicPr>
+        <p:blipFill rotWithShape="1">
+          <a:blip r:embed="rId2"/>
+          <a:srcRect t="1" b="-47070"/>
+          <a:stretch/>
+        </p:blipFill>
+        <p:spPr/>
+      </p:pic>
+    </p:spTree>
+    <p:extLst>
+      <p:ext uri="{BB962C8B-B14F-4D97-AF65-F5344CB8AC3E}">
+        <p14:creationId xmlns:p14="http://schemas.microsoft.com/office/powerpoint/2010/main" val="1761359205"/>
+      </p:ext>
+    </p:extLst>
+  </p:cSld>
+  <p:clrMapOvr>
+    <a:masterClrMapping/>
+  </p:clrMapOvr>
+  <p:timing>
+    <p:tnLst>
+      <p:par>
+        <p:cTn xmlns:p14="http://schemas.microsoft.com/office/powerpoint/2010/main" id="1" dur="indefinite" restart="never" nodeType="tmRoot"/>
+      </p:par>
+    </p:tnLst>
+  </p:timing>
+</p:sld>
+</file>
+
+<file path=ppt/slides/slide26.xml><?xml version="1.0" encoding="utf-8"?>
+<p:sld xmlns:a="http://schemas.openxmlformats.org/drawingml/2006/main" xmlns:r="http://schemas.openxmlformats.org/officeDocument/2006/relationships" xmlns:p="http://schemas.openxmlformats.org/presentationml/2006/main">
+  <p:cSld>
+    <p:spTree>
+      <p:nvGrpSpPr>
+        <p:cNvPr id="1" name=""/>
+        <p:cNvGrpSpPr/>
+        <p:nvPr/>
+      </p:nvGrpSpPr>
+      <p:grpSpPr>
+        <a:xfrm>
+          <a:off x="0" y="0"/>
+          <a:ext cx="0" cy="0"/>
+          <a:chOff x="0" y="0"/>
+          <a:chExt cx="0" cy="0"/>
+        </a:xfrm>
+      </p:grpSpPr>
+      <p:sp>
+        <p:nvSpPr>
+          <p:cNvPr id="2" name="Title 1"/>
+          <p:cNvSpPr>
+            <a:spLocks noGrp="1"/>
+          </p:cNvSpPr>
+          <p:nvPr>
+            <p:ph type="title"/>
+          </p:nvPr>
+        </p:nvSpPr>
+        <p:spPr/>
+        <p:txBody>
+          <a:bodyPr/>
+          <a:lstStyle/>
+          <a:p>
+            <a:r>
               <a:rPr lang="en-US" dirty="0" err="1" smtClean="0"/>
               <a:t>PageElement</a:t>
             </a:r>
@@ -4973,7 +5418,7 @@
         <p:spPr/>
         <p:txBody>
           <a:bodyPr>
-            <a:normAutofit/>
+            <a:normAutofit fontScale="92500" lnSpcReduction="10000"/>
           </a:bodyPr>
           <a:lstStyle/>
           <a:p>
@@ -4982,6 +5427,54 @@
               <a:buChar char="•"/>
             </a:pPr>
             <a:r>
+              <a:rPr lang="en-US" sz="3200" dirty="0" err="1" smtClean="0"/>
+              <a:t>PageElements</a:t>
+            </a:r>
+            <a:r>
+              <a:rPr lang="en-US" sz="3200" dirty="0" smtClean="0"/>
+              <a:t> </a:t>
+            </a:r>
+            <a:r>
+              <a:rPr lang="en-US" sz="3200" dirty="0"/>
+              <a:t>are like </a:t>
+            </a:r>
+            <a:r>
+              <a:rPr lang="en-US" sz="3200" dirty="0" err="1"/>
+              <a:t>PageObjects</a:t>
+            </a:r>
+            <a:r>
+              <a:rPr lang="en-US" sz="3200" dirty="0"/>
+              <a:t>, hiding implementation </a:t>
+            </a:r>
+            <a:r>
+              <a:rPr lang="en-US" sz="3200" dirty="0" smtClean="0"/>
+              <a:t>details and providing an API to interact with the element</a:t>
+            </a:r>
+          </a:p>
+          <a:p>
+            <a:pPr marL="800100" lvl="1" indent="-342900">
+              <a:buFont typeface="Arial"/>
+              <a:buChar char="•"/>
+            </a:pPr>
+            <a:r>
+              <a:rPr lang="en-US" sz="3200" dirty="0" smtClean="0"/>
+              <a:t>The </a:t>
+            </a:r>
+            <a:r>
+              <a:rPr lang="en-US" sz="3200" dirty="0"/>
+              <a:t>only contract is that they have a root </a:t>
+            </a:r>
+            <a:r>
+              <a:rPr lang="en-US" sz="3200" dirty="0" smtClean="0"/>
+              <a:t>element</a:t>
+            </a:r>
+          </a:p>
+          <a:p>
+            <a:pPr marL="342900" indent="-342900">
+              <a:buFont typeface="Arial"/>
+              <a:buChar char="•"/>
+            </a:pPr>
+            <a:r>
               <a:rPr lang="en-US" sz="3200" dirty="0"/>
               <a:t>For complex pages, divide logical areas into </a:t>
             </a:r>
@@ -4991,52 +5484,66 @@
             </a:r>
             <a:r>
               <a:rPr lang="en-US" sz="3200" dirty="0"/>
-              <a:t> classes</a:t>
-            </a:r>
-          </a:p>
-          <a:p>
-            <a:pPr marL="342900" indent="-342900">
-              <a:buFont typeface="Arial"/>
-              <a:buChar char="•"/>
-            </a:pPr>
+              <a:t> </a:t>
+            </a:r>
+            <a:r>
+              <a:rPr lang="en-US" sz="3200" dirty="0" smtClean="0"/>
+              <a:t>classes</a:t>
+            </a:r>
+            <a:endParaRPr lang="en-US" sz="3200" dirty="0"/>
+          </a:p>
+          <a:p>
+            <a:pPr marL="342900" indent="-342900">
+              <a:buFont typeface="Arial"/>
+              <a:buChar char="•"/>
+            </a:pPr>
+            <a:r>
+              <a:rPr lang="en-US" sz="3200" dirty="0"/>
+              <a:t>“Navigate” to </a:t>
+            </a:r>
             <a:r>
               <a:rPr lang="en-US" sz="3200" dirty="0" err="1"/>
               <a:t>PageElements</a:t>
             </a:r>
             <a:r>
               <a:rPr lang="en-US" sz="3200" dirty="0"/>
-              <a:t> are like </a:t>
-            </a:r>
-            <a:r>
-              <a:rPr lang="en-US" sz="3200" dirty="0" err="1"/>
-              <a:t>PageObjects</a:t>
-            </a:r>
-            <a:r>
-              <a:rPr lang="en-US" sz="3200" dirty="0"/>
-              <a:t>, hiding implementation details, but the only contract is that they have a root element</a:t>
-            </a:r>
-          </a:p>
-          <a:p>
-            <a:pPr marL="342900" indent="-342900">
-              <a:buFont typeface="Arial"/>
-              <a:buChar char="•"/>
-            </a:pPr>
-            <a:r>
-              <a:rPr lang="en-US" sz="3200" dirty="0"/>
-              <a:t>“Navigate” to </a:t>
-            </a:r>
-            <a:r>
-              <a:rPr lang="en-US" sz="3200" dirty="0" err="1"/>
-              <a:t>PageElements</a:t>
-            </a:r>
-            <a:r>
-              <a:rPr lang="en-US" sz="3200" dirty="0"/>
               <a:t> like you would a </a:t>
             </a:r>
             <a:r>
-              <a:rPr lang="en-US" sz="3200" dirty="0" err="1"/>
+              <a:rPr lang="en-US" sz="3200" dirty="0" err="1" smtClean="0"/>
               <a:t>PageObject</a:t>
             </a:r>
+            <a:endParaRPr lang="en-US" sz="3200" dirty="0" smtClean="0"/>
+          </a:p>
+          <a:p>
+            <a:pPr marL="800100" lvl="1" indent="-342900">
+              <a:buFont typeface="Arial"/>
+              <a:buChar char="•"/>
+            </a:pPr>
+            <a:r>
+              <a:rPr lang="en-US" sz="3200" dirty="0" err="1" smtClean="0">
+                <a:latin typeface="Consolas"/>
+                <a:cs typeface="Consolas"/>
+              </a:rPr>
+              <a:t>page.getLeftNav</a:t>
+            </a:r>
+            <a:r>
+              <a:rPr lang="en-US" sz="3200" dirty="0" smtClean="0">
+                <a:latin typeface="Consolas"/>
+                <a:cs typeface="Consolas"/>
+              </a:rPr>
+              <a:t>()</a:t>
+            </a:r>
+            <a:endParaRPr lang="en-US" sz="3200" dirty="0" smtClean="0">
+              <a:latin typeface="Consolas"/>
+              <a:cs typeface="Consolas"/>
+            </a:endParaRPr>
+          </a:p>
+          <a:p>
+            <a:pPr marL="342900" indent="-342900">
+              <a:buFont typeface="Arial"/>
+              <a:buChar char="•"/>
+            </a:pPr>
             <a:endParaRPr lang="en-US" sz="3200" dirty="0"/>
           </a:p>
           <a:p>
@@ -5064,7 +5571,7 @@
 </p:sld>
 </file>
 
-<file path=ppt/slides/slide25.xml><?xml version="1.0" encoding="utf-8"?>
+<file path=ppt/slides/slide27.xml><?xml version="1.0" encoding="utf-8"?>
 <p:sld xmlns:a="http://schemas.openxmlformats.org/drawingml/2006/main" xmlns:r="http://schemas.openxmlformats.org/officeDocument/2006/relationships" xmlns:p="http://schemas.openxmlformats.org/presentationml/2006/main">
   <p:cSld>
     <p:spTree>
@@ -5143,7 +5650,7 @@
 </p:sld>
 </file>
 
-<file path=ppt/slides/slide26.xml><?xml version="1.0" encoding="utf-8"?>
+<file path=ppt/slides/slide28.xml><?xml version="1.0" encoding="utf-8"?>
 <p:sld xmlns:a="http://schemas.openxmlformats.org/drawingml/2006/main" xmlns:r="http://schemas.openxmlformats.org/officeDocument/2006/relationships" xmlns:p="http://schemas.openxmlformats.org/presentationml/2006/main">
   <p:cSld>
     <p:spTree>
@@ -5228,262 +5735,6 @@
 </p:sld>
 </file>
 
-<file path=ppt/slides/slide27.xml><?xml version="1.0" encoding="utf-8"?>
-<p:sld xmlns:a="http://schemas.openxmlformats.org/drawingml/2006/main" xmlns:r="http://schemas.openxmlformats.org/officeDocument/2006/relationships" xmlns:p="http://schemas.openxmlformats.org/presentationml/2006/main">
-  <p:cSld>
-    <p:spTree>
-      <p:nvGrpSpPr>
-        <p:cNvPr id="1" name=""/>
-        <p:cNvGrpSpPr/>
-        <p:nvPr/>
-      </p:nvGrpSpPr>
-      <p:grpSpPr>
-        <a:xfrm>
-          <a:off x="0" y="0"/>
-          <a:ext cx="0" cy="0"/>
-          <a:chOff x="0" y="0"/>
-          <a:chExt cx="0" cy="0"/>
-        </a:xfrm>
-      </p:grpSpPr>
-      <p:sp>
-        <p:nvSpPr>
-          <p:cNvPr id="2" name="Title 1"/>
-          <p:cNvSpPr>
-            <a:spLocks noGrp="1"/>
-          </p:cNvSpPr>
-          <p:nvPr>
-            <p:ph type="title"/>
-          </p:nvPr>
-        </p:nvSpPr>
-        <p:spPr/>
-        <p:txBody>
-          <a:bodyPr/>
-          <a:lstStyle/>
-          <a:p>
-            <a:r>
-              <a:rPr lang="en-US" dirty="0" smtClean="0"/>
-              <a:t>Get </a:t>
-            </a:r>
-            <a:r>
-              <a:rPr lang="en-US" dirty="0" err="1" smtClean="0"/>
-              <a:t>PageElement</a:t>
-            </a:r>
-            <a:r>
-              <a:rPr lang="en-US" dirty="0" smtClean="0"/>
-              <a:t> from Page</a:t>
-            </a:r>
-            <a:endParaRPr lang="en-US" dirty="0"/>
-          </a:p>
-        </p:txBody>
-      </p:sp>
-      <p:pic>
-        <p:nvPicPr>
-          <p:cNvPr id="4" name="Content Placeholder 3"/>
-          <p:cNvPicPr>
-            <a:picLocks noGrp="1" noChangeAspect="1"/>
-          </p:cNvPicPr>
-          <p:nvPr>
-            <p:ph idx="1"/>
-          </p:nvPr>
-        </p:nvPicPr>
-        <p:blipFill rotWithShape="1">
-          <a:blip r:embed="rId2"/>
-          <a:srcRect b="-90840"/>
-          <a:stretch/>
-        </p:blipFill>
-        <p:spPr>
-          <a:prstGeom prst="rect">
-            <a:avLst/>
-          </a:prstGeom>
-        </p:spPr>
-      </p:pic>
-    </p:spTree>
-    <p:extLst>
-      <p:ext uri="{BB962C8B-B14F-4D97-AF65-F5344CB8AC3E}">
-        <p14:creationId xmlns:p14="http://schemas.microsoft.com/office/powerpoint/2010/main" val="1342240509"/>
-      </p:ext>
-    </p:extLst>
-  </p:cSld>
-  <p:clrMapOvr>
-    <a:masterClrMapping/>
-  </p:clrMapOvr>
-  <p:timing>
-    <p:tnLst>
-      <p:par>
-        <p:cTn xmlns:p14="http://schemas.microsoft.com/office/powerpoint/2010/main" id="1" dur="indefinite" restart="never" nodeType="tmRoot"/>
-      </p:par>
-    </p:tnLst>
-  </p:timing>
-</p:sld>
-</file>
-
-<file path=ppt/slides/slide28.xml><?xml version="1.0" encoding="utf-8"?>
-<p:sld xmlns:a="http://schemas.openxmlformats.org/drawingml/2006/main" xmlns:r="http://schemas.openxmlformats.org/officeDocument/2006/relationships" xmlns:p="http://schemas.openxmlformats.org/presentationml/2006/main">
-  <p:cSld>
-    <p:spTree>
-      <p:nvGrpSpPr>
-        <p:cNvPr id="1" name=""/>
-        <p:cNvGrpSpPr/>
-        <p:nvPr/>
-      </p:nvGrpSpPr>
-      <p:grpSpPr>
-        <a:xfrm>
-          <a:off x="0" y="0"/>
-          <a:ext cx="0" cy="0"/>
-          <a:chOff x="0" y="0"/>
-          <a:chExt cx="0" cy="0"/>
-        </a:xfrm>
-      </p:grpSpPr>
-      <p:sp>
-        <p:nvSpPr>
-          <p:cNvPr id="2" name="Title 1"/>
-          <p:cNvSpPr>
-            <a:spLocks noGrp="1"/>
-          </p:cNvSpPr>
-          <p:nvPr>
-            <p:ph type="title"/>
-          </p:nvPr>
-        </p:nvSpPr>
-        <p:spPr/>
-        <p:txBody>
-          <a:bodyPr/>
-          <a:lstStyle/>
-          <a:p>
-            <a:r>
-              <a:rPr lang="en-US" dirty="0"/>
-              <a:t>Common Criticisms</a:t>
-            </a:r>
-          </a:p>
-        </p:txBody>
-      </p:sp>
-      <p:sp>
-        <p:nvSpPr>
-          <p:cNvPr id="3" name="Content Placeholder 2"/>
-          <p:cNvSpPr>
-            <a:spLocks noGrp="1"/>
-          </p:cNvSpPr>
-          <p:nvPr>
-            <p:ph idx="1"/>
-          </p:nvPr>
-        </p:nvSpPr>
-        <p:spPr/>
-        <p:txBody>
-          <a:bodyPr/>
-          <a:lstStyle/>
-          <a:p>
-            <a:pPr marL="342900" indent="-342900">
-              <a:buFont typeface="Arial"/>
-              <a:buChar char="•"/>
-            </a:pPr>
-            <a:r>
-              <a:rPr lang="en-US" dirty="0" smtClean="0"/>
-              <a:t>Fragile Tests</a:t>
-            </a:r>
-          </a:p>
-          <a:p>
-            <a:pPr marL="800100" lvl="1" indent="-342900">
-              <a:buFont typeface="Arial"/>
-              <a:buChar char="•"/>
-            </a:pPr>
-            <a:r>
-              <a:rPr lang="en-US" sz="2000" dirty="0" smtClean="0"/>
-              <a:t>Tests fail whenever anything changes</a:t>
-            </a:r>
-          </a:p>
-          <a:p>
-            <a:pPr marL="800100" lvl="1" indent="-342900">
-              <a:buFont typeface="Arial"/>
-              <a:buChar char="•"/>
-            </a:pPr>
-            <a:endParaRPr lang="en-US" sz="2000" dirty="0" smtClean="0"/>
-          </a:p>
-          <a:p>
-            <a:pPr marL="342900" indent="-342900">
-              <a:buFont typeface="Arial"/>
-              <a:buChar char="•"/>
-            </a:pPr>
-            <a:r>
-              <a:rPr lang="en-US" dirty="0" smtClean="0"/>
-              <a:t>Too many false test failures</a:t>
-            </a:r>
-          </a:p>
-          <a:p>
-            <a:pPr marL="800100" lvl="1" indent="-342900">
-              <a:buFont typeface="Arial"/>
-              <a:buChar char="•"/>
-            </a:pPr>
-            <a:r>
-              <a:rPr lang="en-US" sz="2000" dirty="0" smtClean="0"/>
-              <a:t>Tests fail sometimes, but pass other times</a:t>
-            </a:r>
-          </a:p>
-          <a:p>
-            <a:pPr marL="800100" lvl="1" indent="-342900">
-              <a:buFont typeface="Arial"/>
-              <a:buChar char="•"/>
-            </a:pPr>
-            <a:endParaRPr lang="en-US" sz="2000" dirty="0" smtClean="0"/>
-          </a:p>
-          <a:p>
-            <a:pPr marL="342900" indent="-342900">
-              <a:buFont typeface="Arial"/>
-              <a:buChar char="•"/>
-            </a:pPr>
-            <a:r>
-              <a:rPr lang="en-US" dirty="0" smtClean="0"/>
-              <a:t>Too hard to update tests with changes</a:t>
-            </a:r>
-          </a:p>
-          <a:p>
-            <a:pPr marL="800100" lvl="1" indent="-342900">
-              <a:buFont typeface="Arial"/>
-              <a:buChar char="•"/>
-            </a:pPr>
-            <a:r>
-              <a:rPr lang="en-US" sz="2000" dirty="0" smtClean="0"/>
-              <a:t>Change a CSS class, need tons of test updates</a:t>
-            </a:r>
-          </a:p>
-          <a:p>
-            <a:pPr marL="800100" lvl="1" indent="-342900">
-              <a:buFont typeface="Arial"/>
-              <a:buChar char="•"/>
-            </a:pPr>
-            <a:endParaRPr lang="en-US" sz="2000" dirty="0"/>
-          </a:p>
-          <a:p>
-            <a:pPr marL="342900" indent="-342900">
-              <a:buFont typeface="Arial"/>
-              <a:buChar char="•"/>
-            </a:pPr>
-            <a:r>
-              <a:rPr lang="en-US" dirty="0" smtClean="0"/>
-              <a:t>AJAX apps require “sleeps” to make work</a:t>
-            </a:r>
-            <a:endParaRPr lang="en-US" dirty="0"/>
-          </a:p>
-        </p:txBody>
-      </p:sp>
-    </p:spTree>
-    <p:extLst>
-      <p:ext uri="{BB962C8B-B14F-4D97-AF65-F5344CB8AC3E}">
-        <p14:creationId xmlns:p14="http://schemas.microsoft.com/office/powerpoint/2010/main" val="2939125152"/>
-      </p:ext>
-    </p:extLst>
-  </p:cSld>
-  <p:clrMapOvr>
-    <a:masterClrMapping/>
-  </p:clrMapOvr>
-  <p:timing>
-    <p:tnLst>
-      <p:par>
-        <p:cTn xmlns:p14="http://schemas.microsoft.com/office/powerpoint/2010/main" id="1" dur="indefinite" restart="never" nodeType="tmRoot"/>
-      </p:par>
-    </p:tnLst>
-  </p:timing>
-</p:sld>
-</file>
-
 <file path=ppt/slides/slide29.xml><?xml version="1.0" encoding="utf-8"?>
 <p:sld xmlns:a="http://schemas.openxmlformats.org/drawingml/2006/main" xmlns:r="http://schemas.openxmlformats.org/officeDocument/2006/relationships" xmlns:p="http://schemas.openxmlformats.org/presentationml/2006/main">
   <p:cSld>
@@ -5513,101 +5764,50 @@
         </p:nvSpPr>
         <p:spPr/>
         <p:txBody>
-          <a:bodyPr>
-            <a:normAutofit/>
-          </a:bodyPr>
+          <a:bodyPr/>
           <a:lstStyle/>
           <a:p>
             <a:r>
-              <a:rPr lang="en-US" sz="4000" dirty="0" smtClean="0"/>
-              <a:t>Design To Protect Your Code</a:t>
-            </a:r>
-            <a:endParaRPr lang="en-US" sz="4000" dirty="0"/>
-          </a:p>
-        </p:txBody>
-      </p:sp>
-      <p:sp>
-        <p:nvSpPr>
-          <p:cNvPr id="3" name="Content Placeholder 2"/>
-          <p:cNvSpPr>
-            <a:spLocks noGrp="1"/>
-          </p:cNvSpPr>
+              <a:rPr lang="en-US" dirty="0" smtClean="0"/>
+              <a:t>Get </a:t>
+            </a:r>
+            <a:r>
+              <a:rPr lang="en-US" dirty="0" err="1" smtClean="0"/>
+              <a:t>PageElement</a:t>
+            </a:r>
+            <a:r>
+              <a:rPr lang="en-US" dirty="0" smtClean="0"/>
+              <a:t> from Page</a:t>
+            </a:r>
+            <a:endParaRPr lang="en-US" dirty="0"/>
+          </a:p>
+        </p:txBody>
+      </p:sp>
+      <p:pic>
+        <p:nvPicPr>
+          <p:cNvPr id="4" name="Content Placeholder 3"/>
+          <p:cNvPicPr>
+            <a:picLocks noGrp="1" noChangeAspect="1"/>
+          </p:cNvPicPr>
           <p:nvPr>
             <p:ph idx="1"/>
           </p:nvPr>
-        </p:nvSpPr>
-        <p:spPr/>
-        <p:txBody>
-          <a:bodyPr>
-            <a:normAutofit/>
-          </a:bodyPr>
-          <a:lstStyle/>
-          <a:p>
-            <a:pPr marL="342900" indent="-342900">
-              <a:buFont typeface="Arial"/>
-              <a:buChar char="•"/>
-            </a:pPr>
-            <a:r>
-              <a:rPr lang="en-US" sz="3200" dirty="0" smtClean="0"/>
-              <a:t>Tests should interact with objects, not the page</a:t>
-            </a:r>
-          </a:p>
-          <a:p>
-            <a:pPr marL="800100" lvl="1" indent="-342900">
-              <a:buFont typeface="Arial"/>
-              <a:buChar char="•"/>
-            </a:pPr>
-            <a:r>
-              <a:rPr lang="en-US" sz="2800" dirty="0" smtClean="0"/>
-              <a:t>Avoid any selectors in your tests</a:t>
-            </a:r>
-          </a:p>
-          <a:p>
-            <a:pPr marL="800100" lvl="1" indent="-342900">
-              <a:buFont typeface="Arial"/>
-              <a:buChar char="•"/>
-            </a:pPr>
-            <a:r>
-              <a:rPr lang="en-US" sz="2800" dirty="0" smtClean="0"/>
-              <a:t>Keep logic hidden under your API</a:t>
-            </a:r>
-          </a:p>
-          <a:p>
-            <a:pPr marL="342900" indent="-342900">
-              <a:buFont typeface="Arial"/>
-              <a:buChar char="•"/>
-            </a:pPr>
-            <a:r>
-              <a:rPr lang="en-US" sz="3200" dirty="0" smtClean="0"/>
-              <a:t>Reuse code as much as possible</a:t>
-            </a:r>
-          </a:p>
-          <a:p>
-            <a:pPr marL="800100" lvl="1" indent="-342900">
-              <a:buFont typeface="Arial"/>
-              <a:buChar char="•"/>
-            </a:pPr>
-            <a:r>
-              <a:rPr lang="en-US" sz="2800" dirty="0" smtClean="0"/>
-              <a:t>Write your API so that it can be reused in other tests</a:t>
-            </a:r>
-          </a:p>
-          <a:p>
-            <a:pPr marL="342900" indent="-342900">
-              <a:buFont typeface="Arial"/>
-              <a:buChar char="•"/>
-            </a:pPr>
-            <a:r>
-              <a:rPr lang="en-US" sz="2800" dirty="0" smtClean="0"/>
-              <a:t>Assert the state of the page regularly</a:t>
-            </a:r>
-          </a:p>
-        </p:txBody>
-      </p:sp>
+        </p:nvPicPr>
+        <p:blipFill rotWithShape="1">
+          <a:blip r:embed="rId2"/>
+          <a:srcRect b="-90840"/>
+          <a:stretch/>
+        </p:blipFill>
+        <p:spPr>
+          <a:prstGeom prst="rect">
+            <a:avLst/>
+          </a:prstGeom>
+        </p:spPr>
+      </p:pic>
     </p:spTree>
     <p:extLst>
       <p:ext uri="{BB962C8B-B14F-4D97-AF65-F5344CB8AC3E}">
-        <p14:creationId xmlns:p14="http://schemas.microsoft.com/office/powerpoint/2010/main" val="200634714"/>
+        <p14:creationId xmlns:p14="http://schemas.microsoft.com/office/powerpoint/2010/main" val="1342240509"/>
       </p:ext>
     </p:extLst>
   </p:cSld>
@@ -5726,11 +5926,7 @@
             </a:r>
             <a:r>
               <a:rPr lang="en-US" dirty="0" smtClean="0"/>
-              <a:t> </a:t>
-            </a:r>
-            <a:r>
-              <a:rPr lang="en-US" dirty="0" smtClean="0"/>
-              <a:t>Example - Better</a:t>
+              <a:t> Example - Better</a:t>
             </a:r>
             <a:endParaRPr lang="en-US" dirty="0"/>
           </a:p>
@@ -5761,11 +5957,7 @@
             </a:r>
             <a:r>
               <a:rPr lang="en-US" dirty="0" smtClean="0"/>
-              <a:t> example </a:t>
-            </a:r>
-            <a:r>
-              <a:rPr lang="en-US" dirty="0" smtClean="0"/>
-              <a:t>with </a:t>
+              <a:t> example with </a:t>
             </a:r>
             <a:r>
               <a:rPr lang="en-US" dirty="0" err="1" smtClean="0"/>
@@ -6017,8 +6209,46 @@
             </a:pPr>
             <a:r>
               <a:rPr lang="en-US" dirty="0" smtClean="0"/>
-              <a:t>Debugging can be painful</a:t>
-            </a:r>
+              <a:t>Debugging can be </a:t>
+            </a:r>
+            <a:r>
+              <a:rPr lang="en-US" dirty="0" smtClean="0"/>
+              <a:t>painful</a:t>
+            </a:r>
+          </a:p>
+          <a:p>
+            <a:pPr marL="342900" indent="-342900">
+              <a:buFont typeface="Arial"/>
+              <a:buChar char="•"/>
+            </a:pPr>
+            <a:r>
+              <a:rPr lang="en-US" dirty="0" smtClean="0"/>
+              <a:t>You WILL write tests that pass sometimes and fail other times</a:t>
+            </a:r>
+          </a:p>
+          <a:p>
+            <a:pPr marL="800100" lvl="1" indent="-342900">
+              <a:buFont typeface="Arial"/>
+              <a:buChar char="•"/>
+            </a:pPr>
+            <a:r>
+              <a:rPr lang="en-US" dirty="0" smtClean="0"/>
+              <a:t>Give yourself the tools to diagnose and fix</a:t>
+            </a:r>
+          </a:p>
+          <a:p>
+            <a:pPr marL="800100" lvl="1" indent="-342900">
+              <a:buFont typeface="Arial"/>
+              <a:buChar char="•"/>
+            </a:pPr>
+            <a:r>
+              <a:rPr lang="en-US" dirty="0"/>
+              <a:t>Keep getting better</a:t>
+            </a:r>
+          </a:p>
+          <a:p>
+            <a:pPr lvl="1"/>
+            <a:endParaRPr lang="en-US" dirty="0" smtClean="0"/>
           </a:p>
         </p:txBody>
       </p:sp>
@@ -6136,35 +6366,32 @@
             </a:pPr>
             <a:r>
               <a:rPr lang="en-US" dirty="0"/>
-              <a:t>Using Chef, a server is completely wiped and re-installed before tests begin</a:t>
-            </a:r>
-          </a:p>
-          <a:p>
-            <a:pPr marL="342900" indent="-342900">
-              <a:buFont typeface="Arial"/>
-              <a:buChar char="•"/>
-            </a:pPr>
-            <a:r>
-              <a:rPr lang="en-US" dirty="0" smtClean="0"/>
-              <a:t>Take a screenshot </a:t>
+              <a:t>Using </a:t>
+            </a:r>
+            <a:r>
+              <a:rPr lang="en-US" b="1" dirty="0">
+                <a:latin typeface="Consolas"/>
+                <a:cs typeface="Consolas"/>
+              </a:rPr>
+              <a:t>Chef</a:t>
             </a:r>
             <a:r>
               <a:rPr lang="en-US" dirty="0"/>
-              <a:t>after every </a:t>
-            </a:r>
-            <a:r>
-              <a:rPr lang="en-US" dirty="0" smtClean="0"/>
-              <a:t>test</a:t>
-            </a:r>
-          </a:p>
-          <a:p>
-            <a:pPr marL="342900" indent="-342900">
-              <a:buFont typeface="Arial"/>
-              <a:buChar char="•"/>
-            </a:pPr>
-            <a:r>
-              <a:rPr lang="en-US" dirty="0" smtClean="0"/>
-              <a:t>CI runs </a:t>
+              <a:t>, a server is completely wiped and re-installed before tests begin</a:t>
+            </a:r>
+          </a:p>
+          <a:p>
+            <a:pPr marL="342900" indent="-342900">
+              <a:buFont typeface="Arial"/>
+              <a:buChar char="•"/>
+            </a:pPr>
+            <a:r>
+              <a:rPr lang="en-US" dirty="0" smtClean="0"/>
+              <a:t>CI </a:t>
+            </a:r>
+            <a:r>
+              <a:rPr lang="en-US" dirty="0" smtClean="0"/>
+              <a:t>runs </a:t>
             </a:r>
             <a:r>
               <a:rPr lang="en-US" dirty="0" err="1" smtClean="0"/>
@@ -6172,7 +6399,18 @@
             </a:r>
             <a:r>
               <a:rPr lang="en-US" dirty="0" smtClean="0"/>
-              <a:t> on a VNC display</a:t>
+              <a:t> on a </a:t>
+            </a:r>
+            <a:r>
+              <a:rPr lang="en-US" b="1" dirty="0" smtClean="0">
+                <a:latin typeface="Consolas"/>
+                <a:cs typeface="Consolas"/>
+              </a:rPr>
+              <a:t>VNC</a:t>
+            </a:r>
+            <a:r>
+              <a:rPr lang="en-US" dirty="0" smtClean="0"/>
+              <a:t> display</a:t>
             </a:r>
           </a:p>
           <a:p>
@@ -6182,8 +6420,76 @@
             </a:pPr>
             <a:r>
               <a:rPr lang="en-US" dirty="0" smtClean="0"/>
-              <a:t>Maybe we can see one right now</a:t>
-            </a:r>
+              <a:t>Maybe we can see one right </a:t>
+            </a:r>
+            <a:r>
+              <a:rPr lang="en-US" dirty="0" smtClean="0"/>
+              <a:t>now</a:t>
+            </a:r>
+          </a:p>
+          <a:p>
+            <a:pPr marL="342900" indent="-342900">
+              <a:buFont typeface="Arial"/>
+              <a:buChar char="•"/>
+            </a:pPr>
+            <a:r>
+              <a:rPr lang="en-US" dirty="0"/>
+              <a:t>Tests are recorded using </a:t>
+            </a:r>
+            <a:r>
+              <a:rPr lang="en-US" b="1" dirty="0" smtClean="0">
+                <a:latin typeface="Consolas"/>
+                <a:cs typeface="Consolas"/>
+              </a:rPr>
+              <a:t>vnc2flv</a:t>
+            </a:r>
+          </a:p>
+          <a:p>
+            <a:pPr marL="342900" indent="-342900">
+              <a:buFont typeface="Arial"/>
+              <a:buChar char="•"/>
+            </a:pPr>
+            <a:r>
+              <a:rPr lang="en-US" dirty="0" smtClean="0"/>
+              <a:t>Actions can be written to the VNC display using </a:t>
+            </a:r>
+            <a:r>
+              <a:rPr lang="en-US" b="1" dirty="0" err="1" smtClean="0">
+                <a:latin typeface="Consolas"/>
+                <a:cs typeface="Consolas"/>
+              </a:rPr>
+              <a:t>osd_cat</a:t>
+            </a:r>
+            <a:endParaRPr lang="en-US" b="1" dirty="0">
+              <a:latin typeface="Consolas"/>
+              <a:cs typeface="Consolas"/>
+            </a:endParaRPr>
+          </a:p>
+          <a:p>
+            <a:pPr marL="342900" indent="-342900">
+              <a:buFont typeface="Arial"/>
+              <a:buChar char="•"/>
+            </a:pPr>
+            <a:endParaRPr lang="en-US" dirty="0" smtClean="0"/>
+          </a:p>
+          <a:p>
+            <a:pPr marL="342900" indent="-342900">
+              <a:buFont typeface="Arial"/>
+              <a:buChar char="•"/>
+            </a:pPr>
+            <a:r>
+              <a:rPr lang="en-US" dirty="0" smtClean="0"/>
+              <a:t>We tried </a:t>
+            </a:r>
+            <a:r>
+              <a:rPr lang="en-US" b="1" dirty="0" err="1" smtClean="0"/>
+              <a:t>SauceLabs</a:t>
+            </a:r>
+            <a:r>
+              <a:rPr lang="en-US" dirty="0" smtClean="0"/>
+              <a:t>, but weren’t successful</a:t>
+            </a:r>
+            <a:endParaRPr lang="en-US" dirty="0" smtClean="0"/>
           </a:p>
           <a:p>
             <a:endParaRPr lang="en-US" dirty="0"/>
@@ -6244,7 +6550,11 @@
           <a:p>
             <a:r>
               <a:rPr lang="en-US" dirty="0" smtClean="0"/>
-              <a:t>Other Ideas</a:t>
+              <a:t>Our </a:t>
+            </a:r>
+            <a:r>
+              <a:rPr lang="en-US" dirty="0" err="1" smtClean="0"/>
+              <a:t>FirefoxDriver</a:t>
             </a:r>
             <a:endParaRPr lang="en-US" dirty="0"/>
           </a:p>
@@ -6270,42 +6580,184 @@
               <a:buChar char="•"/>
             </a:pPr>
             <a:r>
-              <a:rPr lang="en-US" dirty="0"/>
-              <a:t>Record VNC</a:t>
-            </a:r>
-          </a:p>
-          <a:p>
-            <a:pPr marL="342900" indent="-342900">
-              <a:buFont typeface="Arial"/>
-              <a:buChar char="•"/>
-            </a:pPr>
-            <a:r>
-              <a:rPr lang="en-US" dirty="0"/>
-              <a:t>Display currently running action on the screen</a:t>
-            </a:r>
-          </a:p>
-          <a:p>
+              <a:rPr lang="en-US" dirty="0" smtClean="0"/>
+              <a:t>Check out the </a:t>
+            </a:r>
+            <a:r>
+              <a:rPr lang="en-US" dirty="0" smtClean="0">
+                <a:hlinkClick r:id="rId2"/>
+              </a:rPr>
+              <a:t>Firefox Preferences</a:t>
+            </a:r>
+            <a:endParaRPr lang="en-US" dirty="0" smtClean="0"/>
+          </a:p>
+          <a:p>
+            <a:pPr marL="800100" lvl="1" indent="-342900">
+              <a:buFont typeface="Arial"/>
+              <a:buChar char="•"/>
+            </a:pPr>
+            <a:r>
+              <a:rPr lang="en-US" dirty="0" err="1" smtClean="0">
+                <a:latin typeface="Consolas"/>
+                <a:cs typeface="Consolas"/>
+              </a:rPr>
+              <a:t>app.update.enabled</a:t>
+            </a:r>
+            <a:r>
+              <a:rPr lang="en-US" dirty="0" smtClean="0">
+                <a:latin typeface="Consolas"/>
+                <a:cs typeface="Consolas"/>
+              </a:rPr>
+              <a:t> = false</a:t>
+            </a:r>
             <a:endParaRPr lang="en-US" dirty="0"/>
+          </a:p>
+          <a:p>
+            <a:pPr marL="1257300" lvl="2" indent="-342900">
+              <a:buFont typeface="Arial"/>
+              <a:buChar char="•"/>
+            </a:pPr>
+            <a:r>
+              <a:rPr lang="en-US" dirty="0" smtClean="0">
+                <a:solidFill>
+                  <a:schemeClr val="tx1"/>
+                </a:solidFill>
+              </a:rPr>
+              <a:t>never auto-update</a:t>
+            </a:r>
+          </a:p>
+          <a:p>
+            <a:pPr marL="800100" lvl="1" indent="-342900">
+              <a:buFont typeface="Arial"/>
+              <a:buChar char="•"/>
+            </a:pPr>
+            <a:r>
+              <a:rPr lang="en-US" dirty="0" err="1" smtClean="0">
+                <a:latin typeface="Consolas"/>
+                <a:cs typeface="Consolas"/>
+              </a:rPr>
+              <a:t>browser.startup.page</a:t>
+            </a:r>
+            <a:r>
+              <a:rPr lang="en-US" dirty="0" smtClean="0">
+                <a:latin typeface="Consolas"/>
+                <a:cs typeface="Consolas"/>
+              </a:rPr>
+              <a:t> </a:t>
+            </a:r>
+            <a:r>
+              <a:rPr lang="en-US" dirty="0" smtClean="0"/>
+              <a:t>= 0</a:t>
+            </a:r>
+          </a:p>
+          <a:p>
+            <a:pPr marL="1257300" lvl="2" indent="-342900">
+              <a:buFont typeface="Arial"/>
+              <a:buChar char="•"/>
+            </a:pPr>
+            <a:r>
+              <a:rPr lang="en-US" dirty="0" smtClean="0">
+                <a:solidFill>
+                  <a:srgbClr val="000000"/>
+                </a:solidFill>
+              </a:rPr>
+              <a:t>open at </a:t>
+            </a:r>
+            <a:r>
+              <a:rPr lang="en-US" dirty="0" err="1" smtClean="0">
+                <a:solidFill>
+                  <a:srgbClr val="000000"/>
+                </a:solidFill>
+              </a:rPr>
+              <a:t>about:blank</a:t>
+            </a:r>
+            <a:endParaRPr lang="en-US" dirty="0" smtClean="0">
+              <a:solidFill>
+                <a:srgbClr val="000000"/>
+              </a:solidFill>
+            </a:endParaRPr>
+          </a:p>
+          <a:p>
+            <a:pPr marL="800100" lvl="1" indent="-342900">
+              <a:buFont typeface="Arial"/>
+              <a:buChar char="•"/>
+            </a:pPr>
+            <a:r>
+              <a:rPr lang="en-US" dirty="0" err="1" smtClean="0">
+                <a:latin typeface="Consolas"/>
+                <a:cs typeface="Consolas"/>
+              </a:rPr>
+              <a:t>browser.shell.checkDefaultBrowser</a:t>
+            </a:r>
+            <a:r>
+              <a:rPr lang="en-US" dirty="0">
+                <a:latin typeface="Consolas"/>
+                <a:cs typeface="Consolas"/>
+              </a:rPr>
+              <a:t> </a:t>
+            </a:r>
+            <a:r>
+              <a:rPr lang="en-US" dirty="0" smtClean="0">
+                <a:latin typeface="Consolas"/>
+                <a:cs typeface="Consolas"/>
+              </a:rPr>
+              <a:t>= false</a:t>
+            </a:r>
+          </a:p>
+          <a:p>
+            <a:pPr marL="1257300" lvl="2" indent="-342900">
+              <a:buFont typeface="Arial"/>
+              <a:buChar char="•"/>
+            </a:pPr>
+            <a:r>
+              <a:rPr lang="en-US" dirty="0" smtClean="0">
+                <a:solidFill>
+                  <a:srgbClr val="000000"/>
+                </a:solidFill>
+              </a:rPr>
+              <a:t>Don’t check default browser</a:t>
+            </a:r>
+          </a:p>
+          <a:p>
+            <a:pPr marL="342900" indent="-342900">
+              <a:buFont typeface="Arial"/>
+              <a:buChar char="•"/>
+            </a:pPr>
+            <a:r>
+              <a:rPr lang="en-US" dirty="0" smtClean="0">
+                <a:solidFill>
+                  <a:srgbClr val="000000"/>
+                </a:solidFill>
+              </a:rPr>
+              <a:t>Extensions</a:t>
+            </a:r>
+          </a:p>
+          <a:p>
+            <a:pPr marL="800100" lvl="1" indent="-342900">
+              <a:buFont typeface="Arial"/>
+              <a:buChar char="•"/>
+            </a:pPr>
+            <a:r>
+              <a:rPr lang="en-US" dirty="0" smtClean="0">
+                <a:solidFill>
+                  <a:srgbClr val="000000"/>
+                </a:solidFill>
+              </a:rPr>
+              <a:t>Firebug support</a:t>
+            </a:r>
           </a:p>
         </p:txBody>
       </p:sp>
     </p:spTree>
     <p:extLst>
       <p:ext uri="{BB962C8B-B14F-4D97-AF65-F5344CB8AC3E}">
-        <p14:creationId xmlns:p14="http://schemas.microsoft.com/office/powerpoint/2010/main" val="28341907"/>
+        <p14:creationId xmlns:p14="http://schemas.microsoft.com/office/powerpoint/2010/main" val="1121456003"/>
       </p:ext>
     </p:extLst>
   </p:cSld>
   <p:clrMapOvr>
     <a:masterClrMapping/>
   </p:clrMapOvr>
-  <p:timing>
-    <p:tnLst>
-      <p:par>
-        <p:cTn xmlns:p14="http://schemas.microsoft.com/office/powerpoint/2010/main" id="1" dur="indefinite" restart="never" nodeType="tmRoot"/>
-      </p:par>
-    </p:tnLst>
-  </p:timing>
 </p:sld>
 </file>
 
@@ -6956,8 +7408,30 @@
             </a:r>
             <a:r>
               <a:rPr lang="en-US" dirty="0" smtClean="0"/>
-              <a:t> makes it easy to just Push and work on something else until the tests finish</a:t>
-            </a:r>
+              <a:t> makes it easy to just Push and work on something else until the tests </a:t>
+            </a:r>
+            <a:r>
+              <a:rPr lang="en-US" dirty="0" smtClean="0"/>
+              <a:t>finish</a:t>
+            </a:r>
+          </a:p>
+          <a:p>
+            <a:pPr marL="342900" indent="-342900">
+              <a:buFont typeface="Arial"/>
+              <a:buChar char="•"/>
+            </a:pPr>
+            <a:endParaRPr lang="en-US" dirty="0"/>
+          </a:p>
+          <a:p>
+            <a:pPr marL="342900" indent="-342900">
+              <a:buFont typeface="Arial"/>
+              <a:buChar char="•"/>
+            </a:pPr>
+            <a:r>
+              <a:rPr lang="en-US" dirty="0" smtClean="0"/>
+              <a:t>We are looking into running a subset of tests for every commit, and the full suite on master</a:t>
+            </a:r>
+            <a:endParaRPr lang="en-US" dirty="0" smtClean="0"/>
           </a:p>
         </p:txBody>
       </p:sp>
@@ -7069,11 +7543,23 @@
             </a:r>
             <a:r>
               <a:rPr lang="en-US" dirty="0"/>
-              <a:t>/seanadkinson/</a:t>
+              <a:t>/</a:t>
             </a:r>
             <a:r>
               <a:rPr lang="en-US" dirty="0" err="1"/>
-              <a:t>pjug-webdriver</a:t>
+              <a:t>seanadkinson</a:t>
+            </a:r>
+            <a:r>
+              <a:rPr lang="en-US" dirty="0"/>
+              <a:t>/</a:t>
+            </a:r>
+            <a:r>
+              <a:rPr lang="en-US" dirty="0" err="1"/>
+              <a:t>webdriver</a:t>
+            </a:r>
+            <a:r>
+              <a:rPr lang="en-US" dirty="0"/>
+              <a:t>-examples</a:t>
             </a:r>
             <a:endParaRPr lang="en-US" dirty="0"/>
           </a:p>

</xml_diff>